<commit_message>
Changed UI elements & some Documents & added Highscore class UI changes: Launcher Symbol, Tower Icons, Map
</commit_message>
<xml_diff>
--- a/svn/JG16S17P06/trunk/Documentation/ProjectDocumentation/Presentation.pptx
+++ b/svn/JG16S17P06/trunk/Documentation/ProjectDocumentation/Presentation.pptx
@@ -1,9 +1,24 @@
 
 <file path=ppt/presentation.xml><?xml version="1.0" encoding="utf-8"?>
-<p:presentation xmlns:a="http://schemas.openxmlformats.org/drawingml/2006/main" xmlns:r="http://schemas.openxmlformats.org/officeDocument/2006/relationships" xmlns:p="http://schemas.openxmlformats.org/presentationml/2006/main" saveSubsetFonts="1">
+<p:presentation xmlns:a="http://schemas.openxmlformats.org/drawingml/2006/main" xmlns:r="http://schemas.openxmlformats.org/officeDocument/2006/relationships" xmlns:p="http://schemas.openxmlformats.org/presentationml/2006/main" showSpecialPlsOnTitleSld="0" saveSubsetFonts="1">
   <p:sldMasterIdLst>
     <p:sldMasterId id="2147483648" r:id="rId1"/>
   </p:sldMasterIdLst>
+  <p:notesMasterIdLst>
+    <p:notesMasterId r:id="rId12"/>
+  </p:notesMasterIdLst>
+  <p:sldIdLst>
+    <p:sldId id="256" r:id="rId2"/>
+    <p:sldId id="257" r:id="rId3"/>
+    <p:sldId id="259" r:id="rId4"/>
+    <p:sldId id="260" r:id="rId5"/>
+    <p:sldId id="264" r:id="rId6"/>
+    <p:sldId id="265" r:id="rId7"/>
+    <p:sldId id="261" r:id="rId8"/>
+    <p:sldId id="263" r:id="rId9"/>
+    <p:sldId id="262" r:id="rId10"/>
+    <p:sldId id="258" r:id="rId11"/>
+  </p:sldIdLst>
   <p:sldSz cx="9144000" cy="6858000" type="screen4x3"/>
   <p:notesSz cx="6858000" cy="9144000"/>
   <p:defaultTextStyle>
@@ -101,7 +116,377 @@
       </a:defRPr>
     </a:lvl9pPr>
   </p:defaultTextStyle>
+  <p:extLst>
+    <p:ext uri="{EFAFB233-063F-42B5-8137-9DF3F51BA10A}">
+      <p15:sldGuideLst xmlns:p15="http://schemas.microsoft.com/office/powerpoint/2012/main">
+        <p15:guide id="1" orient="horz" pos="2160">
+          <p15:clr>
+            <a:srgbClr val="A4A3A4"/>
+          </p15:clr>
+        </p15:guide>
+        <p15:guide id="2" pos="2880">
+          <p15:clr>
+            <a:srgbClr val="A4A3A4"/>
+          </p15:clr>
+        </p15:guide>
+      </p15:sldGuideLst>
+    </p:ext>
+  </p:extLst>
 </p:presentation>
+</file>
+
+<file path=ppt/revisionInfo.xml><?xml version="1.0" encoding="utf-8"?>
+<p1510:revInfo xmlns:a="http://schemas.openxmlformats.org/drawingml/2006/main" xmlns:r="http://schemas.openxmlformats.org/officeDocument/2006/relationships" xmlns:p1510="http://schemas.microsoft.com/office/powerpoint/2015/10/main"/>
+</file>
+
+<file path=ppt/notesMasters/notesMaster1.xml><?xml version="1.0" encoding="utf-8"?>
+<p:notesMaster xmlns:a="http://schemas.openxmlformats.org/drawingml/2006/main" xmlns:r="http://schemas.openxmlformats.org/officeDocument/2006/relationships" xmlns:p="http://schemas.openxmlformats.org/presentationml/2006/main">
+  <p:cSld>
+    <p:bg>
+      <p:bgRef idx="1001">
+        <a:schemeClr val="bg1"/>
+      </p:bgRef>
+    </p:bg>
+    <p:spTree>
+      <p:nvGrpSpPr>
+        <p:cNvPr id="1" name=""/>
+        <p:cNvGrpSpPr/>
+        <p:nvPr/>
+      </p:nvGrpSpPr>
+      <p:grpSpPr>
+        <a:xfrm>
+          <a:off x="0" y="0"/>
+          <a:ext cx="0" cy="0"/>
+          <a:chOff x="0" y="0"/>
+          <a:chExt cx="0" cy="0"/>
+        </a:xfrm>
+      </p:grpSpPr>
+      <p:sp>
+        <p:nvSpPr>
+          <p:cNvPr id="2" name="Kopfzeilenplatzhalter 1"/>
+          <p:cNvSpPr>
+            <a:spLocks noGrp="1"/>
+          </p:cNvSpPr>
+          <p:nvPr>
+            <p:ph type="hdr" sz="quarter"/>
+          </p:nvPr>
+        </p:nvSpPr>
+        <p:spPr>
+          <a:xfrm>
+            <a:off x="0" y="0"/>
+            <a:ext cx="2971800" cy="458788"/>
+          </a:xfrm>
+          <a:prstGeom prst="rect">
+            <a:avLst/>
+          </a:prstGeom>
+        </p:spPr>
+        <p:txBody>
+          <a:bodyPr vert="horz" lIns="91440" tIns="45720" rIns="91440" bIns="45720" rtlCol="0"/>
+          <a:lstStyle>
+            <a:lvl1pPr algn="l">
+              <a:defRPr sz="1200"/>
+            </a:lvl1pPr>
+          </a:lstStyle>
+          <a:p>
+            <a:endParaRPr lang="de-AT"/>
+          </a:p>
+        </p:txBody>
+      </p:sp>
+      <p:sp>
+        <p:nvSpPr>
+          <p:cNvPr id="3" name="Datumsplatzhalter 2"/>
+          <p:cNvSpPr>
+            <a:spLocks noGrp="1"/>
+          </p:cNvSpPr>
+          <p:nvPr>
+            <p:ph type="dt" idx="1"/>
+          </p:nvPr>
+        </p:nvSpPr>
+        <p:spPr>
+          <a:xfrm>
+            <a:off x="3884613" y="0"/>
+            <a:ext cx="2971800" cy="458788"/>
+          </a:xfrm>
+          <a:prstGeom prst="rect">
+            <a:avLst/>
+          </a:prstGeom>
+        </p:spPr>
+        <p:txBody>
+          <a:bodyPr vert="horz" lIns="91440" tIns="45720" rIns="91440" bIns="45720" rtlCol="0"/>
+          <a:lstStyle>
+            <a:lvl1pPr algn="r">
+              <a:defRPr sz="1200"/>
+            </a:lvl1pPr>
+          </a:lstStyle>
+          <a:p>
+            <a:fld id="{46C2B02B-D0B1-402B-AD15-9AD2711B2FBB}" type="datetimeFigureOut">
+              <a:rPr lang="de-AT" smtClean="0"/>
+              <a:t>01.07.2017</a:t>
+            </a:fld>
+            <a:endParaRPr lang="de-AT"/>
+          </a:p>
+        </p:txBody>
+      </p:sp>
+      <p:sp>
+        <p:nvSpPr>
+          <p:cNvPr id="4" name="Folienbildplatzhalter 3"/>
+          <p:cNvSpPr>
+            <a:spLocks noGrp="1" noRot="1" noChangeAspect="1"/>
+          </p:cNvSpPr>
+          <p:nvPr>
+            <p:ph type="sldImg" idx="2"/>
+          </p:nvPr>
+        </p:nvSpPr>
+        <p:spPr>
+          <a:xfrm>
+            <a:off x="1371600" y="1143000"/>
+            <a:ext cx="4114800" cy="3086100"/>
+          </a:xfrm>
+          <a:prstGeom prst="rect">
+            <a:avLst/>
+          </a:prstGeom>
+          <a:noFill/>
+          <a:ln w="12700">
+            <a:solidFill>
+              <a:prstClr val="black"/>
+            </a:solidFill>
+          </a:ln>
+        </p:spPr>
+        <p:txBody>
+          <a:bodyPr vert="horz" lIns="91440" tIns="45720" rIns="91440" bIns="45720" rtlCol="0" anchor="ctr"/>
+          <a:lstStyle/>
+          <a:p>
+            <a:endParaRPr lang="de-AT"/>
+          </a:p>
+        </p:txBody>
+      </p:sp>
+      <p:sp>
+        <p:nvSpPr>
+          <p:cNvPr id="5" name="Notizenplatzhalter 4"/>
+          <p:cNvSpPr>
+            <a:spLocks noGrp="1"/>
+          </p:cNvSpPr>
+          <p:nvPr>
+            <p:ph type="body" sz="quarter" idx="3"/>
+          </p:nvPr>
+        </p:nvSpPr>
+        <p:spPr>
+          <a:xfrm>
+            <a:off x="685800" y="4400550"/>
+            <a:ext cx="5486400" cy="3600450"/>
+          </a:xfrm>
+          <a:prstGeom prst="rect">
+            <a:avLst/>
+          </a:prstGeom>
+        </p:spPr>
+        <p:txBody>
+          <a:bodyPr vert="horz" lIns="91440" tIns="45720" rIns="91440" bIns="45720" rtlCol="0"/>
+          <a:lstStyle/>
+          <a:p>
+            <a:pPr lvl="0"/>
+            <a:r>
+              <a:rPr lang="de-DE"/>
+              <a:t>Formatvorlagen des Textmasters bearbeiten</a:t>
+            </a:r>
+          </a:p>
+          <a:p>
+            <a:pPr lvl="1"/>
+            <a:r>
+              <a:rPr lang="de-DE"/>
+              <a:t>Zweite Ebene</a:t>
+            </a:r>
+          </a:p>
+          <a:p>
+            <a:pPr lvl="2"/>
+            <a:r>
+              <a:rPr lang="de-DE"/>
+              <a:t>Dritte Ebene</a:t>
+            </a:r>
+          </a:p>
+          <a:p>
+            <a:pPr lvl="3"/>
+            <a:r>
+              <a:rPr lang="de-DE"/>
+              <a:t>Vierte Ebene</a:t>
+            </a:r>
+          </a:p>
+          <a:p>
+            <a:pPr lvl="4"/>
+            <a:r>
+              <a:rPr lang="de-DE"/>
+              <a:t>Fünfte Ebene</a:t>
+            </a:r>
+            <a:endParaRPr lang="de-AT"/>
+          </a:p>
+        </p:txBody>
+      </p:sp>
+      <p:sp>
+        <p:nvSpPr>
+          <p:cNvPr id="6" name="Fußzeilenplatzhalter 5"/>
+          <p:cNvSpPr>
+            <a:spLocks noGrp="1"/>
+          </p:cNvSpPr>
+          <p:nvPr>
+            <p:ph type="ftr" sz="quarter" idx="4"/>
+          </p:nvPr>
+        </p:nvSpPr>
+        <p:spPr>
+          <a:xfrm>
+            <a:off x="0" y="8685213"/>
+            <a:ext cx="2971800" cy="458787"/>
+          </a:xfrm>
+          <a:prstGeom prst="rect">
+            <a:avLst/>
+          </a:prstGeom>
+        </p:spPr>
+        <p:txBody>
+          <a:bodyPr vert="horz" lIns="91440" tIns="45720" rIns="91440" bIns="45720" rtlCol="0" anchor="b"/>
+          <a:lstStyle>
+            <a:lvl1pPr algn="l">
+              <a:defRPr sz="1200"/>
+            </a:lvl1pPr>
+          </a:lstStyle>
+          <a:p>
+            <a:endParaRPr lang="de-AT"/>
+          </a:p>
+        </p:txBody>
+      </p:sp>
+      <p:sp>
+        <p:nvSpPr>
+          <p:cNvPr id="7" name="Foliennummernplatzhalter 6"/>
+          <p:cNvSpPr>
+            <a:spLocks noGrp="1"/>
+          </p:cNvSpPr>
+          <p:nvPr>
+            <p:ph type="sldNum" sz="quarter" idx="5"/>
+          </p:nvPr>
+        </p:nvSpPr>
+        <p:spPr>
+          <a:xfrm>
+            <a:off x="3884613" y="8685213"/>
+            <a:ext cx="2971800" cy="458787"/>
+          </a:xfrm>
+          <a:prstGeom prst="rect">
+            <a:avLst/>
+          </a:prstGeom>
+        </p:spPr>
+        <p:txBody>
+          <a:bodyPr vert="horz" lIns="91440" tIns="45720" rIns="91440" bIns="45720" rtlCol="0" anchor="b"/>
+          <a:lstStyle>
+            <a:lvl1pPr algn="r">
+              <a:defRPr sz="1200"/>
+            </a:lvl1pPr>
+          </a:lstStyle>
+          <a:p>
+            <a:fld id="{3E701269-6027-4AD0-83F4-AE359B76D0DB}" type="slidenum">
+              <a:rPr lang="de-AT" smtClean="0"/>
+              <a:t>‹Nr.›</a:t>
+            </a:fld>
+            <a:endParaRPr lang="de-AT"/>
+          </a:p>
+        </p:txBody>
+      </p:sp>
+    </p:spTree>
+    <p:extLst>
+      <p:ext uri="{BB962C8B-B14F-4D97-AF65-F5344CB8AC3E}">
+        <p14:creationId xmlns:p14="http://schemas.microsoft.com/office/powerpoint/2010/main" val="2341171814"/>
+      </p:ext>
+    </p:extLst>
+  </p:cSld>
+  <p:clrMap bg1="lt1" tx1="dk1" bg2="lt2" tx2="dk2" accent1="accent1" accent2="accent2" accent3="accent3" accent4="accent4" accent5="accent5" accent6="accent6" hlink="hlink" folHlink="folHlink"/>
+  <p:notesStyle>
+    <a:lvl1pPr marL="0" algn="l" defTabSz="914400" rtl="0" eaLnBrk="1" latinLnBrk="0" hangingPunct="1">
+      <a:defRPr sz="1200" kern="1200">
+        <a:solidFill>
+          <a:schemeClr val="tx1"/>
+        </a:solidFill>
+        <a:latin typeface="+mn-lt"/>
+        <a:ea typeface="+mn-ea"/>
+        <a:cs typeface="+mn-cs"/>
+      </a:defRPr>
+    </a:lvl1pPr>
+    <a:lvl2pPr marL="457200" algn="l" defTabSz="914400" rtl="0" eaLnBrk="1" latinLnBrk="0" hangingPunct="1">
+      <a:defRPr sz="1200" kern="1200">
+        <a:solidFill>
+          <a:schemeClr val="tx1"/>
+        </a:solidFill>
+        <a:latin typeface="+mn-lt"/>
+        <a:ea typeface="+mn-ea"/>
+        <a:cs typeface="+mn-cs"/>
+      </a:defRPr>
+    </a:lvl2pPr>
+    <a:lvl3pPr marL="914400" algn="l" defTabSz="914400" rtl="0" eaLnBrk="1" latinLnBrk="0" hangingPunct="1">
+      <a:defRPr sz="1200" kern="1200">
+        <a:solidFill>
+          <a:schemeClr val="tx1"/>
+        </a:solidFill>
+        <a:latin typeface="+mn-lt"/>
+        <a:ea typeface="+mn-ea"/>
+        <a:cs typeface="+mn-cs"/>
+      </a:defRPr>
+    </a:lvl3pPr>
+    <a:lvl4pPr marL="1371600" algn="l" defTabSz="914400" rtl="0" eaLnBrk="1" latinLnBrk="0" hangingPunct="1">
+      <a:defRPr sz="1200" kern="1200">
+        <a:solidFill>
+          <a:schemeClr val="tx1"/>
+        </a:solidFill>
+        <a:latin typeface="+mn-lt"/>
+        <a:ea typeface="+mn-ea"/>
+        <a:cs typeface="+mn-cs"/>
+      </a:defRPr>
+    </a:lvl4pPr>
+    <a:lvl5pPr marL="1828800" algn="l" defTabSz="914400" rtl="0" eaLnBrk="1" latinLnBrk="0" hangingPunct="1">
+      <a:defRPr sz="1200" kern="1200">
+        <a:solidFill>
+          <a:schemeClr val="tx1"/>
+        </a:solidFill>
+        <a:latin typeface="+mn-lt"/>
+        <a:ea typeface="+mn-ea"/>
+        <a:cs typeface="+mn-cs"/>
+      </a:defRPr>
+    </a:lvl5pPr>
+    <a:lvl6pPr marL="2286000" algn="l" defTabSz="914400" rtl="0" eaLnBrk="1" latinLnBrk="0" hangingPunct="1">
+      <a:defRPr sz="1200" kern="1200">
+        <a:solidFill>
+          <a:schemeClr val="tx1"/>
+        </a:solidFill>
+        <a:latin typeface="+mn-lt"/>
+        <a:ea typeface="+mn-ea"/>
+        <a:cs typeface="+mn-cs"/>
+      </a:defRPr>
+    </a:lvl6pPr>
+    <a:lvl7pPr marL="2743200" algn="l" defTabSz="914400" rtl="0" eaLnBrk="1" latinLnBrk="0" hangingPunct="1">
+      <a:defRPr sz="1200" kern="1200">
+        <a:solidFill>
+          <a:schemeClr val="tx1"/>
+        </a:solidFill>
+        <a:latin typeface="+mn-lt"/>
+        <a:ea typeface="+mn-ea"/>
+        <a:cs typeface="+mn-cs"/>
+      </a:defRPr>
+    </a:lvl7pPr>
+    <a:lvl8pPr marL="3200400" algn="l" defTabSz="914400" rtl="0" eaLnBrk="1" latinLnBrk="0" hangingPunct="1">
+      <a:defRPr sz="1200" kern="1200">
+        <a:solidFill>
+          <a:schemeClr val="tx1"/>
+        </a:solidFill>
+        <a:latin typeface="+mn-lt"/>
+        <a:ea typeface="+mn-ea"/>
+        <a:cs typeface="+mn-cs"/>
+      </a:defRPr>
+    </a:lvl8pPr>
+    <a:lvl9pPr marL="3657600" algn="l" defTabSz="914400" rtl="0" eaLnBrk="1" latinLnBrk="0" hangingPunct="1">
+      <a:defRPr sz="1200" kern="1200">
+        <a:solidFill>
+          <a:schemeClr val="tx1"/>
+        </a:solidFill>
+        <a:latin typeface="+mn-lt"/>
+        <a:ea typeface="+mn-ea"/>
+        <a:cs typeface="+mn-cs"/>
+      </a:defRPr>
+    </a:lvl9pPr>
+  </p:notesStyle>
+</p:notesMaster>
 </file>
 
 <file path=ppt/slideLayouts/slideLayout1.xml><?xml version="1.0" encoding="utf-8"?>
@@ -123,54 +508,153 @@
       </p:grpSpPr>
       <p:sp>
         <p:nvSpPr>
-          <p:cNvPr id="2" name="Titel 1"/>
-          <p:cNvSpPr>
-            <a:spLocks noGrp="1"/>
-          </p:cNvSpPr>
-          <p:nvPr>
-            <p:ph type="ctrTitle"/>
-          </p:nvPr>
+          <p:cNvPr id="8" name="Rechteck 7">
+            <a:extLst>
+              <a:ext uri="{FF2B5EF4-FFF2-40B4-BE49-F238E27FC236}">
+                <a16:creationId xmlns:a16="http://schemas.microsoft.com/office/drawing/2014/main" id="{1BABACCB-91B6-4884-B227-E813802E191D}"/>
+              </a:ext>
+            </a:extLst>
+          </p:cNvPr>
+          <p:cNvSpPr/>
+          <p:nvPr userDrawn="1"/>
         </p:nvSpPr>
         <p:spPr>
           <a:xfrm>
-            <a:off x="685800" y="2130425"/>
-            <a:ext cx="7772400" cy="1470025"/>
+            <a:off x="-1512676" y="0"/>
+            <a:ext cx="12169352" cy="6858000"/>
           </a:xfrm>
+          <a:prstGeom prst="rect">
+            <a:avLst/>
+          </a:prstGeom>
+          <a:solidFill>
+            <a:schemeClr val="tx1"/>
+          </a:solidFill>
+          <a:ln>
+            <a:noFill/>
+          </a:ln>
         </p:spPr>
-        <p:txBody>
-          <a:bodyPr/>
-          <a:lstStyle/>
-          <a:p>
-            <a:r>
-              <a:rPr lang="de-DE" smtClean="0"/>
-              <a:t>Titelmasterformat durch Klicken bearbeiten</a:t>
-            </a:r>
-            <a:endParaRPr lang="de-DE"/>
-          </a:p>
-        </p:txBody>
-      </p:sp>
-      <p:sp>
-        <p:nvSpPr>
-          <p:cNvPr id="3" name="Untertitel 2"/>
-          <p:cNvSpPr>
-            <a:spLocks noGrp="1"/>
-          </p:cNvSpPr>
-          <p:nvPr>
-            <p:ph type="subTitle" idx="1"/>
-          </p:nvPr>
-        </p:nvSpPr>
+        <p:style>
+          <a:lnRef idx="2">
+            <a:schemeClr val="accent1">
+              <a:shade val="50000"/>
+            </a:schemeClr>
+          </a:lnRef>
+          <a:fillRef idx="1">
+            <a:schemeClr val="accent1"/>
+          </a:fillRef>
+          <a:effectRef idx="0">
+            <a:schemeClr val="accent1"/>
+          </a:effectRef>
+          <a:fontRef idx="minor">
+            <a:schemeClr val="lt1"/>
+          </a:fontRef>
+        </p:style>
+        <p:txBody>
+          <a:bodyPr rtlCol="0" anchor="ctr"/>
+          <a:lstStyle/>
+          <a:p>
+            <a:pPr algn="ctr"/>
+            <a:endParaRPr lang="de-AT"/>
+          </a:p>
+        </p:txBody>
+      </p:sp>
+      <p:pic>
+        <p:nvPicPr>
+          <p:cNvPr id="7" name="Grafik 6" descr="Ein Bild, das Musik enthält.&#10;&#10;Mit sehr hoher Zuverlässigkeit generierte Beschreibung">
+            <a:extLst>
+              <a:ext uri="{FF2B5EF4-FFF2-40B4-BE49-F238E27FC236}">
+                <a16:creationId xmlns:a16="http://schemas.microsoft.com/office/drawing/2014/main" id="{0971EBAF-D086-44BE-AFB1-0AFCFBDCD5DD}"/>
+              </a:ext>
+            </a:extLst>
+          </p:cNvPr>
+          <p:cNvPicPr>
+            <a:picLocks noChangeAspect="1"/>
+          </p:cNvPicPr>
+          <p:nvPr userDrawn="1"/>
+        </p:nvPicPr>
+        <p:blipFill>
+          <a:blip r:embed="rId2">
+            <a:extLst>
+              <a:ext uri="{28A0092B-C50C-407E-A947-70E740481C1C}">
+                <a14:useLocalDpi xmlns:a14="http://schemas.microsoft.com/office/drawing/2010/main" val="0"/>
+              </a:ext>
+            </a:extLst>
+          </a:blip>
+          <a:stretch>
+            <a:fillRect/>
+          </a:stretch>
+        </p:blipFill>
         <p:spPr>
           <a:xfrm>
-            <a:off x="1371600" y="3886200"/>
-            <a:ext cx="6400800" cy="1752600"/>
+            <a:off x="0" y="0"/>
+            <a:ext cx="9144000" cy="6858000"/>
           </a:xfrm>
+          <a:prstGeom prst="rect">
+            <a:avLst/>
+          </a:prstGeom>
         </p:spPr>
-        <p:txBody>
-          <a:bodyPr/>
+      </p:pic>
+      <p:sp>
+        <p:nvSpPr>
+          <p:cNvPr id="2" name="Titel 1"/>
+          <p:cNvSpPr>
+            <a:spLocks noGrp="1"/>
+          </p:cNvSpPr>
+          <p:nvPr>
+            <p:ph type="ctrTitle"/>
+          </p:nvPr>
+        </p:nvSpPr>
+        <p:spPr>
+          <a:xfrm>
+            <a:off x="2051720" y="1772817"/>
+            <a:ext cx="5112568" cy="2239738"/>
+          </a:xfrm>
+          <a:noFill/>
+        </p:spPr>
+        <p:txBody>
+          <a:bodyPr/>
+          <a:lstStyle>
+            <a:lvl1pPr>
+              <a:defRPr>
+                <a:solidFill>
+                  <a:schemeClr val="bg1"/>
+                </a:solidFill>
+              </a:defRPr>
+            </a:lvl1pPr>
+          </a:lstStyle>
+          <a:p>
+            <a:r>
+              <a:rPr lang="de-DE" dirty="0"/>
+              <a:t>Titelmasterformat durch Klicken bearbeiten</a:t>
+            </a:r>
+          </a:p>
+        </p:txBody>
+      </p:sp>
+      <p:sp>
+        <p:nvSpPr>
+          <p:cNvPr id="3" name="Untertitel 2"/>
+          <p:cNvSpPr>
+            <a:spLocks noGrp="1"/>
+          </p:cNvSpPr>
+          <p:nvPr>
+            <p:ph type="subTitle" idx="1"/>
+          </p:nvPr>
+        </p:nvSpPr>
+        <p:spPr>
+          <a:xfrm>
+            <a:off x="2051720" y="4149080"/>
+            <a:ext cx="5112568" cy="648072"/>
+          </a:xfrm>
+          <a:noFill/>
+        </p:spPr>
+        <p:txBody>
+          <a:bodyPr>
+            <a:noAutofit/>
+          </a:bodyPr>
           <a:lstStyle>
             <a:lvl1pPr marL="0" indent="0" algn="ctr">
               <a:buNone/>
-              <a:defRPr>
+              <a:defRPr sz="2400">
                 <a:solidFill>
                   <a:schemeClr val="tx1">
                     <a:tint val="75000"/>
@@ -261,31 +745,36 @@
           </a:lstStyle>
           <a:p>
             <a:r>
+              <a:rPr lang="de-DE"/>
+              <a:t>Formatvorlage des Untertitelmasters durch Klicken bearbeiten</a:t>
+            </a:r>
+          </a:p>
+        </p:txBody>
+      </p:sp>
+      <p:sp>
+        <p:nvSpPr>
+          <p:cNvPr id="4" name="Datumsplatzhalter 3"/>
+          <p:cNvSpPr>
+            <a:spLocks noGrp="1"/>
+          </p:cNvSpPr>
+          <p:nvPr>
+            <p:ph type="dt" sz="half" idx="10"/>
+          </p:nvPr>
+        </p:nvSpPr>
+        <p:spPr>
+          <a:xfrm>
+            <a:off x="457200" y="6356350"/>
+            <a:ext cx="2133600" cy="365125"/>
+          </a:xfrm>
+          <a:noFill/>
+        </p:spPr>
+        <p:txBody>
+          <a:bodyPr/>
+          <a:lstStyle/>
+          <a:p>
+            <a:fld id="{154BAE7E-5592-4324-98B0-A02BD84EF6BB}" type="datetime1">
               <a:rPr lang="de-DE" smtClean="0"/>
-              <a:t>Formatvorlage des Untertitelmasters durch Klicken bearbeiten</a:t>
-            </a:r>
-            <a:endParaRPr lang="de-DE"/>
-          </a:p>
-        </p:txBody>
-      </p:sp>
-      <p:sp>
-        <p:nvSpPr>
-          <p:cNvPr id="4" name="Datumsplatzhalter 3"/>
-          <p:cNvSpPr>
-            <a:spLocks noGrp="1"/>
-          </p:cNvSpPr>
-          <p:nvPr>
-            <p:ph type="dt" sz="half" idx="10"/>
-          </p:nvPr>
-        </p:nvSpPr>
-        <p:spPr/>
-        <p:txBody>
-          <a:bodyPr/>
-          <a:lstStyle/>
-          <a:p>
-            <a:fld id="{1BA50D42-C9CD-4801-B293-61D1F53EC57E}" type="datetimeFigureOut">
-              <a:rPr lang="de-DE" smtClean="0"/>
-              <a:t>14.09.2006</a:t>
+              <a:t>01.07.2017</a:t>
             </a:fld>
             <a:endParaRPr lang="de-DE"/>
           </a:p>
@@ -301,12 +790,21 @@
             <p:ph type="ftr" sz="quarter" idx="11"/>
           </p:nvPr>
         </p:nvSpPr>
-        <p:spPr/>
-        <p:txBody>
-          <a:bodyPr/>
-          <a:lstStyle/>
-          <a:p>
-            <a:endParaRPr lang="de-DE"/>
+        <p:spPr>
+          <a:xfrm>
+            <a:off x="3124200" y="6356350"/>
+            <a:ext cx="2895600" cy="365125"/>
+          </a:xfrm>
+          <a:noFill/>
+        </p:spPr>
+        <p:txBody>
+          <a:bodyPr/>
+          <a:lstStyle/>
+          <a:p>
+            <a:r>
+              <a:rPr lang="de-DE"/>
+              <a:t>ElementTD</a:t>
+            </a:r>
           </a:p>
         </p:txBody>
       </p:sp>
@@ -320,7 +818,13 @@
             <p:ph type="sldNum" sz="quarter" idx="12"/>
           </p:nvPr>
         </p:nvSpPr>
-        <p:spPr/>
+        <p:spPr>
+          <a:xfrm>
+            <a:off x="6553200" y="6356350"/>
+            <a:ext cx="2133600" cy="365125"/>
+          </a:xfrm>
+          <a:noFill/>
+        </p:spPr>
         <p:txBody>
           <a:bodyPr/>
           <a:lstStyle/>
@@ -374,83 +878,81 @@
           <a:lstStyle/>
           <a:p>
             <a:r>
+              <a:rPr lang="de-DE"/>
+              <a:t>Titelmasterformat durch Klicken bearbeiten</a:t>
+            </a:r>
+          </a:p>
+        </p:txBody>
+      </p:sp>
+      <p:sp>
+        <p:nvSpPr>
+          <p:cNvPr id="3" name="Vertikaler Textplatzhalter 2"/>
+          <p:cNvSpPr>
+            <a:spLocks noGrp="1"/>
+          </p:cNvSpPr>
+          <p:nvPr>
+            <p:ph type="body" orient="vert" idx="1"/>
+          </p:nvPr>
+        </p:nvSpPr>
+        <p:spPr/>
+        <p:txBody>
+          <a:bodyPr vert="eaVert"/>
+          <a:lstStyle/>
+          <a:p>
+            <a:pPr lvl="0"/>
+            <a:r>
+              <a:rPr lang="de-DE"/>
+              <a:t>Textmasterformate durch Klicken bearbeiten</a:t>
+            </a:r>
+          </a:p>
+          <a:p>
+            <a:pPr lvl="1"/>
+            <a:r>
+              <a:rPr lang="de-DE"/>
+              <a:t>Zweite Ebene</a:t>
+            </a:r>
+          </a:p>
+          <a:p>
+            <a:pPr lvl="2"/>
+            <a:r>
+              <a:rPr lang="de-DE"/>
+              <a:t>Dritte Ebene</a:t>
+            </a:r>
+          </a:p>
+          <a:p>
+            <a:pPr lvl="3"/>
+            <a:r>
+              <a:rPr lang="de-DE"/>
+              <a:t>Vierte Ebene</a:t>
+            </a:r>
+          </a:p>
+          <a:p>
+            <a:pPr lvl="4"/>
+            <a:r>
+              <a:rPr lang="de-DE"/>
+              <a:t>Fünfte Ebene</a:t>
+            </a:r>
+          </a:p>
+        </p:txBody>
+      </p:sp>
+      <p:sp>
+        <p:nvSpPr>
+          <p:cNvPr id="4" name="Datumsplatzhalter 3"/>
+          <p:cNvSpPr>
+            <a:spLocks noGrp="1"/>
+          </p:cNvSpPr>
+          <p:nvPr>
+            <p:ph type="dt" sz="half" idx="10"/>
+          </p:nvPr>
+        </p:nvSpPr>
+        <p:spPr/>
+        <p:txBody>
+          <a:bodyPr/>
+          <a:lstStyle/>
+          <a:p>
+            <a:fld id="{149E5939-272F-4759-A2BF-C86F5993F02B}" type="datetime1">
               <a:rPr lang="de-DE" smtClean="0"/>
-              <a:t>Titelmasterformat durch Klicken bearbeiten</a:t>
-            </a:r>
-            <a:endParaRPr lang="de-DE"/>
-          </a:p>
-        </p:txBody>
-      </p:sp>
-      <p:sp>
-        <p:nvSpPr>
-          <p:cNvPr id="3" name="Vertikaler Textplatzhalter 2"/>
-          <p:cNvSpPr>
-            <a:spLocks noGrp="1"/>
-          </p:cNvSpPr>
-          <p:nvPr>
-            <p:ph type="body" orient="vert" idx="1"/>
-          </p:nvPr>
-        </p:nvSpPr>
-        <p:spPr/>
-        <p:txBody>
-          <a:bodyPr vert="eaVert"/>
-          <a:lstStyle/>
-          <a:p>
-            <a:pPr lvl="0"/>
-            <a:r>
-              <a:rPr lang="de-DE" smtClean="0"/>
-              <a:t>Textmasterformate durch Klicken bearbeiten</a:t>
-            </a:r>
-          </a:p>
-          <a:p>
-            <a:pPr lvl="1"/>
-            <a:r>
-              <a:rPr lang="de-DE" smtClean="0"/>
-              <a:t>Zweite Ebene</a:t>
-            </a:r>
-          </a:p>
-          <a:p>
-            <a:pPr lvl="2"/>
-            <a:r>
-              <a:rPr lang="de-DE" smtClean="0"/>
-              <a:t>Dritte Ebene</a:t>
-            </a:r>
-          </a:p>
-          <a:p>
-            <a:pPr lvl="3"/>
-            <a:r>
-              <a:rPr lang="de-DE" smtClean="0"/>
-              <a:t>Vierte Ebene</a:t>
-            </a:r>
-          </a:p>
-          <a:p>
-            <a:pPr lvl="4"/>
-            <a:r>
-              <a:rPr lang="de-DE" smtClean="0"/>
-              <a:t>Fünfte Ebene</a:t>
-            </a:r>
-            <a:endParaRPr lang="de-DE"/>
-          </a:p>
-        </p:txBody>
-      </p:sp>
-      <p:sp>
-        <p:nvSpPr>
-          <p:cNvPr id="4" name="Datumsplatzhalter 3"/>
-          <p:cNvSpPr>
-            <a:spLocks noGrp="1"/>
-          </p:cNvSpPr>
-          <p:nvPr>
-            <p:ph type="dt" sz="half" idx="10"/>
-          </p:nvPr>
-        </p:nvSpPr>
-        <p:spPr/>
-        <p:txBody>
-          <a:bodyPr/>
-          <a:lstStyle/>
-          <a:p>
-            <a:fld id="{1BA50D42-C9CD-4801-B293-61D1F53EC57E}" type="datetimeFigureOut">
-              <a:rPr lang="de-DE" smtClean="0"/>
-              <a:t>14.09.2006</a:t>
+              <a:t>01.07.2017</a:t>
             </a:fld>
             <a:endParaRPr lang="de-DE"/>
           </a:p>
@@ -471,7 +973,10 @@
           <a:bodyPr/>
           <a:lstStyle/>
           <a:p>
-            <a:endParaRPr lang="de-DE"/>
+            <a:r>
+              <a:rPr lang="de-DE"/>
+              <a:t>ElementTD</a:t>
+            </a:r>
           </a:p>
         </p:txBody>
       </p:sp>
@@ -544,10 +1049,9 @@
           <a:lstStyle/>
           <a:p>
             <a:r>
-              <a:rPr lang="de-DE" smtClean="0"/>
+              <a:rPr lang="de-DE"/>
               <a:t>Titel durch Klicken hinzufügen</a:t>
             </a:r>
-            <a:endParaRPr lang="de-DE"/>
           </a:p>
         </p:txBody>
       </p:sp>
@@ -573,59 +1077,58 @@
           <a:p>
             <a:pPr lvl="0"/>
             <a:r>
+              <a:rPr lang="de-DE"/>
+              <a:t>Textmasterformate durch Klicken bearbeiten</a:t>
+            </a:r>
+          </a:p>
+          <a:p>
+            <a:pPr lvl="1"/>
+            <a:r>
+              <a:rPr lang="de-DE"/>
+              <a:t>Zweite Ebene</a:t>
+            </a:r>
+          </a:p>
+          <a:p>
+            <a:pPr lvl="2"/>
+            <a:r>
+              <a:rPr lang="de-DE"/>
+              <a:t>Dritte Ebene</a:t>
+            </a:r>
+          </a:p>
+          <a:p>
+            <a:pPr lvl="3"/>
+            <a:r>
+              <a:rPr lang="de-DE"/>
+              <a:t>Vierte Ebene</a:t>
+            </a:r>
+          </a:p>
+          <a:p>
+            <a:pPr lvl="4"/>
+            <a:r>
+              <a:rPr lang="de-DE"/>
+              <a:t>Fünfte Ebene</a:t>
+            </a:r>
+          </a:p>
+        </p:txBody>
+      </p:sp>
+      <p:sp>
+        <p:nvSpPr>
+          <p:cNvPr id="4" name="Datumsplatzhalter 3"/>
+          <p:cNvSpPr>
+            <a:spLocks noGrp="1"/>
+          </p:cNvSpPr>
+          <p:nvPr>
+            <p:ph type="dt" sz="half" idx="10"/>
+          </p:nvPr>
+        </p:nvSpPr>
+        <p:spPr/>
+        <p:txBody>
+          <a:bodyPr/>
+          <a:lstStyle/>
+          <a:p>
+            <a:fld id="{954D2159-BB7A-45BA-96F9-E016371DC7CC}" type="datetime1">
               <a:rPr lang="de-DE" smtClean="0"/>
-              <a:t>Textmasterformate durch Klicken bearbeiten</a:t>
-            </a:r>
-          </a:p>
-          <a:p>
-            <a:pPr lvl="1"/>
-            <a:r>
-              <a:rPr lang="de-DE" smtClean="0"/>
-              <a:t>Zweite Ebene</a:t>
-            </a:r>
-          </a:p>
-          <a:p>
-            <a:pPr lvl="2"/>
-            <a:r>
-              <a:rPr lang="de-DE" smtClean="0"/>
-              <a:t>Dritte Ebene</a:t>
-            </a:r>
-          </a:p>
-          <a:p>
-            <a:pPr lvl="3"/>
-            <a:r>
-              <a:rPr lang="de-DE" smtClean="0"/>
-              <a:t>Vierte Ebene</a:t>
-            </a:r>
-          </a:p>
-          <a:p>
-            <a:pPr lvl="4"/>
-            <a:r>
-              <a:rPr lang="de-DE" smtClean="0"/>
-              <a:t>Fünfte Ebene</a:t>
-            </a:r>
-            <a:endParaRPr lang="de-DE"/>
-          </a:p>
-        </p:txBody>
-      </p:sp>
-      <p:sp>
-        <p:nvSpPr>
-          <p:cNvPr id="4" name="Datumsplatzhalter 3"/>
-          <p:cNvSpPr>
-            <a:spLocks noGrp="1"/>
-          </p:cNvSpPr>
-          <p:nvPr>
-            <p:ph type="dt" sz="half" idx="10"/>
-          </p:nvPr>
-        </p:nvSpPr>
-        <p:spPr/>
-        <p:txBody>
-          <a:bodyPr/>
-          <a:lstStyle/>
-          <a:p>
-            <a:fld id="{1BA50D42-C9CD-4801-B293-61D1F53EC57E}" type="datetimeFigureOut">
-              <a:rPr lang="de-DE" smtClean="0"/>
-              <a:t>14.09.2006</a:t>
+              <a:t>01.07.2017</a:t>
             </a:fld>
             <a:endParaRPr lang="de-DE"/>
           </a:p>
@@ -646,7 +1149,10 @@
           <a:bodyPr/>
           <a:lstStyle/>
           <a:p>
-            <a:endParaRPr lang="de-DE"/>
+            <a:r>
+              <a:rPr lang="de-DE"/>
+              <a:t>ElementTD</a:t>
+            </a:r>
           </a:p>
         </p:txBody>
       </p:sp>
@@ -714,83 +1220,81 @@
           <a:lstStyle/>
           <a:p>
             <a:r>
+              <a:rPr lang="de-DE"/>
+              <a:t>Titelmasterformat durch Klicken bearbeiten</a:t>
+            </a:r>
+          </a:p>
+        </p:txBody>
+      </p:sp>
+      <p:sp>
+        <p:nvSpPr>
+          <p:cNvPr id="3" name="Inhaltsplatzhalter 2"/>
+          <p:cNvSpPr>
+            <a:spLocks noGrp="1"/>
+          </p:cNvSpPr>
+          <p:nvPr>
+            <p:ph idx="1"/>
+          </p:nvPr>
+        </p:nvSpPr>
+        <p:spPr/>
+        <p:txBody>
+          <a:bodyPr/>
+          <a:lstStyle/>
+          <a:p>
+            <a:pPr lvl="0"/>
+            <a:r>
+              <a:rPr lang="de-DE"/>
+              <a:t>Textmasterformate durch Klicken bearbeiten</a:t>
+            </a:r>
+          </a:p>
+          <a:p>
+            <a:pPr lvl="1"/>
+            <a:r>
+              <a:rPr lang="de-DE"/>
+              <a:t>Zweite Ebene</a:t>
+            </a:r>
+          </a:p>
+          <a:p>
+            <a:pPr lvl="2"/>
+            <a:r>
+              <a:rPr lang="de-DE"/>
+              <a:t>Dritte Ebene</a:t>
+            </a:r>
+          </a:p>
+          <a:p>
+            <a:pPr lvl="3"/>
+            <a:r>
+              <a:rPr lang="de-DE"/>
+              <a:t>Vierte Ebene</a:t>
+            </a:r>
+          </a:p>
+          <a:p>
+            <a:pPr lvl="4"/>
+            <a:r>
+              <a:rPr lang="de-DE"/>
+              <a:t>Fünfte Ebene</a:t>
+            </a:r>
+          </a:p>
+        </p:txBody>
+      </p:sp>
+      <p:sp>
+        <p:nvSpPr>
+          <p:cNvPr id="4" name="Datumsplatzhalter 3"/>
+          <p:cNvSpPr>
+            <a:spLocks noGrp="1"/>
+          </p:cNvSpPr>
+          <p:nvPr>
+            <p:ph type="dt" sz="half" idx="10"/>
+          </p:nvPr>
+        </p:nvSpPr>
+        <p:spPr/>
+        <p:txBody>
+          <a:bodyPr/>
+          <a:lstStyle/>
+          <a:p>
+            <a:fld id="{D0495679-6854-4CEB-AB4A-7941CB807E4C}" type="datetime1">
               <a:rPr lang="de-DE" smtClean="0"/>
-              <a:t>Titelmasterformat durch Klicken bearbeiten</a:t>
-            </a:r>
-            <a:endParaRPr lang="de-DE"/>
-          </a:p>
-        </p:txBody>
-      </p:sp>
-      <p:sp>
-        <p:nvSpPr>
-          <p:cNvPr id="3" name="Inhaltsplatzhalter 2"/>
-          <p:cNvSpPr>
-            <a:spLocks noGrp="1"/>
-          </p:cNvSpPr>
-          <p:nvPr>
-            <p:ph idx="1"/>
-          </p:nvPr>
-        </p:nvSpPr>
-        <p:spPr/>
-        <p:txBody>
-          <a:bodyPr/>
-          <a:lstStyle/>
-          <a:p>
-            <a:pPr lvl="0"/>
-            <a:r>
-              <a:rPr lang="de-DE" smtClean="0"/>
-              <a:t>Textmasterformate durch Klicken bearbeiten</a:t>
-            </a:r>
-          </a:p>
-          <a:p>
-            <a:pPr lvl="1"/>
-            <a:r>
-              <a:rPr lang="de-DE" smtClean="0"/>
-              <a:t>Zweite Ebene</a:t>
-            </a:r>
-          </a:p>
-          <a:p>
-            <a:pPr lvl="2"/>
-            <a:r>
-              <a:rPr lang="de-DE" smtClean="0"/>
-              <a:t>Dritte Ebene</a:t>
-            </a:r>
-          </a:p>
-          <a:p>
-            <a:pPr lvl="3"/>
-            <a:r>
-              <a:rPr lang="de-DE" smtClean="0"/>
-              <a:t>Vierte Ebene</a:t>
-            </a:r>
-          </a:p>
-          <a:p>
-            <a:pPr lvl="4"/>
-            <a:r>
-              <a:rPr lang="de-DE" smtClean="0"/>
-              <a:t>Fünfte Ebene</a:t>
-            </a:r>
-            <a:endParaRPr lang="de-DE"/>
-          </a:p>
-        </p:txBody>
-      </p:sp>
-      <p:sp>
-        <p:nvSpPr>
-          <p:cNvPr id="4" name="Datumsplatzhalter 3"/>
-          <p:cNvSpPr>
-            <a:spLocks noGrp="1"/>
-          </p:cNvSpPr>
-          <p:nvPr>
-            <p:ph type="dt" sz="half" idx="10"/>
-          </p:nvPr>
-        </p:nvSpPr>
-        <p:spPr/>
-        <p:txBody>
-          <a:bodyPr/>
-          <a:lstStyle/>
-          <a:p>
-            <a:fld id="{1BA50D42-C9CD-4801-B293-61D1F53EC57E}" type="datetimeFigureOut">
-              <a:rPr lang="de-DE" smtClean="0"/>
-              <a:t>14.09.2006</a:t>
+              <a:t>01.07.2017</a:t>
             </a:fld>
             <a:endParaRPr lang="de-DE"/>
           </a:p>
@@ -811,7 +1315,10 @@
           <a:bodyPr/>
           <a:lstStyle/>
           <a:p>
-            <a:endParaRPr lang="de-DE"/>
+            <a:r>
+              <a:rPr lang="de-DE"/>
+              <a:t>ElementTD</a:t>
+            </a:r>
           </a:p>
         </p:txBody>
       </p:sp>
@@ -888,10 +1395,9 @@
           </a:lstStyle>
           <a:p>
             <a:r>
-              <a:rPr lang="de-DE" smtClean="0"/>
+              <a:rPr lang="de-DE"/>
               <a:t>Titelmasterformat durch Klicken bearbeiten</a:t>
             </a:r>
-            <a:endParaRPr lang="de-DE"/>
           </a:p>
         </p:txBody>
       </p:sp>
@@ -1008,30 +1514,30 @@
           <a:p>
             <a:pPr lvl="0"/>
             <a:r>
+              <a:rPr lang="de-DE"/>
+              <a:t>Textmasterformate durch Klicken bearbeiten</a:t>
+            </a:r>
+          </a:p>
+        </p:txBody>
+      </p:sp>
+      <p:sp>
+        <p:nvSpPr>
+          <p:cNvPr id="4" name="Datumsplatzhalter 3"/>
+          <p:cNvSpPr>
+            <a:spLocks noGrp="1"/>
+          </p:cNvSpPr>
+          <p:nvPr>
+            <p:ph type="dt" sz="half" idx="10"/>
+          </p:nvPr>
+        </p:nvSpPr>
+        <p:spPr/>
+        <p:txBody>
+          <a:bodyPr/>
+          <a:lstStyle/>
+          <a:p>
+            <a:fld id="{C9FD33F6-9596-4B42-B111-E507BE577142}" type="datetime1">
               <a:rPr lang="de-DE" smtClean="0"/>
-              <a:t>Textmasterformate durch Klicken bearbeiten</a:t>
-            </a:r>
-          </a:p>
-        </p:txBody>
-      </p:sp>
-      <p:sp>
-        <p:nvSpPr>
-          <p:cNvPr id="4" name="Datumsplatzhalter 3"/>
-          <p:cNvSpPr>
-            <a:spLocks noGrp="1"/>
-          </p:cNvSpPr>
-          <p:nvPr>
-            <p:ph type="dt" sz="half" idx="10"/>
-          </p:nvPr>
-        </p:nvSpPr>
-        <p:spPr/>
-        <p:txBody>
-          <a:bodyPr/>
-          <a:lstStyle/>
-          <a:p>
-            <a:fld id="{1BA50D42-C9CD-4801-B293-61D1F53EC57E}" type="datetimeFigureOut">
-              <a:rPr lang="de-DE" smtClean="0"/>
-              <a:t>14.09.2006</a:t>
+              <a:t>01.07.2017</a:t>
             </a:fld>
             <a:endParaRPr lang="de-DE"/>
           </a:p>
@@ -1052,7 +1558,10 @@
           <a:bodyPr/>
           <a:lstStyle/>
           <a:p>
-            <a:endParaRPr lang="de-DE"/>
+            <a:r>
+              <a:rPr lang="de-DE"/>
+              <a:t>ElementTD</a:t>
+            </a:r>
           </a:p>
         </p:txBody>
       </p:sp>
@@ -1120,10 +1629,9 @@
           <a:lstStyle/>
           <a:p>
             <a:r>
-              <a:rPr lang="de-DE" smtClean="0"/>
+              <a:rPr lang="de-DE"/>
               <a:t>Titelmasterformat durch Klicken bearbeiten</a:t>
             </a:r>
-            <a:endParaRPr lang="de-DE"/>
           </a:p>
         </p:txBody>
       </p:sp>
@@ -1177,38 +1685,37 @@
           <a:p>
             <a:pPr lvl="0"/>
             <a:r>
-              <a:rPr lang="de-DE" smtClean="0"/>
+              <a:rPr lang="de-DE"/>
               <a:t>Textmasterformate durch Klicken bearbeiten</a:t>
             </a:r>
           </a:p>
           <a:p>
             <a:pPr lvl="1"/>
             <a:r>
-              <a:rPr lang="de-DE" smtClean="0"/>
+              <a:rPr lang="de-DE"/>
               <a:t>Zweite Ebene</a:t>
             </a:r>
           </a:p>
           <a:p>
             <a:pPr lvl="2"/>
             <a:r>
-              <a:rPr lang="de-DE" smtClean="0"/>
+              <a:rPr lang="de-DE"/>
               <a:t>Dritte Ebene</a:t>
             </a:r>
           </a:p>
           <a:p>
             <a:pPr lvl="3"/>
             <a:r>
-              <a:rPr lang="de-DE" smtClean="0"/>
+              <a:rPr lang="de-DE"/>
               <a:t>Vierte Ebene</a:t>
             </a:r>
           </a:p>
           <a:p>
             <a:pPr lvl="4"/>
             <a:r>
-              <a:rPr lang="de-DE" smtClean="0"/>
+              <a:rPr lang="de-DE"/>
               <a:t>Fünfte Ebene</a:t>
             </a:r>
-            <a:endParaRPr lang="de-DE"/>
           </a:p>
         </p:txBody>
       </p:sp>
@@ -1262,59 +1769,58 @@
           <a:p>
             <a:pPr lvl="0"/>
             <a:r>
+              <a:rPr lang="de-DE"/>
+              <a:t>Textmasterformate durch Klicken bearbeiten</a:t>
+            </a:r>
+          </a:p>
+          <a:p>
+            <a:pPr lvl="1"/>
+            <a:r>
+              <a:rPr lang="de-DE"/>
+              <a:t>Zweite Ebene</a:t>
+            </a:r>
+          </a:p>
+          <a:p>
+            <a:pPr lvl="2"/>
+            <a:r>
+              <a:rPr lang="de-DE"/>
+              <a:t>Dritte Ebene</a:t>
+            </a:r>
+          </a:p>
+          <a:p>
+            <a:pPr lvl="3"/>
+            <a:r>
+              <a:rPr lang="de-DE"/>
+              <a:t>Vierte Ebene</a:t>
+            </a:r>
+          </a:p>
+          <a:p>
+            <a:pPr lvl="4"/>
+            <a:r>
+              <a:rPr lang="de-DE"/>
+              <a:t>Fünfte Ebene</a:t>
+            </a:r>
+          </a:p>
+        </p:txBody>
+      </p:sp>
+      <p:sp>
+        <p:nvSpPr>
+          <p:cNvPr id="5" name="Datumsplatzhalter 4"/>
+          <p:cNvSpPr>
+            <a:spLocks noGrp="1"/>
+          </p:cNvSpPr>
+          <p:nvPr>
+            <p:ph type="dt" sz="half" idx="10"/>
+          </p:nvPr>
+        </p:nvSpPr>
+        <p:spPr/>
+        <p:txBody>
+          <a:bodyPr/>
+          <a:lstStyle/>
+          <a:p>
+            <a:fld id="{DC0F5FB0-7DC9-4C66-B7EF-2A84AA2093B1}" type="datetime1">
               <a:rPr lang="de-DE" smtClean="0"/>
-              <a:t>Textmasterformate durch Klicken bearbeiten</a:t>
-            </a:r>
-          </a:p>
-          <a:p>
-            <a:pPr lvl="1"/>
-            <a:r>
-              <a:rPr lang="de-DE" smtClean="0"/>
-              <a:t>Zweite Ebene</a:t>
-            </a:r>
-          </a:p>
-          <a:p>
-            <a:pPr lvl="2"/>
-            <a:r>
-              <a:rPr lang="de-DE" smtClean="0"/>
-              <a:t>Dritte Ebene</a:t>
-            </a:r>
-          </a:p>
-          <a:p>
-            <a:pPr lvl="3"/>
-            <a:r>
-              <a:rPr lang="de-DE" smtClean="0"/>
-              <a:t>Vierte Ebene</a:t>
-            </a:r>
-          </a:p>
-          <a:p>
-            <a:pPr lvl="4"/>
-            <a:r>
-              <a:rPr lang="de-DE" smtClean="0"/>
-              <a:t>Fünfte Ebene</a:t>
-            </a:r>
-            <a:endParaRPr lang="de-DE"/>
-          </a:p>
-        </p:txBody>
-      </p:sp>
-      <p:sp>
-        <p:nvSpPr>
-          <p:cNvPr id="5" name="Datumsplatzhalter 4"/>
-          <p:cNvSpPr>
-            <a:spLocks noGrp="1"/>
-          </p:cNvSpPr>
-          <p:nvPr>
-            <p:ph type="dt" sz="half" idx="10"/>
-          </p:nvPr>
-        </p:nvSpPr>
-        <p:spPr/>
-        <p:txBody>
-          <a:bodyPr/>
-          <a:lstStyle/>
-          <a:p>
-            <a:fld id="{1BA50D42-C9CD-4801-B293-61D1F53EC57E}" type="datetimeFigureOut">
-              <a:rPr lang="de-DE" smtClean="0"/>
-              <a:t>14.09.2006</a:t>
+              <a:t>01.07.2017</a:t>
             </a:fld>
             <a:endParaRPr lang="de-DE"/>
           </a:p>
@@ -1335,7 +1841,10 @@
           <a:bodyPr/>
           <a:lstStyle/>
           <a:p>
-            <a:endParaRPr lang="de-DE"/>
+            <a:r>
+              <a:rPr lang="de-DE"/>
+              <a:t>ElementTD</a:t>
+            </a:r>
           </a:p>
         </p:txBody>
       </p:sp>
@@ -1407,10 +1916,9 @@
           </a:lstStyle>
           <a:p>
             <a:r>
-              <a:rPr lang="de-DE" smtClean="0"/>
+              <a:rPr lang="de-DE"/>
               <a:t>Titelmasterformat durch Klicken bearbeiten</a:t>
             </a:r>
-            <a:endParaRPr lang="de-DE"/>
           </a:p>
         </p:txBody>
       </p:sp>
@@ -1473,7 +1981,7 @@
           <a:p>
             <a:pPr lvl="0"/>
             <a:r>
-              <a:rPr lang="de-DE" smtClean="0"/>
+              <a:rPr lang="de-DE"/>
               <a:t>Textmasterformate durch Klicken bearbeiten</a:t>
             </a:r>
           </a:p>
@@ -1529,38 +2037,37 @@
           <a:p>
             <a:pPr lvl="0"/>
             <a:r>
-              <a:rPr lang="de-DE" smtClean="0"/>
+              <a:rPr lang="de-DE"/>
               <a:t>Textmasterformate durch Klicken bearbeiten</a:t>
             </a:r>
           </a:p>
           <a:p>
             <a:pPr lvl="1"/>
             <a:r>
-              <a:rPr lang="de-DE" smtClean="0"/>
+              <a:rPr lang="de-DE"/>
               <a:t>Zweite Ebene</a:t>
             </a:r>
           </a:p>
           <a:p>
             <a:pPr lvl="2"/>
             <a:r>
-              <a:rPr lang="de-DE" smtClean="0"/>
+              <a:rPr lang="de-DE"/>
               <a:t>Dritte Ebene</a:t>
             </a:r>
           </a:p>
           <a:p>
             <a:pPr lvl="3"/>
             <a:r>
-              <a:rPr lang="de-DE" smtClean="0"/>
+              <a:rPr lang="de-DE"/>
               <a:t>Vierte Ebene</a:t>
             </a:r>
           </a:p>
           <a:p>
             <a:pPr lvl="4"/>
             <a:r>
-              <a:rPr lang="de-DE" smtClean="0"/>
+              <a:rPr lang="de-DE"/>
               <a:t>Fünfte Ebene</a:t>
             </a:r>
-            <a:endParaRPr lang="de-DE"/>
           </a:p>
         </p:txBody>
       </p:sp>
@@ -1623,7 +2130,7 @@
           <a:p>
             <a:pPr lvl="0"/>
             <a:r>
-              <a:rPr lang="de-DE" smtClean="0"/>
+              <a:rPr lang="de-DE"/>
               <a:t>Textmasterformate durch Klicken bearbeiten</a:t>
             </a:r>
           </a:p>
@@ -1679,59 +2186,58 @@
           <a:p>
             <a:pPr lvl="0"/>
             <a:r>
+              <a:rPr lang="de-DE"/>
+              <a:t>Textmasterformate durch Klicken bearbeiten</a:t>
+            </a:r>
+          </a:p>
+          <a:p>
+            <a:pPr lvl="1"/>
+            <a:r>
+              <a:rPr lang="de-DE"/>
+              <a:t>Zweite Ebene</a:t>
+            </a:r>
+          </a:p>
+          <a:p>
+            <a:pPr lvl="2"/>
+            <a:r>
+              <a:rPr lang="de-DE"/>
+              <a:t>Dritte Ebene</a:t>
+            </a:r>
+          </a:p>
+          <a:p>
+            <a:pPr lvl="3"/>
+            <a:r>
+              <a:rPr lang="de-DE"/>
+              <a:t>Vierte Ebene</a:t>
+            </a:r>
+          </a:p>
+          <a:p>
+            <a:pPr lvl="4"/>
+            <a:r>
+              <a:rPr lang="de-DE"/>
+              <a:t>Fünfte Ebene</a:t>
+            </a:r>
+          </a:p>
+        </p:txBody>
+      </p:sp>
+      <p:sp>
+        <p:nvSpPr>
+          <p:cNvPr id="7" name="Datumsplatzhalter 6"/>
+          <p:cNvSpPr>
+            <a:spLocks noGrp="1"/>
+          </p:cNvSpPr>
+          <p:nvPr>
+            <p:ph type="dt" sz="half" idx="10"/>
+          </p:nvPr>
+        </p:nvSpPr>
+        <p:spPr/>
+        <p:txBody>
+          <a:bodyPr/>
+          <a:lstStyle/>
+          <a:p>
+            <a:fld id="{C44DDAA9-F232-4B8A-A772-1EDD6590F997}" type="datetime1">
               <a:rPr lang="de-DE" smtClean="0"/>
-              <a:t>Textmasterformate durch Klicken bearbeiten</a:t>
-            </a:r>
-          </a:p>
-          <a:p>
-            <a:pPr lvl="1"/>
-            <a:r>
-              <a:rPr lang="de-DE" smtClean="0"/>
-              <a:t>Zweite Ebene</a:t>
-            </a:r>
-          </a:p>
-          <a:p>
-            <a:pPr lvl="2"/>
-            <a:r>
-              <a:rPr lang="de-DE" smtClean="0"/>
-              <a:t>Dritte Ebene</a:t>
-            </a:r>
-          </a:p>
-          <a:p>
-            <a:pPr lvl="3"/>
-            <a:r>
-              <a:rPr lang="de-DE" smtClean="0"/>
-              <a:t>Vierte Ebene</a:t>
-            </a:r>
-          </a:p>
-          <a:p>
-            <a:pPr lvl="4"/>
-            <a:r>
-              <a:rPr lang="de-DE" smtClean="0"/>
-              <a:t>Fünfte Ebene</a:t>
-            </a:r>
-            <a:endParaRPr lang="de-DE"/>
-          </a:p>
-        </p:txBody>
-      </p:sp>
-      <p:sp>
-        <p:nvSpPr>
-          <p:cNvPr id="7" name="Datumsplatzhalter 6"/>
-          <p:cNvSpPr>
-            <a:spLocks noGrp="1"/>
-          </p:cNvSpPr>
-          <p:nvPr>
-            <p:ph type="dt" sz="half" idx="10"/>
-          </p:nvPr>
-        </p:nvSpPr>
-        <p:spPr/>
-        <p:txBody>
-          <a:bodyPr/>
-          <a:lstStyle/>
-          <a:p>
-            <a:fld id="{1BA50D42-C9CD-4801-B293-61D1F53EC57E}" type="datetimeFigureOut">
-              <a:rPr lang="de-DE" smtClean="0"/>
-              <a:t>14.09.2006</a:t>
+              <a:t>01.07.2017</a:t>
             </a:fld>
             <a:endParaRPr lang="de-DE"/>
           </a:p>
@@ -1752,7 +2258,10 @@
           <a:bodyPr/>
           <a:lstStyle/>
           <a:p>
-            <a:endParaRPr lang="de-DE"/>
+            <a:r>
+              <a:rPr lang="de-DE"/>
+              <a:t>ElementTD</a:t>
+            </a:r>
           </a:p>
         </p:txBody>
       </p:sp>
@@ -1820,31 +2329,30 @@
           <a:lstStyle/>
           <a:p>
             <a:r>
+              <a:rPr lang="de-DE"/>
+              <a:t>Titelmasterformat durch Klicken bearbeiten</a:t>
+            </a:r>
+          </a:p>
+        </p:txBody>
+      </p:sp>
+      <p:sp>
+        <p:nvSpPr>
+          <p:cNvPr id="3" name="Datumsplatzhalter 2"/>
+          <p:cNvSpPr>
+            <a:spLocks noGrp="1"/>
+          </p:cNvSpPr>
+          <p:nvPr>
+            <p:ph type="dt" sz="half" idx="10"/>
+          </p:nvPr>
+        </p:nvSpPr>
+        <p:spPr/>
+        <p:txBody>
+          <a:bodyPr/>
+          <a:lstStyle/>
+          <a:p>
+            <a:fld id="{2B49DEEB-6EEE-4CB5-9938-F627F0B10E62}" type="datetime1">
               <a:rPr lang="de-DE" smtClean="0"/>
-              <a:t>Titelmasterformat durch Klicken bearbeiten</a:t>
-            </a:r>
-            <a:endParaRPr lang="de-DE"/>
-          </a:p>
-        </p:txBody>
-      </p:sp>
-      <p:sp>
-        <p:nvSpPr>
-          <p:cNvPr id="3" name="Datumsplatzhalter 2"/>
-          <p:cNvSpPr>
-            <a:spLocks noGrp="1"/>
-          </p:cNvSpPr>
-          <p:nvPr>
-            <p:ph type="dt" sz="half" idx="10"/>
-          </p:nvPr>
-        </p:nvSpPr>
-        <p:spPr/>
-        <p:txBody>
-          <a:bodyPr/>
-          <a:lstStyle/>
-          <a:p>
-            <a:fld id="{1BA50D42-C9CD-4801-B293-61D1F53EC57E}" type="datetimeFigureOut">
-              <a:rPr lang="de-DE" smtClean="0"/>
-              <a:t>14.09.2006</a:t>
+              <a:t>01.07.2017</a:t>
             </a:fld>
             <a:endParaRPr lang="de-DE"/>
           </a:p>
@@ -1865,7 +2373,10 @@
           <a:bodyPr/>
           <a:lstStyle/>
           <a:p>
-            <a:endParaRPr lang="de-DE"/>
+            <a:r>
+              <a:rPr lang="de-DE"/>
+              <a:t>ElementTD</a:t>
+            </a:r>
           </a:p>
         </p:txBody>
       </p:sp>
@@ -1932,9 +2443,9 @@
           <a:bodyPr/>
           <a:lstStyle/>
           <a:p>
-            <a:fld id="{1BA50D42-C9CD-4801-B293-61D1F53EC57E}" type="datetimeFigureOut">
+            <a:fld id="{5263656D-AFA4-4376-BB4A-5585C07D4822}" type="datetime1">
               <a:rPr lang="de-DE" smtClean="0"/>
-              <a:t>14.09.2006</a:t>
+              <a:t>01.07.2017</a:t>
             </a:fld>
             <a:endParaRPr lang="de-DE"/>
           </a:p>
@@ -1955,7 +2466,10 @@
           <a:bodyPr/>
           <a:lstStyle/>
           <a:p>
-            <a:endParaRPr lang="de-DE"/>
+            <a:r>
+              <a:rPr lang="de-DE"/>
+              <a:t>ElementTD</a:t>
+            </a:r>
           </a:p>
         </p:txBody>
       </p:sp>
@@ -2032,10 +2546,9 @@
           </a:lstStyle>
           <a:p>
             <a:r>
-              <a:rPr lang="de-DE" smtClean="0"/>
+              <a:rPr lang="de-DE"/>
               <a:t>Titelmasterformat durch Klicken bearbeiten</a:t>
             </a:r>
-            <a:endParaRPr lang="de-DE"/>
           </a:p>
         </p:txBody>
       </p:sp>
@@ -2089,38 +2602,37 @@
           <a:p>
             <a:pPr lvl="0"/>
             <a:r>
-              <a:rPr lang="de-DE" smtClean="0"/>
+              <a:rPr lang="de-DE"/>
               <a:t>Textmasterformate durch Klicken bearbeiten</a:t>
             </a:r>
           </a:p>
           <a:p>
             <a:pPr lvl="1"/>
             <a:r>
-              <a:rPr lang="de-DE" smtClean="0"/>
+              <a:rPr lang="de-DE"/>
               <a:t>Zweite Ebene</a:t>
             </a:r>
           </a:p>
           <a:p>
             <a:pPr lvl="2"/>
             <a:r>
-              <a:rPr lang="de-DE" smtClean="0"/>
+              <a:rPr lang="de-DE"/>
               <a:t>Dritte Ebene</a:t>
             </a:r>
           </a:p>
           <a:p>
             <a:pPr lvl="3"/>
             <a:r>
-              <a:rPr lang="de-DE" smtClean="0"/>
+              <a:rPr lang="de-DE"/>
               <a:t>Vierte Ebene</a:t>
             </a:r>
           </a:p>
           <a:p>
             <a:pPr lvl="4"/>
             <a:r>
-              <a:rPr lang="de-DE" smtClean="0"/>
+              <a:rPr lang="de-DE"/>
               <a:t>Fünfte Ebene</a:t>
             </a:r>
-            <a:endParaRPr lang="de-DE"/>
           </a:p>
         </p:txBody>
       </p:sp>
@@ -2183,30 +2695,30 @@
           <a:p>
             <a:pPr lvl="0"/>
             <a:r>
+              <a:rPr lang="de-DE"/>
+              <a:t>Textmasterformate durch Klicken bearbeiten</a:t>
+            </a:r>
+          </a:p>
+        </p:txBody>
+      </p:sp>
+      <p:sp>
+        <p:nvSpPr>
+          <p:cNvPr id="5" name="Datumsplatzhalter 4"/>
+          <p:cNvSpPr>
+            <a:spLocks noGrp="1"/>
+          </p:cNvSpPr>
+          <p:nvPr>
+            <p:ph type="dt" sz="half" idx="10"/>
+          </p:nvPr>
+        </p:nvSpPr>
+        <p:spPr/>
+        <p:txBody>
+          <a:bodyPr/>
+          <a:lstStyle/>
+          <a:p>
+            <a:fld id="{AB09C56F-9782-4DBB-BF0F-F68A743FAA25}" type="datetime1">
               <a:rPr lang="de-DE" smtClean="0"/>
-              <a:t>Textmasterformate durch Klicken bearbeiten</a:t>
-            </a:r>
-          </a:p>
-        </p:txBody>
-      </p:sp>
-      <p:sp>
-        <p:nvSpPr>
-          <p:cNvPr id="5" name="Datumsplatzhalter 4"/>
-          <p:cNvSpPr>
-            <a:spLocks noGrp="1"/>
-          </p:cNvSpPr>
-          <p:nvPr>
-            <p:ph type="dt" sz="half" idx="10"/>
-          </p:nvPr>
-        </p:nvSpPr>
-        <p:spPr/>
-        <p:txBody>
-          <a:bodyPr/>
-          <a:lstStyle/>
-          <a:p>
-            <a:fld id="{1BA50D42-C9CD-4801-B293-61D1F53EC57E}" type="datetimeFigureOut">
-              <a:rPr lang="de-DE" smtClean="0"/>
-              <a:t>14.09.2006</a:t>
+              <a:t>01.07.2017</a:t>
             </a:fld>
             <a:endParaRPr lang="de-DE"/>
           </a:p>
@@ -2227,7 +2739,10 @@
           <a:bodyPr/>
           <a:lstStyle/>
           <a:p>
-            <a:endParaRPr lang="de-DE"/>
+            <a:r>
+              <a:rPr lang="de-DE"/>
+              <a:t>ElementTD</a:t>
+            </a:r>
           </a:p>
         </p:txBody>
       </p:sp>
@@ -2304,10 +2819,9 @@
           </a:lstStyle>
           <a:p>
             <a:r>
-              <a:rPr lang="de-DE" smtClean="0"/>
+              <a:rPr lang="de-DE"/>
               <a:t>Titelmasterformat durch Klicken bearbeiten</a:t>
             </a:r>
-            <a:endParaRPr lang="de-DE"/>
           </a:p>
         </p:txBody>
       </p:sp>
@@ -2431,30 +2945,30 @@
           <a:p>
             <a:pPr lvl="0"/>
             <a:r>
+              <a:rPr lang="de-DE"/>
+              <a:t>Textmasterformate durch Klicken bearbeiten</a:t>
+            </a:r>
+          </a:p>
+        </p:txBody>
+      </p:sp>
+      <p:sp>
+        <p:nvSpPr>
+          <p:cNvPr id="5" name="Datumsplatzhalter 4"/>
+          <p:cNvSpPr>
+            <a:spLocks noGrp="1"/>
+          </p:cNvSpPr>
+          <p:nvPr>
+            <p:ph type="dt" sz="half" idx="10"/>
+          </p:nvPr>
+        </p:nvSpPr>
+        <p:spPr/>
+        <p:txBody>
+          <a:bodyPr/>
+          <a:lstStyle/>
+          <a:p>
+            <a:fld id="{8BBFEB6A-7563-4909-825C-997C7F15FC15}" type="datetime1">
               <a:rPr lang="de-DE" smtClean="0"/>
-              <a:t>Textmasterformate durch Klicken bearbeiten</a:t>
-            </a:r>
-          </a:p>
-        </p:txBody>
-      </p:sp>
-      <p:sp>
-        <p:nvSpPr>
-          <p:cNvPr id="5" name="Datumsplatzhalter 4"/>
-          <p:cNvSpPr>
-            <a:spLocks noGrp="1"/>
-          </p:cNvSpPr>
-          <p:nvPr>
-            <p:ph type="dt" sz="half" idx="10"/>
-          </p:nvPr>
-        </p:nvSpPr>
-        <p:spPr/>
-        <p:txBody>
-          <a:bodyPr/>
-          <a:lstStyle/>
-          <a:p>
-            <a:fld id="{1BA50D42-C9CD-4801-B293-61D1F53EC57E}" type="datetimeFigureOut">
-              <a:rPr lang="de-DE" smtClean="0"/>
-              <a:t>14.09.2006</a:t>
+              <a:t>01.07.2017</a:t>
             </a:fld>
             <a:endParaRPr lang="de-DE"/>
           </a:p>
@@ -2475,7 +2989,10 @@
           <a:bodyPr/>
           <a:lstStyle/>
           <a:p>
-            <a:endParaRPr lang="de-DE"/>
+            <a:r>
+              <a:rPr lang="de-DE"/>
+              <a:t>ElementTD</a:t>
+            </a:r>
           </a:p>
         </p:txBody>
       </p:sp>
@@ -2532,57 +3049,116 @@
           <a:chExt cx="0" cy="0"/>
         </a:xfrm>
       </p:grpSpPr>
-      <p:sp>
-        <p:nvSpPr>
-          <p:cNvPr id="2" name="Titelplatzhalter 1"/>
-          <p:cNvSpPr>
-            <a:spLocks noGrp="1"/>
-          </p:cNvSpPr>
-          <p:nvPr>
-            <p:ph type="title"/>
-          </p:nvPr>
-        </p:nvSpPr>
+      <p:pic>
+        <p:nvPicPr>
+          <p:cNvPr id="11" name="Grafik 10" descr="Ein Bild, das Ding enthält.&#10;&#10;Mit hoher Zuverlässigkeit generierte Beschreibung">
+            <a:extLst>
+              <a:ext uri="{FF2B5EF4-FFF2-40B4-BE49-F238E27FC236}">
+                <a16:creationId xmlns:a16="http://schemas.microsoft.com/office/drawing/2014/main" id="{019819EB-F11F-4E3A-BF94-313FF4682546}"/>
+              </a:ext>
+            </a:extLst>
+          </p:cNvPr>
+          <p:cNvPicPr>
+            <a:picLocks noChangeAspect="1"/>
+          </p:cNvPicPr>
+          <p:nvPr userDrawn="1"/>
+        </p:nvPicPr>
+        <p:blipFill>
+          <a:blip r:embed="rId13">
+            <a:extLst>
+              <a:ext uri="{28A0092B-C50C-407E-A947-70E740481C1C}">
+                <a14:useLocalDpi xmlns:a14="http://schemas.microsoft.com/office/drawing/2010/main" val="0"/>
+              </a:ext>
+            </a:extLst>
+          </a:blip>
+          <a:stretch>
+            <a:fillRect/>
+          </a:stretch>
+        </p:blipFill>
         <p:spPr>
           <a:xfrm>
-            <a:off x="457200" y="274638"/>
-            <a:ext cx="8229600" cy="1143000"/>
+            <a:off x="-1522665" y="751"/>
+            <a:ext cx="12189331" cy="6856498"/>
           </a:xfrm>
           <a:prstGeom prst="rect">
             <a:avLst/>
           </a:prstGeom>
         </p:spPr>
-        <p:txBody>
-          <a:bodyPr vert="horz" lIns="91440" tIns="45720" rIns="91440" bIns="45720" rtlCol="0" anchor="ctr">
-            <a:normAutofit/>
-          </a:bodyPr>
-          <a:lstStyle/>
-          <a:p>
-            <a:r>
-              <a:rPr lang="de-DE" smtClean="0"/>
-              <a:t>Titelmasterformat durch Klicken bearbeiten</a:t>
-            </a:r>
-            <a:endParaRPr lang="de-DE"/>
-          </a:p>
-        </p:txBody>
-      </p:sp>
-      <p:sp>
-        <p:nvSpPr>
-          <p:cNvPr id="3" name="Textplatzhalter 2"/>
-          <p:cNvSpPr>
-            <a:spLocks noGrp="1"/>
-          </p:cNvSpPr>
-          <p:nvPr>
-            <p:ph type="body" idx="1"/>
+      </p:pic>
+      <p:sp>
+        <p:nvSpPr>
+          <p:cNvPr id="2" name="Titelplatzhalter 1"/>
+          <p:cNvSpPr>
+            <a:spLocks noGrp="1"/>
+          </p:cNvSpPr>
+          <p:nvPr>
+            <p:ph type="title"/>
           </p:nvPr>
         </p:nvSpPr>
         <p:spPr>
           <a:xfrm>
-            <a:off x="457200" y="1600200"/>
-            <a:ext cx="8229600" cy="4525963"/>
+            <a:off x="457200" y="548680"/>
+            <a:ext cx="8229600" cy="1088362"/>
           </a:xfrm>
           <a:prstGeom prst="rect">
             <a:avLst/>
           </a:prstGeom>
+          <a:solidFill>
+            <a:srgbClr val="FFFFFF">
+              <a:alpha val="69804"/>
+            </a:srgbClr>
+          </a:solidFill>
+          <a:effectLst>
+            <a:outerShdw blurRad="50800" dist="38100" dir="2700000" algn="tl" rotWithShape="0">
+              <a:prstClr val="black">
+                <a:alpha val="40000"/>
+              </a:prstClr>
+            </a:outerShdw>
+          </a:effectLst>
+        </p:spPr>
+        <p:txBody>
+          <a:bodyPr vert="horz" lIns="91440" tIns="45720" rIns="91440" bIns="45720" rtlCol="0" anchor="ctr">
+            <a:normAutofit/>
+          </a:bodyPr>
+          <a:lstStyle/>
+          <a:p>
+            <a:r>
+              <a:rPr lang="de-DE" dirty="0"/>
+              <a:t>Titelmasterformat durch Klicken bearbeiten</a:t>
+            </a:r>
+          </a:p>
+        </p:txBody>
+      </p:sp>
+      <p:sp>
+        <p:nvSpPr>
+          <p:cNvPr id="3" name="Textplatzhalter 2"/>
+          <p:cNvSpPr>
+            <a:spLocks noGrp="1"/>
+          </p:cNvSpPr>
+          <p:nvPr>
+            <p:ph type="body" idx="1"/>
+          </p:nvPr>
+        </p:nvSpPr>
+        <p:spPr>
+          <a:xfrm>
+            <a:off x="457200" y="1772816"/>
+            <a:ext cx="8229600" cy="4353347"/>
+          </a:xfrm>
+          <a:prstGeom prst="rect">
+            <a:avLst/>
+          </a:prstGeom>
+          <a:solidFill>
+            <a:srgbClr val="FFFFFF">
+              <a:alpha val="69804"/>
+            </a:srgbClr>
+          </a:solidFill>
+          <a:effectLst>
+            <a:outerShdw blurRad="50800" dist="38100" dir="2700000" algn="tl" rotWithShape="0">
+              <a:prstClr val="black">
+                <a:alpha val="40000"/>
+              </a:prstClr>
+            </a:outerShdw>
+          </a:effectLst>
         </p:spPr>
         <p:txBody>
           <a:bodyPr vert="horz" lIns="91440" tIns="45720" rIns="91440" bIns="45720" rtlCol="0">
@@ -2592,38 +3168,37 @@
           <a:p>
             <a:pPr lvl="0"/>
             <a:r>
-              <a:rPr lang="de-DE" smtClean="0"/>
+              <a:rPr lang="de-DE"/>
               <a:t>Textmasterformate durch Klicken bearbeiten</a:t>
             </a:r>
           </a:p>
           <a:p>
             <a:pPr lvl="1"/>
             <a:r>
-              <a:rPr lang="de-DE" smtClean="0"/>
+              <a:rPr lang="de-DE"/>
               <a:t>Zweite Ebene</a:t>
             </a:r>
           </a:p>
           <a:p>
             <a:pPr lvl="2"/>
             <a:r>
-              <a:rPr lang="de-DE" smtClean="0"/>
+              <a:rPr lang="de-DE"/>
               <a:t>Dritte Ebene</a:t>
             </a:r>
           </a:p>
           <a:p>
             <a:pPr lvl="3"/>
             <a:r>
-              <a:rPr lang="de-DE" smtClean="0"/>
+              <a:rPr lang="de-DE"/>
               <a:t>Vierte Ebene</a:t>
             </a:r>
           </a:p>
           <a:p>
             <a:pPr lvl="4"/>
             <a:r>
-              <a:rPr lang="de-DE" smtClean="0"/>
+              <a:rPr lang="de-DE"/>
               <a:t>Fünfte Ebene</a:t>
             </a:r>
-            <a:endParaRPr lang="de-DE"/>
           </a:p>
         </p:txBody>
       </p:sp>
@@ -2645,6 +3220,14 @@
           <a:prstGeom prst="rect">
             <a:avLst/>
           </a:prstGeom>
+          <a:noFill/>
+          <a:effectLst>
+            <a:outerShdw blurRad="50800" dist="38100" dir="2700000" algn="tl" rotWithShape="0">
+              <a:prstClr val="black">
+                <a:alpha val="40000"/>
+              </a:prstClr>
+            </a:outerShdw>
+          </a:effectLst>
         </p:spPr>
         <p:txBody>
           <a:bodyPr vert="horz" lIns="91440" tIns="45720" rIns="91440" bIns="45720" rtlCol="0" anchor="ctr"/>
@@ -2652,17 +3235,25 @@
             <a:lvl1pPr algn="l">
               <a:defRPr sz="1200">
                 <a:solidFill>
-                  <a:schemeClr val="tx1">
-                    <a:tint val="75000"/>
+                  <a:schemeClr val="bg1">
+                    <a:lumMod val="85000"/>
                   </a:schemeClr>
                 </a:solidFill>
+                <a:effectLst>
+                  <a:outerShdw blurRad="38100" dist="38100" dir="2700000" algn="tl">
+                    <a:srgbClr val="000000">
+                      <a:alpha val="43137"/>
+                    </a:srgbClr>
+                  </a:outerShdw>
+                </a:effectLst>
+                <a:latin typeface="Century Schoolbook" panose="02040604050505020304" pitchFamily="18" charset="0"/>
               </a:defRPr>
             </a:lvl1pPr>
           </a:lstStyle>
           <a:p>
-            <a:fld id="{1BA50D42-C9CD-4801-B293-61D1F53EC57E}" type="datetimeFigureOut">
+            <a:fld id="{837B529E-E57A-4FB3-9945-F3D934678812}" type="datetime1">
               <a:rPr lang="de-DE" smtClean="0"/>
-              <a:t>14.09.2006</a:t>
+              <a:t>01.07.2017</a:t>
             </a:fld>
             <a:endParaRPr lang="de-DE"/>
           </a:p>
@@ -2686,22 +3277,41 @@
           <a:prstGeom prst="rect">
             <a:avLst/>
           </a:prstGeom>
+          <a:noFill/>
+          <a:effectLst>
+            <a:outerShdw blurRad="50800" dist="38100" dir="2700000" algn="tl" rotWithShape="0">
+              <a:prstClr val="black">
+                <a:alpha val="40000"/>
+              </a:prstClr>
+            </a:outerShdw>
+          </a:effectLst>
         </p:spPr>
         <p:txBody>
           <a:bodyPr vert="horz" lIns="91440" tIns="45720" rIns="91440" bIns="45720" rtlCol="0" anchor="ctr"/>
           <a:lstStyle>
             <a:lvl1pPr algn="ctr">
-              <a:defRPr sz="1200">
+              <a:defRPr sz="1600">
                 <a:solidFill>
-                  <a:schemeClr val="tx1">
-                    <a:tint val="75000"/>
+                  <a:schemeClr val="bg1">
+                    <a:lumMod val="85000"/>
                   </a:schemeClr>
                 </a:solidFill>
+                <a:effectLst>
+                  <a:outerShdw blurRad="38100" dist="38100" dir="2700000" algn="tl">
+                    <a:srgbClr val="000000">
+                      <a:alpha val="43137"/>
+                    </a:srgbClr>
+                  </a:outerShdw>
+                </a:effectLst>
+                <a:latin typeface="Century Schoolbook" panose="02040604050505020304" pitchFamily="18" charset="0"/>
               </a:defRPr>
             </a:lvl1pPr>
           </a:lstStyle>
           <a:p>
-            <a:endParaRPr lang="de-DE"/>
+            <a:r>
+              <a:rPr lang="de-DE"/>
+              <a:t>ElementTD</a:t>
+            </a:r>
           </a:p>
         </p:txBody>
       </p:sp>
@@ -2723,6 +3333,14 @@
           <a:prstGeom prst="rect">
             <a:avLst/>
           </a:prstGeom>
+          <a:noFill/>
+          <a:effectLst>
+            <a:outerShdw blurRad="50800" dist="38100" dir="2700000" algn="tl" rotWithShape="0">
+              <a:prstClr val="black">
+                <a:alpha val="40000"/>
+              </a:prstClr>
+            </a:outerShdw>
+          </a:effectLst>
         </p:spPr>
         <p:txBody>
           <a:bodyPr vert="horz" lIns="91440" tIns="45720" rIns="91440" bIns="45720" rtlCol="0" anchor="ctr"/>
@@ -2730,16 +3348,25 @@
             <a:lvl1pPr algn="r">
               <a:defRPr sz="1200">
                 <a:solidFill>
-                  <a:schemeClr val="tx1">
-                    <a:tint val="75000"/>
+                  <a:schemeClr val="bg1">
+                    <a:lumMod val="85000"/>
                   </a:schemeClr>
                 </a:solidFill>
+                <a:effectLst>
+                  <a:outerShdw blurRad="38100" dist="38100" dir="2700000" algn="tl">
+                    <a:srgbClr val="000000">
+                      <a:alpha val="43137"/>
+                    </a:srgbClr>
+                  </a:outerShdw>
+                </a:effectLst>
+                <a:latin typeface="Century Schoolbook" panose="02040604050505020304" pitchFamily="18" charset="0"/>
               </a:defRPr>
             </a:lvl1pPr>
           </a:lstStyle>
           <a:p>
             <a:fld id="{6C6AE60A-B69C-4790-82F7-3882EDF23186}" type="slidenum">
               <a:rPr lang="de-DE" smtClean="0"/>
+              <a:pPr/>
               <a:t>‹Nr.›</a:t>
             </a:fld>
             <a:endParaRPr lang="de-DE"/>
@@ -2762,6 +3389,7 @@
     <p:sldLayoutId id="2147483658" r:id="rId10"/>
     <p:sldLayoutId id="2147483659" r:id="rId11"/>
   </p:sldLayoutIdLst>
+  <p:hf hdr="0" ftr="0"/>
   <p:txStyles>
     <p:titleStyle>
       <a:lvl1pPr algn="ctr" defTabSz="914400" rtl="0" eaLnBrk="1" latinLnBrk="0" hangingPunct="1">
@@ -2773,7 +3401,14 @@
           <a:solidFill>
             <a:schemeClr val="tx1"/>
           </a:solidFill>
-          <a:latin typeface="+mj-lt"/>
+          <a:effectLst>
+            <a:outerShdw blurRad="38100" dist="38100" dir="2700000" algn="tl">
+              <a:srgbClr val="000000">
+                <a:alpha val="43137"/>
+              </a:srgbClr>
+            </a:outerShdw>
+          </a:effectLst>
+          <a:latin typeface="Century Schoolbook" panose="02040604050505020304" pitchFamily="18" charset="0"/>
           <a:ea typeface="+mj-ea"/>
           <a:cs typeface="+mj-cs"/>
         </a:defRPr>
@@ -2790,7 +3425,14 @@
           <a:solidFill>
             <a:schemeClr val="tx1"/>
           </a:solidFill>
-          <a:latin typeface="+mn-lt"/>
+          <a:effectLst>
+            <a:outerShdw blurRad="38100" dist="38100" dir="2700000" algn="tl">
+              <a:srgbClr val="000000">
+                <a:alpha val="43137"/>
+              </a:srgbClr>
+            </a:outerShdw>
+          </a:effectLst>
+          <a:latin typeface="Century Schoolbook" panose="02040604050505020304" pitchFamily="18" charset="0"/>
           <a:ea typeface="+mn-ea"/>
           <a:cs typeface="+mn-cs"/>
         </a:defRPr>
@@ -2805,7 +3447,14 @@
           <a:solidFill>
             <a:schemeClr val="tx1"/>
           </a:solidFill>
-          <a:latin typeface="+mn-lt"/>
+          <a:effectLst>
+            <a:outerShdw blurRad="38100" dist="38100" dir="2700000" algn="tl">
+              <a:srgbClr val="000000">
+                <a:alpha val="43137"/>
+              </a:srgbClr>
+            </a:outerShdw>
+          </a:effectLst>
+          <a:latin typeface="Century Schoolbook" panose="02040604050505020304" pitchFamily="18" charset="0"/>
           <a:ea typeface="+mn-ea"/>
           <a:cs typeface="+mn-cs"/>
         </a:defRPr>
@@ -2820,7 +3469,14 @@
           <a:solidFill>
             <a:schemeClr val="tx1"/>
           </a:solidFill>
-          <a:latin typeface="+mn-lt"/>
+          <a:effectLst>
+            <a:outerShdw blurRad="38100" dist="38100" dir="2700000" algn="tl">
+              <a:srgbClr val="000000">
+                <a:alpha val="43137"/>
+              </a:srgbClr>
+            </a:outerShdw>
+          </a:effectLst>
+          <a:latin typeface="Century Schoolbook" panose="02040604050505020304" pitchFamily="18" charset="0"/>
           <a:ea typeface="+mn-ea"/>
           <a:cs typeface="+mn-cs"/>
         </a:defRPr>
@@ -2835,7 +3491,14 @@
           <a:solidFill>
             <a:schemeClr val="tx1"/>
           </a:solidFill>
-          <a:latin typeface="+mn-lt"/>
+          <a:effectLst>
+            <a:outerShdw blurRad="38100" dist="38100" dir="2700000" algn="tl">
+              <a:srgbClr val="000000">
+                <a:alpha val="43137"/>
+              </a:srgbClr>
+            </a:outerShdw>
+          </a:effectLst>
+          <a:latin typeface="Century Schoolbook" panose="02040604050505020304" pitchFamily="18" charset="0"/>
           <a:ea typeface="+mn-ea"/>
           <a:cs typeface="+mn-cs"/>
         </a:defRPr>
@@ -2850,7 +3513,14 @@
           <a:solidFill>
             <a:schemeClr val="tx1"/>
           </a:solidFill>
-          <a:latin typeface="+mn-lt"/>
+          <a:effectLst>
+            <a:outerShdw blurRad="38100" dist="38100" dir="2700000" algn="tl">
+              <a:srgbClr val="000000">
+                <a:alpha val="43137"/>
+              </a:srgbClr>
+            </a:outerShdw>
+          </a:effectLst>
+          <a:latin typeface="Century Schoolbook" panose="02040604050505020304" pitchFamily="18" charset="0"/>
           <a:ea typeface="+mn-ea"/>
           <a:cs typeface="+mn-cs"/>
         </a:defRPr>
@@ -3015,15 +3685,1680 @@
 </p:sldMaster>
 </file>
 
+<file path=ppt/slides/slide1.xml><?xml version="1.0" encoding="utf-8"?>
+<p:sld xmlns:a="http://schemas.openxmlformats.org/drawingml/2006/main" xmlns:r="http://schemas.openxmlformats.org/officeDocument/2006/relationships" xmlns:p="http://schemas.openxmlformats.org/presentationml/2006/main">
+  <p:cSld>
+    <p:spTree>
+      <p:nvGrpSpPr>
+        <p:cNvPr id="1" name=""/>
+        <p:cNvGrpSpPr/>
+        <p:nvPr/>
+      </p:nvGrpSpPr>
+      <p:grpSpPr>
+        <a:xfrm>
+          <a:off x="0" y="0"/>
+          <a:ext cx="0" cy="0"/>
+          <a:chOff x="0" y="0"/>
+          <a:chExt cx="0" cy="0"/>
+        </a:xfrm>
+      </p:grpSpPr>
+      <p:sp>
+        <p:nvSpPr>
+          <p:cNvPr id="2" name="Titel 1">
+            <a:extLst>
+              <a:ext uri="{FF2B5EF4-FFF2-40B4-BE49-F238E27FC236}">
+                <a16:creationId xmlns:a16="http://schemas.microsoft.com/office/drawing/2014/main" id="{B583366E-202A-45F1-8DCF-8E5A30487906}"/>
+              </a:ext>
+            </a:extLst>
+          </p:cNvPr>
+          <p:cNvSpPr>
+            <a:spLocks noGrp="1"/>
+          </p:cNvSpPr>
+          <p:nvPr>
+            <p:ph type="ctrTitle"/>
+          </p:nvPr>
+        </p:nvSpPr>
+        <p:spPr/>
+        <p:txBody>
+          <a:bodyPr>
+            <a:normAutofit/>
+          </a:bodyPr>
+          <a:lstStyle/>
+          <a:p>
+            <a:r>
+              <a:rPr lang="de-AT" sz="6000" dirty="0"/>
+              <a:t>ElementTD</a:t>
+            </a:r>
+          </a:p>
+        </p:txBody>
+      </p:sp>
+      <p:sp>
+        <p:nvSpPr>
+          <p:cNvPr id="3" name="Untertitel 2">
+            <a:extLst>
+              <a:ext uri="{FF2B5EF4-FFF2-40B4-BE49-F238E27FC236}">
+                <a16:creationId xmlns:a16="http://schemas.microsoft.com/office/drawing/2014/main" id="{5C8B2359-FDBA-4D02-9492-7F4B4ACE6895}"/>
+              </a:ext>
+            </a:extLst>
+          </p:cNvPr>
+          <p:cNvSpPr>
+            <a:spLocks noGrp="1"/>
+          </p:cNvSpPr>
+          <p:nvPr>
+            <p:ph type="subTitle" idx="1"/>
+          </p:nvPr>
+        </p:nvSpPr>
+        <p:spPr/>
+        <p:txBody>
+          <a:bodyPr/>
+          <a:lstStyle/>
+          <a:p>
+            <a:r>
+              <a:rPr lang="de-AT" dirty="0">
+                <a:solidFill>
+                  <a:schemeClr val="bg1">
+                    <a:lumMod val="85000"/>
+                  </a:schemeClr>
+                </a:solidFill>
+              </a:rPr>
+              <a:t>Gebauer, Pranz, Schiller</a:t>
+            </a:r>
+          </a:p>
+        </p:txBody>
+      </p:sp>
+    </p:spTree>
+    <p:extLst>
+      <p:ext uri="{BB962C8B-B14F-4D97-AF65-F5344CB8AC3E}">
+        <p14:creationId xmlns:p14="http://schemas.microsoft.com/office/powerpoint/2010/main" val="1581673915"/>
+      </p:ext>
+    </p:extLst>
+  </p:cSld>
+  <p:clrMapOvr>
+    <a:masterClrMapping/>
+  </p:clrMapOvr>
+</p:sld>
+</file>
+
+<file path=ppt/slides/slide10.xml><?xml version="1.0" encoding="utf-8"?>
+<p:sld xmlns:a="http://schemas.openxmlformats.org/drawingml/2006/main" xmlns:r="http://schemas.openxmlformats.org/officeDocument/2006/relationships" xmlns:p="http://schemas.openxmlformats.org/presentationml/2006/main">
+  <p:cSld>
+    <p:spTree>
+      <p:nvGrpSpPr>
+        <p:cNvPr id="1" name=""/>
+        <p:cNvGrpSpPr/>
+        <p:nvPr/>
+      </p:nvGrpSpPr>
+      <p:grpSpPr>
+        <a:xfrm>
+          <a:off x="0" y="0"/>
+          <a:ext cx="0" cy="0"/>
+          <a:chOff x="0" y="0"/>
+          <a:chExt cx="0" cy="0"/>
+        </a:xfrm>
+      </p:grpSpPr>
+      <p:sp>
+        <p:nvSpPr>
+          <p:cNvPr id="2" name="Titel 1">
+            <a:extLst>
+              <a:ext uri="{FF2B5EF4-FFF2-40B4-BE49-F238E27FC236}">
+                <a16:creationId xmlns:a16="http://schemas.microsoft.com/office/drawing/2014/main" id="{7EC50FCB-96AD-406D-9D8E-A242B36050E5}"/>
+              </a:ext>
+            </a:extLst>
+          </p:cNvPr>
+          <p:cNvSpPr>
+            <a:spLocks noGrp="1"/>
+          </p:cNvSpPr>
+          <p:nvPr>
+            <p:ph type="ctrTitle"/>
+          </p:nvPr>
+        </p:nvSpPr>
+        <p:spPr/>
+        <p:txBody>
+          <a:bodyPr/>
+          <a:lstStyle/>
+          <a:p>
+            <a:r>
+              <a:rPr lang="de-AT" dirty="0"/>
+              <a:t>Vielen Dank für Ihre Aufmerksamkeit!</a:t>
+            </a:r>
+          </a:p>
+        </p:txBody>
+      </p:sp>
+    </p:spTree>
+    <p:extLst>
+      <p:ext uri="{BB962C8B-B14F-4D97-AF65-F5344CB8AC3E}">
+        <p14:creationId xmlns:p14="http://schemas.microsoft.com/office/powerpoint/2010/main" val="1266414597"/>
+      </p:ext>
+    </p:extLst>
+  </p:cSld>
+  <p:clrMapOvr>
+    <a:masterClrMapping/>
+  </p:clrMapOvr>
+</p:sld>
+</file>
+
+<file path=ppt/slides/slide2.xml><?xml version="1.0" encoding="utf-8"?>
+<p:sld xmlns:a="http://schemas.openxmlformats.org/drawingml/2006/main" xmlns:r="http://schemas.openxmlformats.org/officeDocument/2006/relationships" xmlns:p="http://schemas.openxmlformats.org/presentationml/2006/main">
+  <p:cSld>
+    <p:spTree>
+      <p:nvGrpSpPr>
+        <p:cNvPr id="1" name=""/>
+        <p:cNvGrpSpPr/>
+        <p:nvPr/>
+      </p:nvGrpSpPr>
+      <p:grpSpPr>
+        <a:xfrm>
+          <a:off x="0" y="0"/>
+          <a:ext cx="0" cy="0"/>
+          <a:chOff x="0" y="0"/>
+          <a:chExt cx="0" cy="0"/>
+        </a:xfrm>
+      </p:grpSpPr>
+      <p:sp>
+        <p:nvSpPr>
+          <p:cNvPr id="2" name="Titel 1">
+            <a:extLst>
+              <a:ext uri="{FF2B5EF4-FFF2-40B4-BE49-F238E27FC236}">
+                <a16:creationId xmlns:a16="http://schemas.microsoft.com/office/drawing/2014/main" id="{F222AB65-43C8-490B-A6DD-8F5E7E98E38F}"/>
+              </a:ext>
+            </a:extLst>
+          </p:cNvPr>
+          <p:cNvSpPr>
+            <a:spLocks noGrp="1"/>
+          </p:cNvSpPr>
+          <p:nvPr>
+            <p:ph type="title"/>
+          </p:nvPr>
+        </p:nvSpPr>
+        <p:spPr/>
+        <p:txBody>
+          <a:bodyPr/>
+          <a:lstStyle/>
+          <a:p>
+            <a:r>
+              <a:rPr lang="de-AT" dirty="0"/>
+              <a:t>Inhalt</a:t>
+            </a:r>
+          </a:p>
+        </p:txBody>
+      </p:sp>
+      <p:sp>
+        <p:nvSpPr>
+          <p:cNvPr id="3" name="Inhaltsplatzhalter 2">
+            <a:extLst>
+              <a:ext uri="{FF2B5EF4-FFF2-40B4-BE49-F238E27FC236}">
+                <a16:creationId xmlns:a16="http://schemas.microsoft.com/office/drawing/2014/main" id="{BD1F256C-1228-42F5-A08C-E45D6DCE3438}"/>
+              </a:ext>
+            </a:extLst>
+          </p:cNvPr>
+          <p:cNvSpPr>
+            <a:spLocks noGrp="1"/>
+          </p:cNvSpPr>
+          <p:nvPr>
+            <p:ph idx="1"/>
+          </p:nvPr>
+        </p:nvSpPr>
+        <p:spPr/>
+        <p:txBody>
+          <a:bodyPr/>
+          <a:lstStyle/>
+          <a:p>
+            <a:r>
+              <a:rPr lang="de-AT" dirty="0"/>
+              <a:t>Das Team</a:t>
+            </a:r>
+          </a:p>
+          <a:p>
+            <a:r>
+              <a:rPr lang="de-AT" dirty="0"/>
+              <a:t>Die Idee</a:t>
+            </a:r>
+          </a:p>
+          <a:p>
+            <a:r>
+              <a:rPr lang="de-AT" dirty="0"/>
+              <a:t>Beschreibung des Spiels</a:t>
+            </a:r>
+          </a:p>
+          <a:p>
+            <a:r>
+              <a:rPr lang="de-AT" dirty="0"/>
+              <a:t>Umsetzung</a:t>
+            </a:r>
+          </a:p>
+          <a:p>
+            <a:r>
+              <a:rPr lang="de-AT" dirty="0" err="1"/>
+              <a:t>LibGDX</a:t>
+            </a:r>
+            <a:endParaRPr lang="de-AT" dirty="0"/>
+          </a:p>
+          <a:p>
+            <a:r>
+              <a:rPr lang="de-AT" dirty="0"/>
+              <a:t>Demo</a:t>
+            </a:r>
+          </a:p>
+          <a:p>
+            <a:endParaRPr lang="de-AT" dirty="0"/>
+          </a:p>
+        </p:txBody>
+      </p:sp>
+      <p:sp>
+        <p:nvSpPr>
+          <p:cNvPr id="4" name="Datumsplatzhalter 3">
+            <a:extLst>
+              <a:ext uri="{FF2B5EF4-FFF2-40B4-BE49-F238E27FC236}">
+                <a16:creationId xmlns:a16="http://schemas.microsoft.com/office/drawing/2014/main" id="{307F33A0-1F21-427D-B5DF-BAF72CEED27E}"/>
+              </a:ext>
+            </a:extLst>
+          </p:cNvPr>
+          <p:cNvSpPr>
+            <a:spLocks noGrp="1"/>
+          </p:cNvSpPr>
+          <p:nvPr>
+            <p:ph type="dt" sz="half" idx="10"/>
+          </p:nvPr>
+        </p:nvSpPr>
+        <p:spPr/>
+        <p:txBody>
+          <a:bodyPr/>
+          <a:lstStyle/>
+          <a:p>
+            <a:fld id="{02ADD0D4-00E3-4723-A997-B7ECBE092E9F}" type="datetime1">
+              <a:rPr lang="de-DE" smtClean="0"/>
+              <a:t>01.07.2017</a:t>
+            </a:fld>
+            <a:endParaRPr lang="de-DE"/>
+          </a:p>
+        </p:txBody>
+      </p:sp>
+      <p:sp>
+        <p:nvSpPr>
+          <p:cNvPr id="6" name="Foliennummernplatzhalter 5">
+            <a:extLst>
+              <a:ext uri="{FF2B5EF4-FFF2-40B4-BE49-F238E27FC236}">
+                <a16:creationId xmlns:a16="http://schemas.microsoft.com/office/drawing/2014/main" id="{41412F98-1080-42CB-B85D-304694D0C8B8}"/>
+              </a:ext>
+            </a:extLst>
+          </p:cNvPr>
+          <p:cNvSpPr>
+            <a:spLocks noGrp="1"/>
+          </p:cNvSpPr>
+          <p:nvPr>
+            <p:ph type="sldNum" sz="quarter" idx="12"/>
+          </p:nvPr>
+        </p:nvSpPr>
+        <p:spPr/>
+        <p:txBody>
+          <a:bodyPr/>
+          <a:lstStyle/>
+          <a:p>
+            <a:fld id="{6C6AE60A-B69C-4790-82F7-3882EDF23186}" type="slidenum">
+              <a:rPr lang="de-DE" smtClean="0"/>
+              <a:t>2</a:t>
+            </a:fld>
+            <a:endParaRPr lang="de-DE"/>
+          </a:p>
+        </p:txBody>
+      </p:sp>
+    </p:spTree>
+    <p:extLst>
+      <p:ext uri="{BB962C8B-B14F-4D97-AF65-F5344CB8AC3E}">
+        <p14:creationId xmlns:p14="http://schemas.microsoft.com/office/powerpoint/2010/main" val="2147386438"/>
+      </p:ext>
+    </p:extLst>
+  </p:cSld>
+  <p:clrMapOvr>
+    <a:masterClrMapping/>
+  </p:clrMapOvr>
+</p:sld>
+</file>
+
+<file path=ppt/slides/slide3.xml><?xml version="1.0" encoding="utf-8"?>
+<p:sld xmlns:a="http://schemas.openxmlformats.org/drawingml/2006/main" xmlns:r="http://schemas.openxmlformats.org/officeDocument/2006/relationships" xmlns:p="http://schemas.openxmlformats.org/presentationml/2006/main">
+  <p:cSld>
+    <p:spTree>
+      <p:nvGrpSpPr>
+        <p:cNvPr id="1" name=""/>
+        <p:cNvGrpSpPr/>
+        <p:nvPr/>
+      </p:nvGrpSpPr>
+      <p:grpSpPr>
+        <a:xfrm>
+          <a:off x="0" y="0"/>
+          <a:ext cx="0" cy="0"/>
+          <a:chOff x="0" y="0"/>
+          <a:chExt cx="0" cy="0"/>
+        </a:xfrm>
+      </p:grpSpPr>
+      <p:sp>
+        <p:nvSpPr>
+          <p:cNvPr id="2" name="Titel 1">
+            <a:extLst>
+              <a:ext uri="{FF2B5EF4-FFF2-40B4-BE49-F238E27FC236}">
+                <a16:creationId xmlns:a16="http://schemas.microsoft.com/office/drawing/2014/main" id="{9D06A78C-A692-4AAD-A197-F846179C82BC}"/>
+              </a:ext>
+            </a:extLst>
+          </p:cNvPr>
+          <p:cNvSpPr>
+            <a:spLocks noGrp="1"/>
+          </p:cNvSpPr>
+          <p:nvPr>
+            <p:ph type="title"/>
+          </p:nvPr>
+        </p:nvSpPr>
+        <p:spPr/>
+        <p:txBody>
+          <a:bodyPr/>
+          <a:lstStyle/>
+          <a:p>
+            <a:r>
+              <a:rPr lang="de-AT" dirty="0"/>
+              <a:t>Das Team</a:t>
+            </a:r>
+          </a:p>
+        </p:txBody>
+      </p:sp>
+      <p:sp>
+        <p:nvSpPr>
+          <p:cNvPr id="3" name="Inhaltsplatzhalter 2">
+            <a:extLst>
+              <a:ext uri="{FF2B5EF4-FFF2-40B4-BE49-F238E27FC236}">
+                <a16:creationId xmlns:a16="http://schemas.microsoft.com/office/drawing/2014/main" id="{1DDF2D65-52D8-4AE4-ADA5-5C3FA945349C}"/>
+              </a:ext>
+            </a:extLst>
+          </p:cNvPr>
+          <p:cNvSpPr>
+            <a:spLocks noGrp="1"/>
+          </p:cNvSpPr>
+          <p:nvPr>
+            <p:ph idx="1"/>
+          </p:nvPr>
+        </p:nvSpPr>
+        <p:spPr/>
+        <p:txBody>
+          <a:bodyPr/>
+          <a:lstStyle/>
+          <a:p>
+            <a:r>
+              <a:rPr lang="de-AT" dirty="0"/>
+              <a:t>Projektteam</a:t>
+            </a:r>
+          </a:p>
+          <a:p>
+            <a:pPr lvl="1"/>
+            <a:r>
+              <a:rPr lang="de-AT" dirty="0"/>
+              <a:t>GEBAUER Laurenz	MC	2. Semester</a:t>
+            </a:r>
+          </a:p>
+          <a:p>
+            <a:pPr lvl="1"/>
+            <a:r>
+              <a:rPr lang="de-AT" dirty="0"/>
+              <a:t>PRANZ Bernhard	MC	2. Semester</a:t>
+            </a:r>
+          </a:p>
+          <a:p>
+            <a:pPr lvl="1"/>
+            <a:r>
+              <a:rPr lang="de-AT" dirty="0"/>
+              <a:t>SCHILLER Markus	MC	2. Semester</a:t>
+            </a:r>
+          </a:p>
+          <a:p>
+            <a:r>
+              <a:rPr lang="de-AT" dirty="0"/>
+              <a:t>Projektbetreuer</a:t>
+            </a:r>
+          </a:p>
+          <a:p>
+            <a:pPr lvl="1"/>
+            <a:r>
+              <a:rPr lang="de-AT" dirty="0"/>
+              <a:t>MACHEINER Martin	MCM 2.Semester	</a:t>
+            </a:r>
+          </a:p>
+        </p:txBody>
+      </p:sp>
+      <p:sp>
+        <p:nvSpPr>
+          <p:cNvPr id="4" name="Datumsplatzhalter 3">
+            <a:extLst>
+              <a:ext uri="{FF2B5EF4-FFF2-40B4-BE49-F238E27FC236}">
+                <a16:creationId xmlns:a16="http://schemas.microsoft.com/office/drawing/2014/main" id="{BF35DC72-C37E-4538-A48A-388705510F4C}"/>
+              </a:ext>
+            </a:extLst>
+          </p:cNvPr>
+          <p:cNvSpPr>
+            <a:spLocks noGrp="1"/>
+          </p:cNvSpPr>
+          <p:nvPr>
+            <p:ph type="dt" sz="half" idx="10"/>
+          </p:nvPr>
+        </p:nvSpPr>
+        <p:spPr/>
+        <p:txBody>
+          <a:bodyPr/>
+          <a:lstStyle/>
+          <a:p>
+            <a:fld id="{18E7F602-EAB1-4D9C-A126-7CEAF968CD02}" type="datetime1">
+              <a:rPr lang="de-DE" smtClean="0"/>
+              <a:t>01.07.2017</a:t>
+            </a:fld>
+            <a:endParaRPr lang="de-DE"/>
+          </a:p>
+        </p:txBody>
+      </p:sp>
+      <p:sp>
+        <p:nvSpPr>
+          <p:cNvPr id="6" name="Foliennummernplatzhalter 5">
+            <a:extLst>
+              <a:ext uri="{FF2B5EF4-FFF2-40B4-BE49-F238E27FC236}">
+                <a16:creationId xmlns:a16="http://schemas.microsoft.com/office/drawing/2014/main" id="{3DB33125-931E-4C8F-BB0C-7A4887F10D61}"/>
+              </a:ext>
+            </a:extLst>
+          </p:cNvPr>
+          <p:cNvSpPr>
+            <a:spLocks noGrp="1"/>
+          </p:cNvSpPr>
+          <p:nvPr>
+            <p:ph type="sldNum" sz="quarter" idx="12"/>
+          </p:nvPr>
+        </p:nvSpPr>
+        <p:spPr/>
+        <p:txBody>
+          <a:bodyPr/>
+          <a:lstStyle/>
+          <a:p>
+            <a:fld id="{6C6AE60A-B69C-4790-82F7-3882EDF23186}" type="slidenum">
+              <a:rPr lang="de-DE" smtClean="0"/>
+              <a:t>3</a:t>
+            </a:fld>
+            <a:endParaRPr lang="de-DE"/>
+          </a:p>
+        </p:txBody>
+      </p:sp>
+    </p:spTree>
+    <p:extLst>
+      <p:ext uri="{BB962C8B-B14F-4D97-AF65-F5344CB8AC3E}">
+        <p14:creationId xmlns:p14="http://schemas.microsoft.com/office/powerpoint/2010/main" val="2102822797"/>
+      </p:ext>
+    </p:extLst>
+  </p:cSld>
+  <p:clrMapOvr>
+    <a:masterClrMapping/>
+  </p:clrMapOvr>
+</p:sld>
+</file>
+
+<file path=ppt/slides/slide4.xml><?xml version="1.0" encoding="utf-8"?>
+<p:sld xmlns:a="http://schemas.openxmlformats.org/drawingml/2006/main" xmlns:r="http://schemas.openxmlformats.org/officeDocument/2006/relationships" xmlns:p="http://schemas.openxmlformats.org/presentationml/2006/main">
+  <p:cSld>
+    <p:spTree>
+      <p:nvGrpSpPr>
+        <p:cNvPr id="1" name=""/>
+        <p:cNvGrpSpPr/>
+        <p:nvPr/>
+      </p:nvGrpSpPr>
+      <p:grpSpPr>
+        <a:xfrm>
+          <a:off x="0" y="0"/>
+          <a:ext cx="0" cy="0"/>
+          <a:chOff x="0" y="0"/>
+          <a:chExt cx="0" cy="0"/>
+        </a:xfrm>
+      </p:grpSpPr>
+      <p:sp>
+        <p:nvSpPr>
+          <p:cNvPr id="2" name="Titel 1">
+            <a:extLst>
+              <a:ext uri="{FF2B5EF4-FFF2-40B4-BE49-F238E27FC236}">
+                <a16:creationId xmlns:a16="http://schemas.microsoft.com/office/drawing/2014/main" id="{3D13486F-DA78-427C-967C-AB3C5485120B}"/>
+              </a:ext>
+            </a:extLst>
+          </p:cNvPr>
+          <p:cNvSpPr>
+            <a:spLocks noGrp="1"/>
+          </p:cNvSpPr>
+          <p:nvPr>
+            <p:ph type="title"/>
+          </p:nvPr>
+        </p:nvSpPr>
+        <p:spPr/>
+        <p:txBody>
+          <a:bodyPr/>
+          <a:lstStyle/>
+          <a:p>
+            <a:r>
+              <a:rPr lang="de-AT" dirty="0"/>
+              <a:t>Die Idee</a:t>
+            </a:r>
+          </a:p>
+        </p:txBody>
+      </p:sp>
+      <p:sp>
+        <p:nvSpPr>
+          <p:cNvPr id="3" name="Inhaltsplatzhalter 2">
+            <a:extLst>
+              <a:ext uri="{FF2B5EF4-FFF2-40B4-BE49-F238E27FC236}">
+                <a16:creationId xmlns:a16="http://schemas.microsoft.com/office/drawing/2014/main" id="{3DBE367B-BA28-430C-9B8A-C846678D0401}"/>
+              </a:ext>
+            </a:extLst>
+          </p:cNvPr>
+          <p:cNvSpPr>
+            <a:spLocks noGrp="1"/>
+          </p:cNvSpPr>
+          <p:nvPr>
+            <p:ph idx="1"/>
+          </p:nvPr>
+        </p:nvSpPr>
+        <p:spPr/>
+        <p:txBody>
+          <a:bodyPr/>
+          <a:lstStyle/>
+          <a:p>
+            <a:r>
+              <a:rPr lang="de-AT" dirty="0"/>
+              <a:t>Basierend auf Mini-Spiel in Warcraft</a:t>
+            </a:r>
+          </a:p>
+          <a:p>
+            <a:pPr lvl="1"/>
+            <a:r>
+              <a:rPr lang="de-AT" dirty="0"/>
+              <a:t>Entwicklung irgendwann eingestellt</a:t>
+            </a:r>
+          </a:p>
+          <a:p>
+            <a:pPr lvl="1"/>
+            <a:r>
+              <a:rPr lang="de-AT" dirty="0"/>
+              <a:t>Umsetzung des Spiels für mobile Endgeräte</a:t>
+            </a:r>
+          </a:p>
+          <a:p>
+            <a:r>
+              <a:rPr lang="de-AT" dirty="0"/>
+              <a:t>Framework </a:t>
+            </a:r>
+            <a:r>
+              <a:rPr lang="de-AT" dirty="0" err="1"/>
+              <a:t>LibGDX</a:t>
+            </a:r>
+            <a:endParaRPr lang="de-AT" dirty="0"/>
+          </a:p>
+          <a:p>
+            <a:pPr lvl="1"/>
+            <a:r>
+              <a:rPr lang="de-AT" dirty="0"/>
+              <a:t>Portabilität auf verschiedenen Betriebssystemen</a:t>
+            </a:r>
+          </a:p>
+          <a:p>
+            <a:pPr lvl="1"/>
+            <a:r>
+              <a:rPr lang="de-AT" dirty="0"/>
+              <a:t>Umsetzung in Android und iOS</a:t>
+            </a:r>
+          </a:p>
+          <a:p>
+            <a:endParaRPr lang="de-AT" dirty="0"/>
+          </a:p>
+        </p:txBody>
+      </p:sp>
+      <p:sp>
+        <p:nvSpPr>
+          <p:cNvPr id="4" name="Datumsplatzhalter 3">
+            <a:extLst>
+              <a:ext uri="{FF2B5EF4-FFF2-40B4-BE49-F238E27FC236}">
+                <a16:creationId xmlns:a16="http://schemas.microsoft.com/office/drawing/2014/main" id="{F7029A22-CCE2-4546-86AD-FD6ECCC2E65C}"/>
+              </a:ext>
+            </a:extLst>
+          </p:cNvPr>
+          <p:cNvSpPr>
+            <a:spLocks noGrp="1"/>
+          </p:cNvSpPr>
+          <p:nvPr>
+            <p:ph type="dt" sz="half" idx="10"/>
+          </p:nvPr>
+        </p:nvSpPr>
+        <p:spPr/>
+        <p:txBody>
+          <a:bodyPr/>
+          <a:lstStyle/>
+          <a:p>
+            <a:fld id="{F83B068E-C841-4FCE-9865-15D345EDA850}" type="datetime1">
+              <a:rPr lang="de-DE" smtClean="0"/>
+              <a:t>01.07.2017</a:t>
+            </a:fld>
+            <a:endParaRPr lang="de-DE"/>
+          </a:p>
+        </p:txBody>
+      </p:sp>
+      <p:sp>
+        <p:nvSpPr>
+          <p:cNvPr id="6" name="Foliennummernplatzhalter 5">
+            <a:extLst>
+              <a:ext uri="{FF2B5EF4-FFF2-40B4-BE49-F238E27FC236}">
+                <a16:creationId xmlns:a16="http://schemas.microsoft.com/office/drawing/2014/main" id="{A7F83539-0B34-4D3A-9663-0839B4D833B2}"/>
+              </a:ext>
+            </a:extLst>
+          </p:cNvPr>
+          <p:cNvSpPr>
+            <a:spLocks noGrp="1"/>
+          </p:cNvSpPr>
+          <p:nvPr>
+            <p:ph type="sldNum" sz="quarter" idx="12"/>
+          </p:nvPr>
+        </p:nvSpPr>
+        <p:spPr/>
+        <p:txBody>
+          <a:bodyPr/>
+          <a:lstStyle/>
+          <a:p>
+            <a:fld id="{6C6AE60A-B69C-4790-82F7-3882EDF23186}" type="slidenum">
+              <a:rPr lang="de-DE" smtClean="0"/>
+              <a:t>4</a:t>
+            </a:fld>
+            <a:endParaRPr lang="de-DE"/>
+          </a:p>
+        </p:txBody>
+      </p:sp>
+    </p:spTree>
+    <p:extLst>
+      <p:ext uri="{BB962C8B-B14F-4D97-AF65-F5344CB8AC3E}">
+        <p14:creationId xmlns:p14="http://schemas.microsoft.com/office/powerpoint/2010/main" val="3197085438"/>
+      </p:ext>
+    </p:extLst>
+  </p:cSld>
+  <p:clrMapOvr>
+    <a:masterClrMapping/>
+  </p:clrMapOvr>
+</p:sld>
+</file>
+
+<file path=ppt/slides/slide5.xml><?xml version="1.0" encoding="utf-8"?>
+<p:sld xmlns:a="http://schemas.openxmlformats.org/drawingml/2006/main" xmlns:r="http://schemas.openxmlformats.org/officeDocument/2006/relationships" xmlns:p="http://schemas.openxmlformats.org/presentationml/2006/main">
+  <p:cSld>
+    <p:spTree>
+      <p:nvGrpSpPr>
+        <p:cNvPr id="1" name=""/>
+        <p:cNvGrpSpPr/>
+        <p:nvPr/>
+      </p:nvGrpSpPr>
+      <p:grpSpPr>
+        <a:xfrm>
+          <a:off x="0" y="0"/>
+          <a:ext cx="0" cy="0"/>
+          <a:chOff x="0" y="0"/>
+          <a:chExt cx="0" cy="0"/>
+        </a:xfrm>
+      </p:grpSpPr>
+      <p:sp>
+        <p:nvSpPr>
+          <p:cNvPr id="2" name="Titel 1">
+            <a:extLst>
+              <a:ext uri="{FF2B5EF4-FFF2-40B4-BE49-F238E27FC236}">
+                <a16:creationId xmlns:a16="http://schemas.microsoft.com/office/drawing/2014/main" id="{41851678-FF35-4C75-8307-AC75437B1681}"/>
+              </a:ext>
+            </a:extLst>
+          </p:cNvPr>
+          <p:cNvSpPr>
+            <a:spLocks noGrp="1"/>
+          </p:cNvSpPr>
+          <p:nvPr>
+            <p:ph type="title"/>
+          </p:nvPr>
+        </p:nvSpPr>
+        <p:spPr/>
+        <p:txBody>
+          <a:bodyPr/>
+          <a:lstStyle/>
+          <a:p>
+            <a:r>
+              <a:rPr lang="de-AT" dirty="0"/>
+              <a:t>Beschreibung des Spiels</a:t>
+            </a:r>
+          </a:p>
+        </p:txBody>
+      </p:sp>
+      <p:sp>
+        <p:nvSpPr>
+          <p:cNvPr id="3" name="Inhaltsplatzhalter 2">
+            <a:extLst>
+              <a:ext uri="{FF2B5EF4-FFF2-40B4-BE49-F238E27FC236}">
+                <a16:creationId xmlns:a16="http://schemas.microsoft.com/office/drawing/2014/main" id="{DA3A762C-86EB-421C-8D5D-F0348ADE5D25}"/>
+              </a:ext>
+            </a:extLst>
+          </p:cNvPr>
+          <p:cNvSpPr>
+            <a:spLocks noGrp="1"/>
+          </p:cNvSpPr>
+          <p:nvPr>
+            <p:ph idx="1"/>
+          </p:nvPr>
+        </p:nvSpPr>
+        <p:spPr/>
+        <p:txBody>
+          <a:bodyPr/>
+          <a:lstStyle/>
+          <a:p>
+            <a:r>
+              <a:rPr lang="de-AT" dirty="0"/>
+              <a:t>Tower Defense-Spiel</a:t>
+            </a:r>
+          </a:p>
+          <a:p>
+            <a:pPr lvl="1"/>
+            <a:r>
+              <a:rPr lang="de-AT" dirty="0"/>
+              <a:t>Türme bauen</a:t>
+            </a:r>
+          </a:p>
+          <a:p>
+            <a:pPr lvl="1"/>
+            <a:r>
+              <a:rPr lang="de-AT" dirty="0"/>
+              <a:t>Gruppen von Gegnern</a:t>
+            </a:r>
+          </a:p>
+          <a:p>
+            <a:pPr lvl="1"/>
+            <a:r>
+              <a:rPr lang="de-AT" dirty="0"/>
+              <a:t>Gold für Elimination der Gegner</a:t>
+            </a:r>
+          </a:p>
+          <a:p>
+            <a:r>
+              <a:rPr lang="de-AT" dirty="0"/>
+              <a:t>Elemente/Türme</a:t>
+            </a:r>
+          </a:p>
+          <a:p>
+            <a:pPr lvl="1"/>
+            <a:r>
+              <a:rPr lang="de-AT" dirty="0"/>
+              <a:t>verschiedene Elemente und Türme</a:t>
+            </a:r>
+          </a:p>
+          <a:p>
+            <a:pPr lvl="1"/>
+            <a:r>
+              <a:rPr lang="de-AT" dirty="0"/>
+              <a:t>Kombination: neue Elemente</a:t>
+            </a:r>
+          </a:p>
+        </p:txBody>
+      </p:sp>
+      <p:sp>
+        <p:nvSpPr>
+          <p:cNvPr id="4" name="Datumsplatzhalter 3">
+            <a:extLst>
+              <a:ext uri="{FF2B5EF4-FFF2-40B4-BE49-F238E27FC236}">
+                <a16:creationId xmlns:a16="http://schemas.microsoft.com/office/drawing/2014/main" id="{A9DC94E7-D0C6-4DE8-9908-4DFD8816D1E4}"/>
+              </a:ext>
+            </a:extLst>
+          </p:cNvPr>
+          <p:cNvSpPr>
+            <a:spLocks noGrp="1"/>
+          </p:cNvSpPr>
+          <p:nvPr>
+            <p:ph type="dt" sz="half" idx="10"/>
+          </p:nvPr>
+        </p:nvSpPr>
+        <p:spPr/>
+        <p:txBody>
+          <a:bodyPr/>
+          <a:lstStyle/>
+          <a:p>
+            <a:fld id="{C9BA90A9-2353-4EC3-B836-FAEAEFE0FE65}" type="datetime1">
+              <a:rPr lang="de-DE" smtClean="0"/>
+              <a:t>01.07.2017</a:t>
+            </a:fld>
+            <a:endParaRPr lang="de-DE"/>
+          </a:p>
+        </p:txBody>
+      </p:sp>
+      <p:sp>
+        <p:nvSpPr>
+          <p:cNvPr id="6" name="Foliennummernplatzhalter 5">
+            <a:extLst>
+              <a:ext uri="{FF2B5EF4-FFF2-40B4-BE49-F238E27FC236}">
+                <a16:creationId xmlns:a16="http://schemas.microsoft.com/office/drawing/2014/main" id="{95549ED5-56CF-404B-B267-D18370EF828B}"/>
+              </a:ext>
+            </a:extLst>
+          </p:cNvPr>
+          <p:cNvSpPr>
+            <a:spLocks noGrp="1"/>
+          </p:cNvSpPr>
+          <p:nvPr>
+            <p:ph type="sldNum" sz="quarter" idx="12"/>
+          </p:nvPr>
+        </p:nvSpPr>
+        <p:spPr/>
+        <p:txBody>
+          <a:bodyPr/>
+          <a:lstStyle/>
+          <a:p>
+            <a:fld id="{6C6AE60A-B69C-4790-82F7-3882EDF23186}" type="slidenum">
+              <a:rPr lang="de-DE" smtClean="0"/>
+              <a:t>5</a:t>
+            </a:fld>
+            <a:endParaRPr lang="de-DE"/>
+          </a:p>
+        </p:txBody>
+      </p:sp>
+    </p:spTree>
+    <p:extLst>
+      <p:ext uri="{BB962C8B-B14F-4D97-AF65-F5344CB8AC3E}">
+        <p14:creationId xmlns:p14="http://schemas.microsoft.com/office/powerpoint/2010/main" val="3336364779"/>
+      </p:ext>
+    </p:extLst>
+  </p:cSld>
+  <p:clrMapOvr>
+    <a:masterClrMapping/>
+  </p:clrMapOvr>
+</p:sld>
+</file>
+
+<file path=ppt/slides/slide6.xml><?xml version="1.0" encoding="utf-8"?>
+<p:sld xmlns:a="http://schemas.openxmlformats.org/drawingml/2006/main" xmlns:r="http://schemas.openxmlformats.org/officeDocument/2006/relationships" xmlns:p="http://schemas.openxmlformats.org/presentationml/2006/main">
+  <p:cSld>
+    <p:spTree>
+      <p:nvGrpSpPr>
+        <p:cNvPr id="1" name=""/>
+        <p:cNvGrpSpPr/>
+        <p:nvPr/>
+      </p:nvGrpSpPr>
+      <p:grpSpPr>
+        <a:xfrm>
+          <a:off x="0" y="0"/>
+          <a:ext cx="0" cy="0"/>
+          <a:chOff x="0" y="0"/>
+          <a:chExt cx="0" cy="0"/>
+        </a:xfrm>
+      </p:grpSpPr>
+      <p:sp>
+        <p:nvSpPr>
+          <p:cNvPr id="2" name="Titel 1">
+            <a:extLst>
+              <a:ext uri="{FF2B5EF4-FFF2-40B4-BE49-F238E27FC236}">
+                <a16:creationId xmlns:a16="http://schemas.microsoft.com/office/drawing/2014/main" id="{F7B6C625-0A83-4BAC-96C3-6ABB894F7BE9}"/>
+              </a:ext>
+            </a:extLst>
+          </p:cNvPr>
+          <p:cNvSpPr>
+            <a:spLocks noGrp="1"/>
+          </p:cNvSpPr>
+          <p:nvPr>
+            <p:ph type="title"/>
+          </p:nvPr>
+        </p:nvSpPr>
+        <p:spPr/>
+        <p:txBody>
+          <a:bodyPr/>
+          <a:lstStyle/>
+          <a:p>
+            <a:r>
+              <a:rPr lang="de-AT" dirty="0"/>
+              <a:t>Beschreibung des Spiels</a:t>
+            </a:r>
+          </a:p>
+        </p:txBody>
+      </p:sp>
+      <p:sp>
+        <p:nvSpPr>
+          <p:cNvPr id="3" name="Inhaltsplatzhalter 2">
+            <a:extLst>
+              <a:ext uri="{FF2B5EF4-FFF2-40B4-BE49-F238E27FC236}">
+                <a16:creationId xmlns:a16="http://schemas.microsoft.com/office/drawing/2014/main" id="{2149AB9F-21F1-499A-AAF7-86D17A1FBA33}"/>
+              </a:ext>
+            </a:extLst>
+          </p:cNvPr>
+          <p:cNvSpPr>
+            <a:spLocks noGrp="1"/>
+          </p:cNvSpPr>
+          <p:nvPr>
+            <p:ph idx="1"/>
+          </p:nvPr>
+        </p:nvSpPr>
+        <p:spPr/>
+        <p:txBody>
+          <a:bodyPr>
+            <a:normAutofit fontScale="92500" lnSpcReduction="20000"/>
+          </a:bodyPr>
+          <a:lstStyle/>
+          <a:p>
+            <a:r>
+              <a:rPr lang="de-AT" dirty="0"/>
+              <a:t>Bauphase</a:t>
+            </a:r>
+          </a:p>
+          <a:p>
+            <a:pPr lvl="1"/>
+            <a:r>
+              <a:rPr lang="de-AT" dirty="0"/>
+              <a:t>… Sekunden Zeit</a:t>
+            </a:r>
+          </a:p>
+          <a:p>
+            <a:pPr lvl="1"/>
+            <a:r>
+              <a:rPr lang="de-AT" dirty="0"/>
+              <a:t>Startkapital: … Gold</a:t>
+            </a:r>
+          </a:p>
+          <a:p>
+            <a:pPr lvl="1"/>
+            <a:r>
+              <a:rPr lang="de-AT" dirty="0"/>
+              <a:t>Platzierung der Türme</a:t>
+            </a:r>
+          </a:p>
+          <a:p>
+            <a:r>
+              <a:rPr lang="de-AT" dirty="0"/>
+              <a:t>Kampfphase</a:t>
+            </a:r>
+          </a:p>
+          <a:p>
+            <a:pPr lvl="1"/>
+            <a:r>
+              <a:rPr lang="de-AT" dirty="0"/>
+              <a:t>Gruppen von Gegnern erscheinen</a:t>
+            </a:r>
+          </a:p>
+          <a:p>
+            <a:pPr lvl="1"/>
+            <a:r>
+              <a:rPr lang="de-AT" dirty="0"/>
+              <a:t>Eliminierung eines Gegners </a:t>
+            </a:r>
+            <a:r>
+              <a:rPr lang="de-AT" dirty="0">
+                <a:sym typeface="Wingdings" panose="05000000000000000000" pitchFamily="2" charset="2"/>
+              </a:rPr>
+              <a:t> Gold</a:t>
+            </a:r>
+          </a:p>
+          <a:p>
+            <a:pPr lvl="1"/>
+            <a:r>
+              <a:rPr lang="de-AT" dirty="0">
+                <a:sym typeface="Wingdings" panose="05000000000000000000" pitchFamily="2" charset="2"/>
+              </a:rPr>
+              <a:t>Gold	 	neue Türme</a:t>
+            </a:r>
+            <a:br>
+              <a:rPr lang="de-AT" dirty="0">
+                <a:sym typeface="Wingdings" panose="05000000000000000000" pitchFamily="2" charset="2"/>
+              </a:rPr>
+            </a:br>
+            <a:r>
+              <a:rPr lang="de-AT" dirty="0">
+                <a:sym typeface="Wingdings" panose="05000000000000000000" pitchFamily="2" charset="2"/>
+              </a:rPr>
+              <a:t>			bestehende Türme fusionieren</a:t>
+            </a:r>
+          </a:p>
+          <a:p>
+            <a:r>
+              <a:rPr lang="de-AT" dirty="0">
+                <a:sym typeface="Wingdings" panose="05000000000000000000" pitchFamily="2" charset="2"/>
+              </a:rPr>
+              <a:t>Gewonnen, wenn alle Gegner besiegt</a:t>
+            </a:r>
+            <a:endParaRPr lang="de-AT" dirty="0"/>
+          </a:p>
+          <a:p>
+            <a:pPr lvl="1"/>
+            <a:endParaRPr lang="de-AT" dirty="0"/>
+          </a:p>
+        </p:txBody>
+      </p:sp>
+      <p:sp>
+        <p:nvSpPr>
+          <p:cNvPr id="4" name="Datumsplatzhalter 3">
+            <a:extLst>
+              <a:ext uri="{FF2B5EF4-FFF2-40B4-BE49-F238E27FC236}">
+                <a16:creationId xmlns:a16="http://schemas.microsoft.com/office/drawing/2014/main" id="{7685422E-B270-436E-A201-3A8286FDF07A}"/>
+              </a:ext>
+            </a:extLst>
+          </p:cNvPr>
+          <p:cNvSpPr>
+            <a:spLocks noGrp="1"/>
+          </p:cNvSpPr>
+          <p:nvPr>
+            <p:ph type="dt" sz="half" idx="10"/>
+          </p:nvPr>
+        </p:nvSpPr>
+        <p:spPr/>
+        <p:txBody>
+          <a:bodyPr/>
+          <a:lstStyle/>
+          <a:p>
+            <a:fld id="{D018EF64-FBD4-4BF5-B01A-1958132ED163}" type="datetime1">
+              <a:rPr lang="de-DE" smtClean="0"/>
+              <a:t>01.07.2017</a:t>
+            </a:fld>
+            <a:endParaRPr lang="de-DE"/>
+          </a:p>
+        </p:txBody>
+      </p:sp>
+      <p:sp>
+        <p:nvSpPr>
+          <p:cNvPr id="6" name="Foliennummernplatzhalter 5">
+            <a:extLst>
+              <a:ext uri="{FF2B5EF4-FFF2-40B4-BE49-F238E27FC236}">
+                <a16:creationId xmlns:a16="http://schemas.microsoft.com/office/drawing/2014/main" id="{6C98DF5B-316B-4D15-805F-7A35BDBE41E3}"/>
+              </a:ext>
+            </a:extLst>
+          </p:cNvPr>
+          <p:cNvSpPr>
+            <a:spLocks noGrp="1"/>
+          </p:cNvSpPr>
+          <p:nvPr>
+            <p:ph type="sldNum" sz="quarter" idx="12"/>
+          </p:nvPr>
+        </p:nvSpPr>
+        <p:spPr/>
+        <p:txBody>
+          <a:bodyPr/>
+          <a:lstStyle/>
+          <a:p>
+            <a:fld id="{6C6AE60A-B69C-4790-82F7-3882EDF23186}" type="slidenum">
+              <a:rPr lang="de-DE" smtClean="0"/>
+              <a:t>6</a:t>
+            </a:fld>
+            <a:endParaRPr lang="de-DE"/>
+          </a:p>
+        </p:txBody>
+      </p:sp>
+    </p:spTree>
+    <p:extLst>
+      <p:ext uri="{BB962C8B-B14F-4D97-AF65-F5344CB8AC3E}">
+        <p14:creationId xmlns:p14="http://schemas.microsoft.com/office/powerpoint/2010/main" val="2733875241"/>
+      </p:ext>
+    </p:extLst>
+  </p:cSld>
+  <p:clrMapOvr>
+    <a:masterClrMapping/>
+  </p:clrMapOvr>
+</p:sld>
+</file>
+
+<file path=ppt/slides/slide7.xml><?xml version="1.0" encoding="utf-8"?>
+<p:sld xmlns:a="http://schemas.openxmlformats.org/drawingml/2006/main" xmlns:r="http://schemas.openxmlformats.org/officeDocument/2006/relationships" xmlns:p="http://schemas.openxmlformats.org/presentationml/2006/main">
+  <p:cSld>
+    <p:spTree>
+      <p:nvGrpSpPr>
+        <p:cNvPr id="1" name=""/>
+        <p:cNvGrpSpPr/>
+        <p:nvPr/>
+      </p:nvGrpSpPr>
+      <p:grpSpPr>
+        <a:xfrm>
+          <a:off x="0" y="0"/>
+          <a:ext cx="0" cy="0"/>
+          <a:chOff x="0" y="0"/>
+          <a:chExt cx="0" cy="0"/>
+        </a:xfrm>
+      </p:grpSpPr>
+      <p:sp>
+        <p:nvSpPr>
+          <p:cNvPr id="2" name="Titel 1">
+            <a:extLst>
+              <a:ext uri="{FF2B5EF4-FFF2-40B4-BE49-F238E27FC236}">
+                <a16:creationId xmlns:a16="http://schemas.microsoft.com/office/drawing/2014/main" id="{D90A2D35-A4AA-4143-967F-F6F2C6C932C9}"/>
+              </a:ext>
+            </a:extLst>
+          </p:cNvPr>
+          <p:cNvSpPr>
+            <a:spLocks noGrp="1"/>
+          </p:cNvSpPr>
+          <p:nvPr>
+            <p:ph type="title"/>
+          </p:nvPr>
+        </p:nvSpPr>
+        <p:spPr/>
+        <p:txBody>
+          <a:bodyPr/>
+          <a:lstStyle/>
+          <a:p>
+            <a:r>
+              <a:rPr lang="de-AT" dirty="0"/>
+              <a:t>Die Umsetzung</a:t>
+            </a:r>
+          </a:p>
+        </p:txBody>
+      </p:sp>
+      <p:sp>
+        <p:nvSpPr>
+          <p:cNvPr id="3" name="Inhaltsplatzhalter 2">
+            <a:extLst>
+              <a:ext uri="{FF2B5EF4-FFF2-40B4-BE49-F238E27FC236}">
+                <a16:creationId xmlns:a16="http://schemas.microsoft.com/office/drawing/2014/main" id="{19125229-D9CE-446F-B3BA-A3C71A56D9BA}"/>
+              </a:ext>
+            </a:extLst>
+          </p:cNvPr>
+          <p:cNvSpPr>
+            <a:spLocks noGrp="1"/>
+          </p:cNvSpPr>
+          <p:nvPr>
+            <p:ph idx="1"/>
+          </p:nvPr>
+        </p:nvSpPr>
+        <p:spPr/>
+        <p:txBody>
+          <a:bodyPr/>
+          <a:lstStyle/>
+          <a:p>
+            <a:r>
+              <a:rPr lang="de-AT" dirty="0"/>
+              <a:t>Cross-</a:t>
+            </a:r>
+            <a:r>
+              <a:rPr lang="de-AT" dirty="0" err="1"/>
+              <a:t>Platform</a:t>
+            </a:r>
+            <a:r>
+              <a:rPr lang="de-AT" dirty="0"/>
+              <a:t> möglich</a:t>
+            </a:r>
+          </a:p>
+          <a:p>
+            <a:pPr lvl="1"/>
+            <a:r>
+              <a:rPr lang="de-AT" dirty="0"/>
+              <a:t>durch das Framework </a:t>
+            </a:r>
+            <a:r>
+              <a:rPr lang="de-AT" dirty="0" err="1"/>
+              <a:t>LibGDX</a:t>
+            </a:r>
+            <a:endParaRPr lang="de-AT" dirty="0"/>
+          </a:p>
+          <a:p>
+            <a:r>
+              <a:rPr lang="de-AT" dirty="0"/>
+              <a:t>Android:</a:t>
+            </a:r>
+          </a:p>
+          <a:p>
+            <a:pPr lvl="1"/>
+            <a:r>
+              <a:rPr lang="de-AT" dirty="0"/>
+              <a:t>Android Studio</a:t>
+            </a:r>
+          </a:p>
+          <a:p>
+            <a:r>
+              <a:rPr lang="de-AT" dirty="0"/>
+              <a:t>iOS</a:t>
+            </a:r>
+          </a:p>
+          <a:p>
+            <a:pPr lvl="1"/>
+            <a:r>
+              <a:rPr lang="de-AT" dirty="0"/>
+              <a:t>Android Studio, </a:t>
+            </a:r>
+            <a:r>
+              <a:rPr lang="de-AT" dirty="0" err="1"/>
+              <a:t>Xcode</a:t>
+            </a:r>
+            <a:endParaRPr lang="de-AT" dirty="0"/>
+          </a:p>
+          <a:p>
+            <a:endParaRPr lang="de-AT" dirty="0"/>
+          </a:p>
+          <a:p>
+            <a:pPr lvl="1"/>
+            <a:endParaRPr lang="de-AT" dirty="0"/>
+          </a:p>
+        </p:txBody>
+      </p:sp>
+      <p:sp>
+        <p:nvSpPr>
+          <p:cNvPr id="4" name="Datumsplatzhalter 3">
+            <a:extLst>
+              <a:ext uri="{FF2B5EF4-FFF2-40B4-BE49-F238E27FC236}">
+                <a16:creationId xmlns:a16="http://schemas.microsoft.com/office/drawing/2014/main" id="{99F8E540-3191-40C6-BF9B-6E58F2FCBED4}"/>
+              </a:ext>
+            </a:extLst>
+          </p:cNvPr>
+          <p:cNvSpPr>
+            <a:spLocks noGrp="1"/>
+          </p:cNvSpPr>
+          <p:nvPr>
+            <p:ph type="dt" sz="half" idx="10"/>
+          </p:nvPr>
+        </p:nvSpPr>
+        <p:spPr/>
+        <p:txBody>
+          <a:bodyPr/>
+          <a:lstStyle/>
+          <a:p>
+            <a:fld id="{0F958EBF-1DD2-48CD-AC05-99BB382075B8}" type="datetime1">
+              <a:rPr lang="de-DE" smtClean="0"/>
+              <a:t>01.07.2017</a:t>
+            </a:fld>
+            <a:endParaRPr lang="de-DE"/>
+          </a:p>
+        </p:txBody>
+      </p:sp>
+      <p:sp>
+        <p:nvSpPr>
+          <p:cNvPr id="6" name="Foliennummernplatzhalter 5">
+            <a:extLst>
+              <a:ext uri="{FF2B5EF4-FFF2-40B4-BE49-F238E27FC236}">
+                <a16:creationId xmlns:a16="http://schemas.microsoft.com/office/drawing/2014/main" id="{3CEAB98A-0B6A-4D93-B9D6-67800B89F0C1}"/>
+              </a:ext>
+            </a:extLst>
+          </p:cNvPr>
+          <p:cNvSpPr>
+            <a:spLocks noGrp="1"/>
+          </p:cNvSpPr>
+          <p:nvPr>
+            <p:ph type="sldNum" sz="quarter" idx="12"/>
+          </p:nvPr>
+        </p:nvSpPr>
+        <p:spPr/>
+        <p:txBody>
+          <a:bodyPr/>
+          <a:lstStyle/>
+          <a:p>
+            <a:fld id="{6C6AE60A-B69C-4790-82F7-3882EDF23186}" type="slidenum">
+              <a:rPr lang="de-DE" smtClean="0"/>
+              <a:t>7</a:t>
+            </a:fld>
+            <a:endParaRPr lang="de-DE"/>
+          </a:p>
+        </p:txBody>
+      </p:sp>
+    </p:spTree>
+    <p:extLst>
+      <p:ext uri="{BB962C8B-B14F-4D97-AF65-F5344CB8AC3E}">
+        <p14:creationId xmlns:p14="http://schemas.microsoft.com/office/powerpoint/2010/main" val="2147746240"/>
+      </p:ext>
+    </p:extLst>
+  </p:cSld>
+  <p:clrMapOvr>
+    <a:masterClrMapping/>
+  </p:clrMapOvr>
+</p:sld>
+</file>
+
+<file path=ppt/slides/slide8.xml><?xml version="1.0" encoding="utf-8"?>
+<p:sld xmlns:a="http://schemas.openxmlformats.org/drawingml/2006/main" xmlns:r="http://schemas.openxmlformats.org/officeDocument/2006/relationships" xmlns:p="http://schemas.openxmlformats.org/presentationml/2006/main">
+  <p:cSld>
+    <p:spTree>
+      <p:nvGrpSpPr>
+        <p:cNvPr id="1" name=""/>
+        <p:cNvGrpSpPr/>
+        <p:nvPr/>
+      </p:nvGrpSpPr>
+      <p:grpSpPr>
+        <a:xfrm>
+          <a:off x="0" y="0"/>
+          <a:ext cx="0" cy="0"/>
+          <a:chOff x="0" y="0"/>
+          <a:chExt cx="0" cy="0"/>
+        </a:xfrm>
+      </p:grpSpPr>
+      <p:sp>
+        <p:nvSpPr>
+          <p:cNvPr id="2" name="Titel 1">
+            <a:extLst>
+              <a:ext uri="{FF2B5EF4-FFF2-40B4-BE49-F238E27FC236}">
+                <a16:creationId xmlns:a16="http://schemas.microsoft.com/office/drawing/2014/main" id="{35F84820-6B3F-4863-89D3-E157F3AA9A20}"/>
+              </a:ext>
+            </a:extLst>
+          </p:cNvPr>
+          <p:cNvSpPr>
+            <a:spLocks noGrp="1"/>
+          </p:cNvSpPr>
+          <p:nvPr>
+            <p:ph type="title"/>
+          </p:nvPr>
+        </p:nvSpPr>
+        <p:spPr/>
+        <p:txBody>
+          <a:bodyPr/>
+          <a:lstStyle/>
+          <a:p>
+            <a:r>
+              <a:rPr lang="de-AT" dirty="0" err="1"/>
+              <a:t>LibGDX</a:t>
+            </a:r>
+            <a:endParaRPr lang="de-AT" dirty="0"/>
+          </a:p>
+        </p:txBody>
+      </p:sp>
+      <p:sp>
+        <p:nvSpPr>
+          <p:cNvPr id="3" name="Inhaltsplatzhalter 2">
+            <a:extLst>
+              <a:ext uri="{FF2B5EF4-FFF2-40B4-BE49-F238E27FC236}">
+                <a16:creationId xmlns:a16="http://schemas.microsoft.com/office/drawing/2014/main" id="{4895B13C-5C50-4F41-9987-8E00CE2F6AAE}"/>
+              </a:ext>
+            </a:extLst>
+          </p:cNvPr>
+          <p:cNvSpPr>
+            <a:spLocks noGrp="1"/>
+          </p:cNvSpPr>
+          <p:nvPr>
+            <p:ph idx="1"/>
+          </p:nvPr>
+        </p:nvSpPr>
+        <p:spPr/>
+        <p:txBody>
+          <a:bodyPr>
+            <a:normAutofit/>
+          </a:bodyPr>
+          <a:lstStyle/>
+          <a:p>
+            <a:r>
+              <a:rPr lang="de-AT" dirty="0"/>
+              <a:t>Cross-</a:t>
+            </a:r>
+            <a:r>
+              <a:rPr lang="de-AT" dirty="0" err="1"/>
+              <a:t>Platform</a:t>
+            </a:r>
+            <a:r>
+              <a:rPr lang="de-AT" dirty="0"/>
+              <a:t>-Framework</a:t>
+            </a:r>
+          </a:p>
+          <a:p>
+            <a:pPr lvl="1"/>
+            <a:r>
+              <a:rPr lang="de-AT" dirty="0"/>
+              <a:t>In Java</a:t>
+            </a:r>
+          </a:p>
+          <a:p>
+            <a:pPr lvl="1"/>
+            <a:r>
+              <a:rPr lang="de-AT" dirty="0"/>
+              <a:t>Ermöglicht Portabilität für</a:t>
+            </a:r>
+          </a:p>
+          <a:p>
+            <a:pPr lvl="2"/>
+            <a:r>
+              <a:rPr lang="de-AT" dirty="0"/>
+              <a:t>Desktop</a:t>
+            </a:r>
+          </a:p>
+          <a:p>
+            <a:pPr lvl="2"/>
+            <a:r>
+              <a:rPr lang="de-AT" dirty="0"/>
+              <a:t>Android</a:t>
+            </a:r>
+          </a:p>
+          <a:p>
+            <a:pPr lvl="2"/>
+            <a:r>
+              <a:rPr lang="de-AT" dirty="0"/>
+              <a:t>BlackBerry</a:t>
+            </a:r>
+          </a:p>
+          <a:p>
+            <a:pPr lvl="2"/>
+            <a:r>
+              <a:rPr lang="de-AT" dirty="0"/>
+              <a:t>iOS</a:t>
+            </a:r>
+          </a:p>
+          <a:p>
+            <a:pPr lvl="2"/>
+            <a:r>
+              <a:rPr lang="de-AT" dirty="0"/>
+              <a:t>HTML5</a:t>
+            </a:r>
+          </a:p>
+          <a:p>
+            <a:r>
+              <a:rPr lang="de-AT" sz="2600" dirty="0"/>
+              <a:t>Mehr Info unter https://libgdx.badlogicgames.com/</a:t>
+            </a:r>
+          </a:p>
+          <a:p>
+            <a:pPr lvl="1"/>
+            <a:endParaRPr lang="de-AT" dirty="0"/>
+          </a:p>
+        </p:txBody>
+      </p:sp>
+      <p:sp>
+        <p:nvSpPr>
+          <p:cNvPr id="4" name="Datumsplatzhalter 3">
+            <a:extLst>
+              <a:ext uri="{FF2B5EF4-FFF2-40B4-BE49-F238E27FC236}">
+                <a16:creationId xmlns:a16="http://schemas.microsoft.com/office/drawing/2014/main" id="{E10D0D97-B391-40CB-A53D-C59E31B28FA7}"/>
+              </a:ext>
+            </a:extLst>
+          </p:cNvPr>
+          <p:cNvSpPr>
+            <a:spLocks noGrp="1"/>
+          </p:cNvSpPr>
+          <p:nvPr>
+            <p:ph type="dt" sz="half" idx="10"/>
+          </p:nvPr>
+        </p:nvSpPr>
+        <p:spPr/>
+        <p:txBody>
+          <a:bodyPr/>
+          <a:lstStyle/>
+          <a:p>
+            <a:fld id="{C5527C25-6B2E-4D57-B688-6E82BA7CFFE8}" type="datetime1">
+              <a:rPr lang="de-DE" smtClean="0"/>
+              <a:t>01.07.2017</a:t>
+            </a:fld>
+            <a:endParaRPr lang="de-DE"/>
+          </a:p>
+        </p:txBody>
+      </p:sp>
+      <p:sp>
+        <p:nvSpPr>
+          <p:cNvPr id="6" name="Foliennummernplatzhalter 5">
+            <a:extLst>
+              <a:ext uri="{FF2B5EF4-FFF2-40B4-BE49-F238E27FC236}">
+                <a16:creationId xmlns:a16="http://schemas.microsoft.com/office/drawing/2014/main" id="{E5B46D77-FF69-42D2-909C-7BA91223A99F}"/>
+              </a:ext>
+            </a:extLst>
+          </p:cNvPr>
+          <p:cNvSpPr>
+            <a:spLocks noGrp="1"/>
+          </p:cNvSpPr>
+          <p:nvPr>
+            <p:ph type="sldNum" sz="quarter" idx="12"/>
+          </p:nvPr>
+        </p:nvSpPr>
+        <p:spPr/>
+        <p:txBody>
+          <a:bodyPr/>
+          <a:lstStyle/>
+          <a:p>
+            <a:fld id="{6C6AE60A-B69C-4790-82F7-3882EDF23186}" type="slidenum">
+              <a:rPr lang="de-DE" smtClean="0"/>
+              <a:t>8</a:t>
+            </a:fld>
+            <a:endParaRPr lang="de-DE"/>
+          </a:p>
+        </p:txBody>
+      </p:sp>
+    </p:spTree>
+    <p:extLst>
+      <p:ext uri="{BB962C8B-B14F-4D97-AF65-F5344CB8AC3E}">
+        <p14:creationId xmlns:p14="http://schemas.microsoft.com/office/powerpoint/2010/main" val="3118299583"/>
+      </p:ext>
+    </p:extLst>
+  </p:cSld>
+  <p:clrMapOvr>
+    <a:masterClrMapping/>
+  </p:clrMapOvr>
+</p:sld>
+</file>
+
+<file path=ppt/slides/slide9.xml><?xml version="1.0" encoding="utf-8"?>
+<p:sld xmlns:a="http://schemas.openxmlformats.org/drawingml/2006/main" xmlns:r="http://schemas.openxmlformats.org/officeDocument/2006/relationships" xmlns:p="http://schemas.openxmlformats.org/presentationml/2006/main">
+  <p:cSld>
+    <p:spTree>
+      <p:nvGrpSpPr>
+        <p:cNvPr id="1" name=""/>
+        <p:cNvGrpSpPr/>
+        <p:nvPr/>
+      </p:nvGrpSpPr>
+      <p:grpSpPr>
+        <a:xfrm>
+          <a:off x="0" y="0"/>
+          <a:ext cx="0" cy="0"/>
+          <a:chOff x="0" y="0"/>
+          <a:chExt cx="0" cy="0"/>
+        </a:xfrm>
+      </p:grpSpPr>
+      <p:sp>
+        <p:nvSpPr>
+          <p:cNvPr id="2" name="Titel 1">
+            <a:extLst>
+              <a:ext uri="{FF2B5EF4-FFF2-40B4-BE49-F238E27FC236}">
+                <a16:creationId xmlns:a16="http://schemas.microsoft.com/office/drawing/2014/main" id="{3B6BC7AA-67B8-4973-85D2-5C6E002E9B58}"/>
+              </a:ext>
+            </a:extLst>
+          </p:cNvPr>
+          <p:cNvSpPr>
+            <a:spLocks noGrp="1"/>
+          </p:cNvSpPr>
+          <p:nvPr>
+            <p:ph type="title"/>
+          </p:nvPr>
+        </p:nvSpPr>
+        <p:spPr/>
+        <p:txBody>
+          <a:bodyPr/>
+          <a:lstStyle/>
+          <a:p>
+            <a:r>
+              <a:rPr lang="de-AT" dirty="0"/>
+              <a:t>Demo</a:t>
+            </a:r>
+          </a:p>
+        </p:txBody>
+      </p:sp>
+      <p:sp>
+        <p:nvSpPr>
+          <p:cNvPr id="3" name="Inhaltsplatzhalter 2">
+            <a:extLst>
+              <a:ext uri="{FF2B5EF4-FFF2-40B4-BE49-F238E27FC236}">
+                <a16:creationId xmlns:a16="http://schemas.microsoft.com/office/drawing/2014/main" id="{7875CACD-CF31-4C15-B665-239523EF88F3}"/>
+              </a:ext>
+            </a:extLst>
+          </p:cNvPr>
+          <p:cNvSpPr>
+            <a:spLocks noGrp="1"/>
+          </p:cNvSpPr>
+          <p:nvPr>
+            <p:ph idx="1"/>
+          </p:nvPr>
+        </p:nvSpPr>
+        <p:spPr/>
+        <p:txBody>
+          <a:bodyPr/>
+          <a:lstStyle/>
+          <a:p>
+            <a:r>
+              <a:rPr lang="de-AT" dirty="0"/>
+              <a:t>Screenshots / Video</a:t>
+            </a:r>
+          </a:p>
+        </p:txBody>
+      </p:sp>
+      <p:sp>
+        <p:nvSpPr>
+          <p:cNvPr id="4" name="Datumsplatzhalter 3">
+            <a:extLst>
+              <a:ext uri="{FF2B5EF4-FFF2-40B4-BE49-F238E27FC236}">
+                <a16:creationId xmlns:a16="http://schemas.microsoft.com/office/drawing/2014/main" id="{A5BC6079-6BB4-43D6-A397-9A1D47A067EF}"/>
+              </a:ext>
+            </a:extLst>
+          </p:cNvPr>
+          <p:cNvSpPr>
+            <a:spLocks noGrp="1"/>
+          </p:cNvSpPr>
+          <p:nvPr>
+            <p:ph type="dt" sz="half" idx="10"/>
+          </p:nvPr>
+        </p:nvSpPr>
+        <p:spPr/>
+        <p:txBody>
+          <a:bodyPr/>
+          <a:lstStyle/>
+          <a:p>
+            <a:fld id="{33426F46-14CA-4DF1-BDB6-9C38CC53B0B1}" type="datetime1">
+              <a:rPr lang="de-DE" smtClean="0"/>
+              <a:t>01.07.2017</a:t>
+            </a:fld>
+            <a:endParaRPr lang="de-DE"/>
+          </a:p>
+        </p:txBody>
+      </p:sp>
+      <p:sp>
+        <p:nvSpPr>
+          <p:cNvPr id="6" name="Foliennummernplatzhalter 5">
+            <a:extLst>
+              <a:ext uri="{FF2B5EF4-FFF2-40B4-BE49-F238E27FC236}">
+                <a16:creationId xmlns:a16="http://schemas.microsoft.com/office/drawing/2014/main" id="{366CF890-D1E4-44C0-A452-9991067C7D6D}"/>
+              </a:ext>
+            </a:extLst>
+          </p:cNvPr>
+          <p:cNvSpPr>
+            <a:spLocks noGrp="1"/>
+          </p:cNvSpPr>
+          <p:nvPr>
+            <p:ph type="sldNum" sz="quarter" idx="12"/>
+          </p:nvPr>
+        </p:nvSpPr>
+        <p:spPr/>
+        <p:txBody>
+          <a:bodyPr/>
+          <a:lstStyle/>
+          <a:p>
+            <a:fld id="{6C6AE60A-B69C-4790-82F7-3882EDF23186}" type="slidenum">
+              <a:rPr lang="de-DE" smtClean="0"/>
+              <a:t>9</a:t>
+            </a:fld>
+            <a:endParaRPr lang="de-DE"/>
+          </a:p>
+        </p:txBody>
+      </p:sp>
+    </p:spTree>
+    <p:extLst>
+      <p:ext uri="{BB962C8B-B14F-4D97-AF65-F5344CB8AC3E}">
+        <p14:creationId xmlns:p14="http://schemas.microsoft.com/office/powerpoint/2010/main" val="1442948324"/>
+      </p:ext>
+    </p:extLst>
+  </p:cSld>
+  <p:clrMapOvr>
+    <a:masterClrMapping/>
+  </p:clrMapOvr>
+</p:sld>
+</file>
+
 <file path=ppt/theme/theme1.xml><?xml version="1.0" encoding="utf-8"?>
 <a:theme xmlns:a="http://schemas.openxmlformats.org/drawingml/2006/main" name="Larissa-Design">
   <a:themeElements>
     <a:clrScheme name="Larissa">
       <a:dk1>
-        <a:sysClr val="windowText"/>
+        <a:sysClr val="windowText" lastClr="000000"/>
       </a:dk1>
       <a:lt1>
-        <a:sysClr val="window"/>
+        <a:sysClr val="window" lastClr="FFFFFF"/>
       </a:lt1>
       <a:dk2>
         <a:srgbClr val="1F497D"/>
@@ -3296,4 +5631,299 @@
   <a:objectDefaults/>
   <a:extraClrSchemeLst/>
 </a:theme>
+</file>
+
+<file path=ppt/theme/theme2.xml><?xml version="1.0" encoding="utf-8"?>
+<a:theme xmlns:a="http://schemas.openxmlformats.org/drawingml/2006/main" name="Office">
+  <a:themeElements>
+    <a:clrScheme name="Office">
+      <a:dk1>
+        <a:sysClr val="windowText" lastClr="000000"/>
+      </a:dk1>
+      <a:lt1>
+        <a:sysClr val="window" lastClr="FFFFFF"/>
+      </a:lt1>
+      <a:dk2>
+        <a:srgbClr val="44546A"/>
+      </a:dk2>
+      <a:lt2>
+        <a:srgbClr val="E7E6E6"/>
+      </a:lt2>
+      <a:accent1>
+        <a:srgbClr val="4472C4"/>
+      </a:accent1>
+      <a:accent2>
+        <a:srgbClr val="ED7D31"/>
+      </a:accent2>
+      <a:accent3>
+        <a:srgbClr val="A5A5A5"/>
+      </a:accent3>
+      <a:accent4>
+        <a:srgbClr val="FFC000"/>
+      </a:accent4>
+      <a:accent5>
+        <a:srgbClr val="5B9BD5"/>
+      </a:accent5>
+      <a:accent6>
+        <a:srgbClr val="70AD47"/>
+      </a:accent6>
+      <a:hlink>
+        <a:srgbClr val="0563C1"/>
+      </a:hlink>
+      <a:folHlink>
+        <a:srgbClr val="954F72"/>
+      </a:folHlink>
+    </a:clrScheme>
+    <a:fontScheme name="Office">
+      <a:majorFont>
+        <a:latin typeface="Calibri Light" panose="020F0302020204030204"/>
+        <a:ea typeface=""/>
+        <a:cs typeface=""/>
+        <a:font script="Jpan" typeface="游ゴシック Light"/>
+        <a:font script="Hang" typeface="맑은 고딕"/>
+        <a:font script="Hans" typeface="等线 Light"/>
+        <a:font script="Hant" typeface="新細明體"/>
+        <a:font script="Arab" typeface="Times New Roman"/>
+        <a:font script="Hebr" typeface="Times New Roman"/>
+        <a:font script="Thai" typeface="Angsana New"/>
+        <a:font script="Ethi" typeface="Nyala"/>
+        <a:font script="Beng" typeface="Vrinda"/>
+        <a:font script="Gujr" typeface="Shruti"/>
+        <a:font script="Khmr" typeface="MoolBoran"/>
+        <a:font script="Knda" typeface="Tunga"/>
+        <a:font script="Guru" typeface="Raavi"/>
+        <a:font script="Cans" typeface="Euphemia"/>
+        <a:font script="Cher" typeface="Plantagenet Cherokee"/>
+        <a:font script="Yiii" typeface="Microsoft Yi Baiti"/>
+        <a:font script="Tibt" typeface="Microsoft Himalaya"/>
+        <a:font script="Thaa" typeface="MV Boli"/>
+        <a:font script="Deva" typeface="Mangal"/>
+        <a:font script="Telu" typeface="Gautami"/>
+        <a:font script="Taml" typeface="Latha"/>
+        <a:font script="Syrc" typeface="Estrangelo Edessa"/>
+        <a:font script="Orya" typeface="Kalinga"/>
+        <a:font script="Mlym" typeface="Kartika"/>
+        <a:font script="Laoo" typeface="DokChampa"/>
+        <a:font script="Sinh" typeface="Iskoola Pota"/>
+        <a:font script="Mong" typeface="Mongolian Baiti"/>
+        <a:font script="Viet" typeface="Times New Roman"/>
+        <a:font script="Uigh" typeface="Microsoft Uighur"/>
+        <a:font script="Geor" typeface="Sylfaen"/>
+        <a:font script="Armn" typeface="Arial"/>
+        <a:font script="Bugi" typeface="Leelawadee UI"/>
+        <a:font script="Bopo" typeface="Microsoft JhengHei"/>
+        <a:font script="Java" typeface="Javanese Text"/>
+        <a:font script="Lisu" typeface="Segoe UI"/>
+        <a:font script="Mymr" typeface="Myanmar Text"/>
+        <a:font script="Nkoo" typeface="Ebrima"/>
+        <a:font script="Olck" typeface="Nirmala UI"/>
+        <a:font script="Osma" typeface="Ebrima"/>
+        <a:font script="Phag" typeface="Phagspa"/>
+        <a:font script="Syrn" typeface="Estrangelo Edessa"/>
+        <a:font script="Syrj" typeface="Estrangelo Edessa"/>
+        <a:font script="Syre" typeface="Estrangelo Edessa"/>
+        <a:font script="Sora" typeface="Nirmala UI"/>
+        <a:font script="Tale" typeface="Microsoft Tai Le"/>
+        <a:font script="Talu" typeface="Microsoft New Tai Lue"/>
+        <a:font script="Tfng" typeface="Ebrima"/>
+      </a:majorFont>
+      <a:minorFont>
+        <a:latin typeface="Calibri" panose="020F0502020204030204"/>
+        <a:ea typeface=""/>
+        <a:cs typeface=""/>
+        <a:font script="Jpan" typeface="游ゴシック"/>
+        <a:font script="Hang" typeface="맑은 고딕"/>
+        <a:font script="Hans" typeface="等线"/>
+        <a:font script="Hant" typeface="新細明體"/>
+        <a:font script="Arab" typeface="Arial"/>
+        <a:font script="Hebr" typeface="Arial"/>
+        <a:font script="Thai" typeface="Cordia New"/>
+        <a:font script="Ethi" typeface="Nyala"/>
+        <a:font script="Beng" typeface="Vrinda"/>
+        <a:font script="Gujr" typeface="Shruti"/>
+        <a:font script="Khmr" typeface="DaunPenh"/>
+        <a:font script="Knda" typeface="Tunga"/>
+        <a:font script="Guru" typeface="Raavi"/>
+        <a:font script="Cans" typeface="Euphemia"/>
+        <a:font script="Cher" typeface="Plantagenet Cherokee"/>
+        <a:font script="Yiii" typeface="Microsoft Yi Baiti"/>
+        <a:font script="Tibt" typeface="Microsoft Himalaya"/>
+        <a:font script="Thaa" typeface="MV Boli"/>
+        <a:font script="Deva" typeface="Mangal"/>
+        <a:font script="Telu" typeface="Gautami"/>
+        <a:font script="Taml" typeface="Latha"/>
+        <a:font script="Syrc" typeface="Estrangelo Edessa"/>
+        <a:font script="Orya" typeface="Kalinga"/>
+        <a:font script="Mlym" typeface="Kartika"/>
+        <a:font script="Laoo" typeface="DokChampa"/>
+        <a:font script="Sinh" typeface="Iskoola Pota"/>
+        <a:font script="Mong" typeface="Mongolian Baiti"/>
+        <a:font script="Viet" typeface="Arial"/>
+        <a:font script="Uigh" typeface="Microsoft Uighur"/>
+        <a:font script="Geor" typeface="Sylfaen"/>
+        <a:font script="Armn" typeface="Arial"/>
+        <a:font script="Bugi" typeface="Leelawadee UI"/>
+        <a:font script="Bopo" typeface="Microsoft JhengHei"/>
+        <a:font script="Java" typeface="Javanese Text"/>
+        <a:font script="Lisu" typeface="Segoe UI"/>
+        <a:font script="Mymr" typeface="Myanmar Text"/>
+        <a:font script="Nkoo" typeface="Ebrima"/>
+        <a:font script="Olck" typeface="Nirmala UI"/>
+        <a:font script="Osma" typeface="Ebrima"/>
+        <a:font script="Phag" typeface="Phagspa"/>
+        <a:font script="Syrn" typeface="Estrangelo Edessa"/>
+        <a:font script="Syrj" typeface="Estrangelo Edessa"/>
+        <a:font script="Syre" typeface="Estrangelo Edessa"/>
+        <a:font script="Sora" typeface="Nirmala UI"/>
+        <a:font script="Tale" typeface="Microsoft Tai Le"/>
+        <a:font script="Talu" typeface="Microsoft New Tai Lue"/>
+        <a:font script="Tfng" typeface="Ebrima"/>
+      </a:minorFont>
+    </a:fontScheme>
+    <a:fmtScheme name="Office">
+      <a:fillStyleLst>
+        <a:solidFill>
+          <a:schemeClr val="phClr"/>
+        </a:solidFill>
+        <a:gradFill rotWithShape="1">
+          <a:gsLst>
+            <a:gs pos="0">
+              <a:schemeClr val="phClr">
+                <a:lumMod val="110000"/>
+                <a:satMod val="105000"/>
+                <a:tint val="67000"/>
+              </a:schemeClr>
+            </a:gs>
+            <a:gs pos="50000">
+              <a:schemeClr val="phClr">
+                <a:lumMod val="105000"/>
+                <a:satMod val="103000"/>
+                <a:tint val="73000"/>
+              </a:schemeClr>
+            </a:gs>
+            <a:gs pos="100000">
+              <a:schemeClr val="phClr">
+                <a:lumMod val="105000"/>
+                <a:satMod val="109000"/>
+                <a:tint val="81000"/>
+              </a:schemeClr>
+            </a:gs>
+          </a:gsLst>
+          <a:lin ang="5400000" scaled="0"/>
+        </a:gradFill>
+        <a:gradFill rotWithShape="1">
+          <a:gsLst>
+            <a:gs pos="0">
+              <a:schemeClr val="phClr">
+                <a:satMod val="103000"/>
+                <a:lumMod val="102000"/>
+                <a:tint val="94000"/>
+              </a:schemeClr>
+            </a:gs>
+            <a:gs pos="50000">
+              <a:schemeClr val="phClr">
+                <a:satMod val="110000"/>
+                <a:lumMod val="100000"/>
+                <a:shade val="100000"/>
+              </a:schemeClr>
+            </a:gs>
+            <a:gs pos="100000">
+              <a:schemeClr val="phClr">
+                <a:lumMod val="99000"/>
+                <a:satMod val="120000"/>
+                <a:shade val="78000"/>
+              </a:schemeClr>
+            </a:gs>
+          </a:gsLst>
+          <a:lin ang="5400000" scaled="0"/>
+        </a:gradFill>
+      </a:fillStyleLst>
+      <a:lnStyleLst>
+        <a:ln w="6350" cap="flat" cmpd="sng" algn="ctr">
+          <a:solidFill>
+            <a:schemeClr val="phClr"/>
+          </a:solidFill>
+          <a:prstDash val="solid"/>
+          <a:miter lim="800000"/>
+        </a:ln>
+        <a:ln w="12700" cap="flat" cmpd="sng" algn="ctr">
+          <a:solidFill>
+            <a:schemeClr val="phClr"/>
+          </a:solidFill>
+          <a:prstDash val="solid"/>
+          <a:miter lim="800000"/>
+        </a:ln>
+        <a:ln w="19050" cap="flat" cmpd="sng" algn="ctr">
+          <a:solidFill>
+            <a:schemeClr val="phClr"/>
+          </a:solidFill>
+          <a:prstDash val="solid"/>
+          <a:miter lim="800000"/>
+        </a:ln>
+      </a:lnStyleLst>
+      <a:effectStyleLst>
+        <a:effectStyle>
+          <a:effectLst/>
+        </a:effectStyle>
+        <a:effectStyle>
+          <a:effectLst/>
+        </a:effectStyle>
+        <a:effectStyle>
+          <a:effectLst>
+            <a:outerShdw blurRad="57150" dist="19050" dir="5400000" algn="ctr" rotWithShape="0">
+              <a:srgbClr val="000000">
+                <a:alpha val="63000"/>
+              </a:srgbClr>
+            </a:outerShdw>
+          </a:effectLst>
+        </a:effectStyle>
+      </a:effectStyleLst>
+      <a:bgFillStyleLst>
+        <a:solidFill>
+          <a:schemeClr val="phClr"/>
+        </a:solidFill>
+        <a:solidFill>
+          <a:schemeClr val="phClr">
+            <a:tint val="95000"/>
+            <a:satMod val="170000"/>
+          </a:schemeClr>
+        </a:solidFill>
+        <a:gradFill rotWithShape="1">
+          <a:gsLst>
+            <a:gs pos="0">
+              <a:schemeClr val="phClr">
+                <a:tint val="93000"/>
+                <a:satMod val="150000"/>
+                <a:shade val="98000"/>
+                <a:lumMod val="102000"/>
+              </a:schemeClr>
+            </a:gs>
+            <a:gs pos="50000">
+              <a:schemeClr val="phClr">
+                <a:tint val="98000"/>
+                <a:satMod val="130000"/>
+                <a:shade val="90000"/>
+                <a:lumMod val="103000"/>
+              </a:schemeClr>
+            </a:gs>
+            <a:gs pos="100000">
+              <a:schemeClr val="phClr">
+                <a:shade val="63000"/>
+                <a:satMod val="120000"/>
+              </a:schemeClr>
+            </a:gs>
+          </a:gsLst>
+          <a:lin ang="5400000" scaled="0"/>
+        </a:gradFill>
+      </a:bgFillStyleLst>
+    </a:fmtScheme>
+  </a:themeElements>
+  <a:objectDefaults/>
+  <a:extraClrSchemeLst/>
+  <a:extLst>
+    <a:ext uri="{05A4C25C-085E-4340-85A3-A5531E510DB2}">
+      <thm15:themeFamily xmlns:thm15="http://schemas.microsoft.com/office/thememl/2012/main" name="Office Theme" id="{62F939B6-93AF-4DB8-9C6B-D6C7DFDC589F}" vid="{4A3C46E8-61CC-4603-A589-7422A47A8E4A}"/>
+    </a:ext>
+  </a:extLst>
+</a:theme>
 </file>
</xml_diff>

<commit_message>
changed Tower Graphics, freeTiles in Model and some Documents
</commit_message>
<xml_diff>
--- a/svn/JG16S17P06/trunk/Documentation/ProjectDocumentation/Presentation.pptx
+++ b/svn/JG16S17P06/trunk/Documentation/ProjectDocumentation/Presentation.pptx
@@ -221,7 +221,7 @@
           <a:p>
             <a:fld id="{46C2B02B-D0B1-402B-AD15-9AD2711B2FBB}" type="datetimeFigureOut">
               <a:rPr lang="de-AT" smtClean="0"/>
-              <a:t>01.07.2017</a:t>
+              <a:t>02.07.2017</a:t>
             </a:fld>
             <a:endParaRPr lang="de-AT"/>
           </a:p>
@@ -774,7 +774,7 @@
           <a:p>
             <a:fld id="{154BAE7E-5592-4324-98B0-A02BD84EF6BB}" type="datetime1">
               <a:rPr lang="de-DE" smtClean="0"/>
-              <a:t>01.07.2017</a:t>
+              <a:t>02.07.2017</a:t>
             </a:fld>
             <a:endParaRPr lang="de-DE"/>
           </a:p>
@@ -952,7 +952,7 @@
           <a:p>
             <a:fld id="{149E5939-272F-4759-A2BF-C86F5993F02B}" type="datetime1">
               <a:rPr lang="de-DE" smtClean="0"/>
-              <a:t>01.07.2017</a:t>
+              <a:t>02.07.2017</a:t>
             </a:fld>
             <a:endParaRPr lang="de-DE"/>
           </a:p>
@@ -1128,7 +1128,7 @@
           <a:p>
             <a:fld id="{954D2159-BB7A-45BA-96F9-E016371DC7CC}" type="datetime1">
               <a:rPr lang="de-DE" smtClean="0"/>
-              <a:t>01.07.2017</a:t>
+              <a:t>02.07.2017</a:t>
             </a:fld>
             <a:endParaRPr lang="de-DE"/>
           </a:p>
@@ -1294,7 +1294,7 @@
           <a:p>
             <a:fld id="{D0495679-6854-4CEB-AB4A-7941CB807E4C}" type="datetime1">
               <a:rPr lang="de-DE" smtClean="0"/>
-              <a:t>01.07.2017</a:t>
+              <a:t>02.07.2017</a:t>
             </a:fld>
             <a:endParaRPr lang="de-DE"/>
           </a:p>
@@ -1537,7 +1537,7 @@
           <a:p>
             <a:fld id="{C9FD33F6-9596-4B42-B111-E507BE577142}" type="datetime1">
               <a:rPr lang="de-DE" smtClean="0"/>
-              <a:t>01.07.2017</a:t>
+              <a:t>02.07.2017</a:t>
             </a:fld>
             <a:endParaRPr lang="de-DE"/>
           </a:p>
@@ -1820,7 +1820,7 @@
           <a:p>
             <a:fld id="{DC0F5FB0-7DC9-4C66-B7EF-2A84AA2093B1}" type="datetime1">
               <a:rPr lang="de-DE" smtClean="0"/>
-              <a:t>01.07.2017</a:t>
+              <a:t>02.07.2017</a:t>
             </a:fld>
             <a:endParaRPr lang="de-DE"/>
           </a:p>
@@ -2237,7 +2237,7 @@
           <a:p>
             <a:fld id="{C44DDAA9-F232-4B8A-A772-1EDD6590F997}" type="datetime1">
               <a:rPr lang="de-DE" smtClean="0"/>
-              <a:t>01.07.2017</a:t>
+              <a:t>02.07.2017</a:t>
             </a:fld>
             <a:endParaRPr lang="de-DE"/>
           </a:p>
@@ -2352,7 +2352,7 @@
           <a:p>
             <a:fld id="{2B49DEEB-6EEE-4CB5-9938-F627F0B10E62}" type="datetime1">
               <a:rPr lang="de-DE" smtClean="0"/>
-              <a:t>01.07.2017</a:t>
+              <a:t>02.07.2017</a:t>
             </a:fld>
             <a:endParaRPr lang="de-DE"/>
           </a:p>
@@ -2445,7 +2445,7 @@
           <a:p>
             <a:fld id="{5263656D-AFA4-4376-BB4A-5585C07D4822}" type="datetime1">
               <a:rPr lang="de-DE" smtClean="0"/>
-              <a:t>01.07.2017</a:t>
+              <a:t>02.07.2017</a:t>
             </a:fld>
             <a:endParaRPr lang="de-DE"/>
           </a:p>
@@ -2718,7 +2718,7 @@
           <a:p>
             <a:fld id="{AB09C56F-9782-4DBB-BF0F-F68A743FAA25}" type="datetime1">
               <a:rPr lang="de-DE" smtClean="0"/>
-              <a:t>01.07.2017</a:t>
+              <a:t>02.07.2017</a:t>
             </a:fld>
             <a:endParaRPr lang="de-DE"/>
           </a:p>
@@ -2968,7 +2968,7 @@
           <a:p>
             <a:fld id="{8BBFEB6A-7563-4909-825C-997C7F15FC15}" type="datetime1">
               <a:rPr lang="de-DE" smtClean="0"/>
-              <a:t>01.07.2017</a:t>
+              <a:t>02.07.2017</a:t>
             </a:fld>
             <a:endParaRPr lang="de-DE"/>
           </a:p>
@@ -3253,7 +3253,7 @@
           <a:p>
             <a:fld id="{837B529E-E57A-4FB3-9945-F3D934678812}" type="datetime1">
               <a:rPr lang="de-DE" smtClean="0"/>
-              <a:t>01.07.2017</a:t>
+              <a:t>02.07.2017</a:t>
             </a:fld>
             <a:endParaRPr lang="de-DE"/>
           </a:p>
@@ -3967,7 +3967,7 @@
           <a:p>
             <a:fld id="{02ADD0D4-00E3-4723-A997-B7ECBE092E9F}" type="datetime1">
               <a:rPr lang="de-DE" smtClean="0"/>
-              <a:t>01.07.2017</a:t>
+              <a:t>02.07.2017</a:t>
             </a:fld>
             <a:endParaRPr lang="de-DE"/>
           </a:p>
@@ -4145,7 +4145,7 @@
           <a:p>
             <a:fld id="{18E7F602-EAB1-4D9C-A126-7CEAF968CD02}" type="datetime1">
               <a:rPr lang="de-DE" smtClean="0"/>
-              <a:t>01.07.2017</a:t>
+              <a:t>02.07.2017</a:t>
             </a:fld>
             <a:endParaRPr lang="de-DE"/>
           </a:p>
@@ -4293,14 +4293,14 @@
             <a:pPr lvl="1"/>
             <a:r>
               <a:rPr lang="de-AT" dirty="0"/>
-              <a:t>Portabilität auf verschiedenen Betriebssystemen</a:t>
+              <a:t>Portabilität auf verschiedenen Betriebssystemen möglich</a:t>
             </a:r>
           </a:p>
           <a:p>
             <a:pPr lvl="1"/>
             <a:r>
               <a:rPr lang="de-AT" dirty="0"/>
-              <a:t>Umsetzung in Android und iOS</a:t>
+              <a:t>Umsetzung in Android</a:t>
             </a:r>
           </a:p>
           <a:p>
@@ -4331,7 +4331,7 @@
           <a:p>
             <a:fld id="{F83B068E-C841-4FCE-9865-15D345EDA850}" type="datetime1">
               <a:rPr lang="de-DE" smtClean="0"/>
-              <a:t>01.07.2017</a:t>
+              <a:t>02.07.2017</a:t>
             </a:fld>
             <a:endParaRPr lang="de-DE"/>
           </a:p>
@@ -4516,7 +4516,7 @@
           <a:p>
             <a:fld id="{C9BA90A9-2353-4EC3-B836-FAEAEFE0FE65}" type="datetime1">
               <a:rPr lang="de-DE" smtClean="0"/>
-              <a:t>01.07.2017</a:t>
+              <a:t>02.07.2017</a:t>
             </a:fld>
             <a:endParaRPr lang="de-DE"/>
           </a:p>
@@ -4641,14 +4641,14 @@
             <a:pPr lvl="1"/>
             <a:r>
               <a:rPr lang="de-AT" dirty="0"/>
-              <a:t>… Sekunden Zeit</a:t>
+              <a:t>20 Sekunden Zeit</a:t>
             </a:r>
           </a:p>
           <a:p>
             <a:pPr lvl="1"/>
             <a:r>
               <a:rPr lang="de-AT" dirty="0"/>
-              <a:t>Startkapital: … Gold</a:t>
+              <a:t>Startkapital: 100 Gold</a:t>
             </a:r>
           </a:p>
           <a:p>
@@ -4742,7 +4742,7 @@
           <a:p>
             <a:fld id="{D018EF64-FBD4-4BF5-B01A-1958132ED163}" type="datetime1">
               <a:rPr lang="de-DE" smtClean="0"/>
-              <a:t>01.07.2017</a:t>
+              <a:t>02.07.2017</a:t>
             </a:fld>
             <a:endParaRPr lang="de-DE"/>
           </a:p>
@@ -4884,7 +4884,7 @@
           <a:p>
             <a:r>
               <a:rPr lang="de-AT" dirty="0"/>
-              <a:t>Android:</a:t>
+              <a:t>Android-Umsetzung:</a:t>
             </a:r>
           </a:p>
           <a:p>
@@ -4895,24 +4895,29 @@
             </a:r>
           </a:p>
           <a:p>
+            <a:pPr lvl="1"/>
             <a:r>
               <a:rPr lang="de-AT" dirty="0"/>
-              <a:t>iOS</a:t>
-            </a:r>
-          </a:p>
-          <a:p>
-            <a:pPr lvl="1"/>
+              <a:t>Grafiken: </a:t>
+            </a:r>
+            <a:r>
+              <a:rPr lang="de-AT" dirty="0" err="1"/>
+              <a:t>Tiled</a:t>
+            </a:r>
             <a:r>
               <a:rPr lang="de-AT" dirty="0"/>
-              <a:t>Android Studio, </a:t>
+              <a:t>, </a:t>
             </a:r>
             <a:r>
               <a:rPr lang="de-AT" dirty="0" err="1"/>
-              <a:t>Xcode</a:t>
+              <a:t>TextureMaker</a:t>
             </a:r>
             <a:endParaRPr lang="de-AT" dirty="0"/>
           </a:p>
           <a:p>
+            <a:pPr marL="0" indent="0">
+              <a:buNone/>
+            </a:pPr>
             <a:endParaRPr lang="de-AT" dirty="0"/>
           </a:p>
           <a:p>
@@ -4944,7 +4949,7 @@
           <a:p>
             <a:fld id="{0F958EBF-1DD2-48CD-AC05-99BB382075B8}" type="datetime1">
               <a:rPr lang="de-DE" smtClean="0"/>
-              <a:t>01.07.2017</a:t>
+              <a:t>02.07.2017</a:t>
             </a:fld>
             <a:endParaRPr lang="de-DE"/>
           </a:p>
@@ -5158,7 +5163,7 @@
           <a:p>
             <a:fld id="{C5527C25-6B2E-4D57-B688-6E82BA7CFFE8}" type="datetime1">
               <a:rPr lang="de-DE" smtClean="0"/>
-              <a:t>01.07.2017</a:t>
+              <a:t>02.07.2017</a:t>
             </a:fld>
             <a:endParaRPr lang="de-DE"/>
           </a:p>
@@ -5302,7 +5307,7 @@
           <a:p>
             <a:fld id="{33426F46-14CA-4DF1-BDB6-9C38CC53B0B1}" type="datetime1">
               <a:rPr lang="de-DE" smtClean="0"/>
-              <a:t>01.07.2017</a:t>
+              <a:t>02.07.2017</a:t>
             </a:fld>
             <a:endParaRPr lang="de-DE"/>
           </a:p>

</xml_diff>

<commit_message>
added Particles for every element
</commit_message>
<xml_diff>
--- a/svn/JG16S17P06/trunk/Documentation/ProjectDocumentation/Presentation.pptx
+++ b/svn/JG16S17P06/trunk/Documentation/ProjectDocumentation/Presentation.pptx
@@ -5,7 +5,7 @@
     <p:sldMasterId id="2147483648" r:id="rId1"/>
   </p:sldMasterIdLst>
   <p:notesMasterIdLst>
-    <p:notesMasterId r:id="rId12"/>
+    <p:notesMasterId r:id="rId17"/>
   </p:notesMasterIdLst>
   <p:sldIdLst>
     <p:sldId id="256" r:id="rId2"/>
@@ -14,10 +14,15 @@
     <p:sldId id="260" r:id="rId5"/>
     <p:sldId id="264" r:id="rId6"/>
     <p:sldId id="265" r:id="rId7"/>
-    <p:sldId id="261" r:id="rId8"/>
-    <p:sldId id="263" r:id="rId9"/>
-    <p:sldId id="262" r:id="rId10"/>
-    <p:sldId id="258" r:id="rId11"/>
+    <p:sldId id="269" r:id="rId8"/>
+    <p:sldId id="270" r:id="rId9"/>
+    <p:sldId id="261" r:id="rId10"/>
+    <p:sldId id="267" r:id="rId11"/>
+    <p:sldId id="268" r:id="rId12"/>
+    <p:sldId id="263" r:id="rId13"/>
+    <p:sldId id="262" r:id="rId14"/>
+    <p:sldId id="266" r:id="rId15"/>
+    <p:sldId id="258" r:id="rId16"/>
   </p:sldIdLst>
   <p:sldSz cx="9144000" cy="6858000" type="screen4x3"/>
   <p:notesSz cx="6858000" cy="9144000"/>
@@ -221,7 +226,7 @@
           <a:p>
             <a:fld id="{46C2B02B-D0B1-402B-AD15-9AD2711B2FBB}" type="datetimeFigureOut">
               <a:rPr lang="de-AT" smtClean="0"/>
-              <a:t>02.07.2017</a:t>
+              <a:t>03.07.2017</a:t>
             </a:fld>
             <a:endParaRPr lang="de-AT"/>
           </a:p>
@@ -774,7 +779,7 @@
           <a:p>
             <a:fld id="{154BAE7E-5592-4324-98B0-A02BD84EF6BB}" type="datetime1">
               <a:rPr lang="de-DE" smtClean="0"/>
-              <a:t>02.07.2017</a:t>
+              <a:t>03.07.2017</a:t>
             </a:fld>
             <a:endParaRPr lang="de-DE"/>
           </a:p>
@@ -952,7 +957,7 @@
           <a:p>
             <a:fld id="{149E5939-272F-4759-A2BF-C86F5993F02B}" type="datetime1">
               <a:rPr lang="de-DE" smtClean="0"/>
-              <a:t>02.07.2017</a:t>
+              <a:t>03.07.2017</a:t>
             </a:fld>
             <a:endParaRPr lang="de-DE"/>
           </a:p>
@@ -1128,7 +1133,7 @@
           <a:p>
             <a:fld id="{954D2159-BB7A-45BA-96F9-E016371DC7CC}" type="datetime1">
               <a:rPr lang="de-DE" smtClean="0"/>
-              <a:t>02.07.2017</a:t>
+              <a:t>03.07.2017</a:t>
             </a:fld>
             <a:endParaRPr lang="de-DE"/>
           </a:p>
@@ -1294,7 +1299,7 @@
           <a:p>
             <a:fld id="{D0495679-6854-4CEB-AB4A-7941CB807E4C}" type="datetime1">
               <a:rPr lang="de-DE" smtClean="0"/>
-              <a:t>02.07.2017</a:t>
+              <a:t>03.07.2017</a:t>
             </a:fld>
             <a:endParaRPr lang="de-DE"/>
           </a:p>
@@ -1537,7 +1542,7 @@
           <a:p>
             <a:fld id="{C9FD33F6-9596-4B42-B111-E507BE577142}" type="datetime1">
               <a:rPr lang="de-DE" smtClean="0"/>
-              <a:t>02.07.2017</a:t>
+              <a:t>03.07.2017</a:t>
             </a:fld>
             <a:endParaRPr lang="de-DE"/>
           </a:p>
@@ -1820,7 +1825,7 @@
           <a:p>
             <a:fld id="{DC0F5FB0-7DC9-4C66-B7EF-2A84AA2093B1}" type="datetime1">
               <a:rPr lang="de-DE" smtClean="0"/>
-              <a:t>02.07.2017</a:t>
+              <a:t>03.07.2017</a:t>
             </a:fld>
             <a:endParaRPr lang="de-DE"/>
           </a:p>
@@ -2237,7 +2242,7 @@
           <a:p>
             <a:fld id="{C44DDAA9-F232-4B8A-A772-1EDD6590F997}" type="datetime1">
               <a:rPr lang="de-DE" smtClean="0"/>
-              <a:t>02.07.2017</a:t>
+              <a:t>03.07.2017</a:t>
             </a:fld>
             <a:endParaRPr lang="de-DE"/>
           </a:p>
@@ -2352,7 +2357,7 @@
           <a:p>
             <a:fld id="{2B49DEEB-6EEE-4CB5-9938-F627F0B10E62}" type="datetime1">
               <a:rPr lang="de-DE" smtClean="0"/>
-              <a:t>02.07.2017</a:t>
+              <a:t>03.07.2017</a:t>
             </a:fld>
             <a:endParaRPr lang="de-DE"/>
           </a:p>
@@ -2445,7 +2450,7 @@
           <a:p>
             <a:fld id="{5263656D-AFA4-4376-BB4A-5585C07D4822}" type="datetime1">
               <a:rPr lang="de-DE" smtClean="0"/>
-              <a:t>02.07.2017</a:t>
+              <a:t>03.07.2017</a:t>
             </a:fld>
             <a:endParaRPr lang="de-DE"/>
           </a:p>
@@ -2718,7 +2723,7 @@
           <a:p>
             <a:fld id="{AB09C56F-9782-4DBB-BF0F-F68A743FAA25}" type="datetime1">
               <a:rPr lang="de-DE" smtClean="0"/>
-              <a:t>02.07.2017</a:t>
+              <a:t>03.07.2017</a:t>
             </a:fld>
             <a:endParaRPr lang="de-DE"/>
           </a:p>
@@ -2968,7 +2973,7 @@
           <a:p>
             <a:fld id="{8BBFEB6A-7563-4909-825C-997C7F15FC15}" type="datetime1">
               <a:rPr lang="de-DE" smtClean="0"/>
-              <a:t>02.07.2017</a:t>
+              <a:t>03.07.2017</a:t>
             </a:fld>
             <a:endParaRPr lang="de-DE"/>
           </a:p>
@@ -3253,7 +3258,7 @@
           <a:p>
             <a:fld id="{837B529E-E57A-4FB3-9945-F3D934678812}" type="datetime1">
               <a:rPr lang="de-DE" smtClean="0"/>
-              <a:t>02.07.2017</a:t>
+              <a:t>03.07.2017</a:t>
             </a:fld>
             <a:endParaRPr lang="de-DE"/>
           </a:p>
@@ -3801,6 +3806,1073 @@
           <p:cNvPr id="2" name="Titel 1">
             <a:extLst>
               <a:ext uri="{FF2B5EF4-FFF2-40B4-BE49-F238E27FC236}">
+                <a16:creationId xmlns:a16="http://schemas.microsoft.com/office/drawing/2014/main" id="{2FA90D56-829F-4964-AB34-121FCAEB93A8}"/>
+              </a:ext>
+            </a:extLst>
+          </p:cNvPr>
+          <p:cNvSpPr>
+            <a:spLocks noGrp="1"/>
+          </p:cNvSpPr>
+          <p:nvPr>
+            <p:ph type="title"/>
+          </p:nvPr>
+        </p:nvSpPr>
+        <p:spPr/>
+        <p:txBody>
+          <a:bodyPr>
+            <a:normAutofit/>
+          </a:bodyPr>
+          <a:lstStyle/>
+          <a:p>
+            <a:r>
+              <a:rPr lang="de-AT" dirty="0" err="1"/>
+              <a:t>Tiled</a:t>
+            </a:r>
+            <a:r>
+              <a:rPr lang="de-AT" dirty="0"/>
+              <a:t> Map Editor			</a:t>
+            </a:r>
+          </a:p>
+        </p:txBody>
+      </p:sp>
+      <p:sp>
+        <p:nvSpPr>
+          <p:cNvPr id="3" name="Inhaltsplatzhalter 2">
+            <a:extLst>
+              <a:ext uri="{FF2B5EF4-FFF2-40B4-BE49-F238E27FC236}">
+                <a16:creationId xmlns:a16="http://schemas.microsoft.com/office/drawing/2014/main" id="{98114732-FBB3-4FE3-9C63-00F20E5B5E1E}"/>
+              </a:ext>
+            </a:extLst>
+          </p:cNvPr>
+          <p:cNvSpPr>
+            <a:spLocks noGrp="1"/>
+          </p:cNvSpPr>
+          <p:nvPr>
+            <p:ph idx="1"/>
+          </p:nvPr>
+        </p:nvSpPr>
+        <p:spPr/>
+        <p:txBody>
+          <a:bodyPr/>
+          <a:lstStyle/>
+          <a:p>
+            <a:r>
+              <a:rPr lang="de-AT" dirty="0"/>
+              <a:t>Ermöglicht Karte zu zeichnen</a:t>
+            </a:r>
+          </a:p>
+          <a:p>
+            <a:pPr lvl="1"/>
+            <a:r>
+              <a:rPr lang="de-AT" dirty="0"/>
+              <a:t>Aufgebaut als Raster</a:t>
+            </a:r>
+          </a:p>
+          <a:p>
+            <a:pPr lvl="1"/>
+            <a:r>
+              <a:rPr lang="de-AT" dirty="0"/>
+              <a:t>Definieren von Positionen für Elemente</a:t>
+            </a:r>
+          </a:p>
+          <a:p>
+            <a:endParaRPr lang="de-AT" dirty="0"/>
+          </a:p>
+        </p:txBody>
+      </p:sp>
+      <p:sp>
+        <p:nvSpPr>
+          <p:cNvPr id="4" name="Datumsplatzhalter 3">
+            <a:extLst>
+              <a:ext uri="{FF2B5EF4-FFF2-40B4-BE49-F238E27FC236}">
+                <a16:creationId xmlns:a16="http://schemas.microsoft.com/office/drawing/2014/main" id="{24ED1138-0337-40ED-ACE4-ED676E80D1AE}"/>
+              </a:ext>
+            </a:extLst>
+          </p:cNvPr>
+          <p:cNvSpPr>
+            <a:spLocks noGrp="1"/>
+          </p:cNvSpPr>
+          <p:nvPr>
+            <p:ph type="dt" sz="half" idx="10"/>
+          </p:nvPr>
+        </p:nvSpPr>
+        <p:spPr/>
+        <p:txBody>
+          <a:bodyPr/>
+          <a:lstStyle/>
+          <a:p>
+            <a:fld id="{D0495679-6854-4CEB-AB4A-7941CB807E4C}" type="datetime1">
+              <a:rPr lang="de-DE" smtClean="0"/>
+              <a:t>03.07.2017</a:t>
+            </a:fld>
+            <a:endParaRPr lang="de-DE"/>
+          </a:p>
+        </p:txBody>
+      </p:sp>
+      <p:sp>
+        <p:nvSpPr>
+          <p:cNvPr id="5" name="Foliennummernplatzhalter 4">
+            <a:extLst>
+              <a:ext uri="{FF2B5EF4-FFF2-40B4-BE49-F238E27FC236}">
+                <a16:creationId xmlns:a16="http://schemas.microsoft.com/office/drawing/2014/main" id="{805DD756-C2E2-4E3E-A3E5-544F23D269DA}"/>
+              </a:ext>
+            </a:extLst>
+          </p:cNvPr>
+          <p:cNvSpPr>
+            <a:spLocks noGrp="1"/>
+          </p:cNvSpPr>
+          <p:nvPr>
+            <p:ph type="sldNum" sz="quarter" idx="12"/>
+          </p:nvPr>
+        </p:nvSpPr>
+        <p:spPr/>
+        <p:txBody>
+          <a:bodyPr/>
+          <a:lstStyle/>
+          <a:p>
+            <a:fld id="{6C6AE60A-B69C-4790-82F7-3882EDF23186}" type="slidenum">
+              <a:rPr lang="de-DE" smtClean="0"/>
+              <a:t>10</a:t>
+            </a:fld>
+            <a:endParaRPr lang="de-DE"/>
+          </a:p>
+        </p:txBody>
+      </p:sp>
+      <p:pic>
+        <p:nvPicPr>
+          <p:cNvPr id="1026" name="Picture 2" descr="http://www.mapeditor.org/img/tiled-logo-white.png">
+            <a:extLst>
+              <a:ext uri="{FF2B5EF4-FFF2-40B4-BE49-F238E27FC236}">
+                <a16:creationId xmlns:a16="http://schemas.microsoft.com/office/drawing/2014/main" id="{F3169928-EA98-4D04-AC29-D3E1945D94E7}"/>
+              </a:ext>
+            </a:extLst>
+          </p:cNvPr>
+          <p:cNvPicPr>
+            <a:picLocks noChangeAspect="1" noChangeArrowheads="1"/>
+          </p:cNvPicPr>
+          <p:nvPr/>
+        </p:nvPicPr>
+        <p:blipFill>
+          <a:blip r:embed="rId2">
+            <a:extLst>
+              <a:ext uri="{28A0092B-C50C-407E-A947-70E740481C1C}">
+                <a14:useLocalDpi xmlns:a14="http://schemas.microsoft.com/office/drawing/2010/main" val="0"/>
+              </a:ext>
+            </a:extLst>
+          </a:blip>
+          <a:srcRect/>
+          <a:stretch>
+            <a:fillRect/>
+          </a:stretch>
+        </p:blipFill>
+        <p:spPr bwMode="auto">
+          <a:xfrm>
+            <a:off x="6040190" y="548680"/>
+            <a:ext cx="2646610" cy="1440160"/>
+          </a:xfrm>
+          <a:prstGeom prst="rect">
+            <a:avLst/>
+          </a:prstGeom>
+          <a:noFill/>
+          <a:extLst>
+            <a:ext uri="{909E8E84-426E-40DD-AFC4-6F175D3DCCD1}">
+              <a14:hiddenFill xmlns:a14="http://schemas.microsoft.com/office/drawing/2010/main">
+                <a:solidFill>
+                  <a:srgbClr val="FFFFFF"/>
+                </a:solidFill>
+              </a14:hiddenFill>
+            </a:ext>
+          </a:extLst>
+        </p:spPr>
+      </p:pic>
+      <p:pic>
+        <p:nvPicPr>
+          <p:cNvPr id="6" name="Grafik 5">
+            <a:extLst>
+              <a:ext uri="{FF2B5EF4-FFF2-40B4-BE49-F238E27FC236}">
+                <a16:creationId xmlns:a16="http://schemas.microsoft.com/office/drawing/2014/main" id="{85098B56-0A73-4197-9432-71530ED1C036}"/>
+              </a:ext>
+            </a:extLst>
+          </p:cNvPr>
+          <p:cNvPicPr>
+            <a:picLocks noChangeAspect="1"/>
+          </p:cNvPicPr>
+          <p:nvPr/>
+        </p:nvPicPr>
+        <p:blipFill>
+          <a:blip r:embed="rId3"/>
+          <a:stretch>
+            <a:fillRect/>
+          </a:stretch>
+        </p:blipFill>
+        <p:spPr>
+          <a:xfrm>
+            <a:off x="2222866" y="3428722"/>
+            <a:ext cx="4698268" cy="3312646"/>
+          </a:xfrm>
+          <a:prstGeom prst="rect">
+            <a:avLst/>
+          </a:prstGeom>
+        </p:spPr>
+      </p:pic>
+    </p:spTree>
+    <p:extLst>
+      <p:ext uri="{BB962C8B-B14F-4D97-AF65-F5344CB8AC3E}">
+        <p14:creationId xmlns:p14="http://schemas.microsoft.com/office/powerpoint/2010/main" val="2028866935"/>
+      </p:ext>
+    </p:extLst>
+  </p:cSld>
+  <p:clrMapOvr>
+    <a:masterClrMapping/>
+  </p:clrMapOvr>
+</p:sld>
+</file>
+
+<file path=ppt/slides/slide11.xml><?xml version="1.0" encoding="utf-8"?>
+<p:sld xmlns:a="http://schemas.openxmlformats.org/drawingml/2006/main" xmlns:r="http://schemas.openxmlformats.org/officeDocument/2006/relationships" xmlns:p="http://schemas.openxmlformats.org/presentationml/2006/main">
+  <p:cSld>
+    <p:spTree>
+      <p:nvGrpSpPr>
+        <p:cNvPr id="1" name=""/>
+        <p:cNvGrpSpPr/>
+        <p:nvPr/>
+      </p:nvGrpSpPr>
+      <p:grpSpPr>
+        <a:xfrm>
+          <a:off x="0" y="0"/>
+          <a:ext cx="0" cy="0"/>
+          <a:chOff x="0" y="0"/>
+          <a:chExt cx="0" cy="0"/>
+        </a:xfrm>
+      </p:grpSpPr>
+      <p:sp>
+        <p:nvSpPr>
+          <p:cNvPr id="2" name="Titel 1">
+            <a:extLst>
+              <a:ext uri="{FF2B5EF4-FFF2-40B4-BE49-F238E27FC236}">
+                <a16:creationId xmlns:a16="http://schemas.microsoft.com/office/drawing/2014/main" id="{AD43F268-6299-4A6B-9617-E1EEEAABE991}"/>
+              </a:ext>
+            </a:extLst>
+          </p:cNvPr>
+          <p:cNvSpPr>
+            <a:spLocks noGrp="1"/>
+          </p:cNvSpPr>
+          <p:nvPr>
+            <p:ph type="title"/>
+          </p:nvPr>
+        </p:nvSpPr>
+        <p:spPr/>
+        <p:txBody>
+          <a:bodyPr/>
+          <a:lstStyle/>
+          <a:p>
+            <a:r>
+              <a:rPr lang="de-AT" dirty="0" err="1"/>
+              <a:t>TexturePacker</a:t>
+            </a:r>
+            <a:r>
+              <a:rPr lang="de-AT" dirty="0"/>
+              <a:t>	</a:t>
+            </a:r>
+          </a:p>
+        </p:txBody>
+      </p:sp>
+      <p:sp>
+        <p:nvSpPr>
+          <p:cNvPr id="3" name="Inhaltsplatzhalter 2">
+            <a:extLst>
+              <a:ext uri="{FF2B5EF4-FFF2-40B4-BE49-F238E27FC236}">
+                <a16:creationId xmlns:a16="http://schemas.microsoft.com/office/drawing/2014/main" id="{07BBC03F-530C-4E50-8C91-00A9F09EB478}"/>
+              </a:ext>
+            </a:extLst>
+          </p:cNvPr>
+          <p:cNvSpPr>
+            <a:spLocks noGrp="1"/>
+          </p:cNvSpPr>
+          <p:nvPr>
+            <p:ph idx="1"/>
+          </p:nvPr>
+        </p:nvSpPr>
+        <p:spPr/>
+        <p:txBody>
+          <a:bodyPr/>
+          <a:lstStyle/>
+          <a:p>
+            <a:r>
+              <a:rPr lang="de-AT" dirty="0"/>
+              <a:t>Hilft </a:t>
+            </a:r>
+            <a:r>
+              <a:rPr lang="de-AT" dirty="0" err="1"/>
+              <a:t>Spritesheets</a:t>
+            </a:r>
+            <a:r>
+              <a:rPr lang="de-AT" dirty="0"/>
+              <a:t> zu erstellen</a:t>
+            </a:r>
+          </a:p>
+          <a:p>
+            <a:pPr lvl="1"/>
+            <a:r>
+              <a:rPr lang="de-AT" dirty="0"/>
+              <a:t>Verwendung von Grafiken</a:t>
+            </a:r>
+          </a:p>
+          <a:p>
+            <a:pPr lvl="1"/>
+            <a:r>
+              <a:rPr lang="de-AT" dirty="0"/>
+              <a:t>Erstellen von Animationen</a:t>
+            </a:r>
+          </a:p>
+          <a:p>
+            <a:r>
+              <a:rPr lang="de-AT" dirty="0"/>
+              <a:t>Hilft Speicher zu Sparen</a:t>
+            </a:r>
+          </a:p>
+          <a:p>
+            <a:pPr lvl="1"/>
+            <a:r>
+              <a:rPr lang="de-AT" dirty="0"/>
+              <a:t>Alle verwendeten Bilder in einer Datei</a:t>
+            </a:r>
+          </a:p>
+          <a:p>
+            <a:pPr lvl="1"/>
+            <a:r>
+              <a:rPr lang="de-AT" dirty="0"/>
+              <a:t>Verschiedene Dateiformate:</a:t>
+            </a:r>
+          </a:p>
+          <a:p>
+            <a:pPr lvl="2"/>
+            <a:r>
+              <a:rPr lang="de-AT" dirty="0"/>
+              <a:t>PSD, SWF, alle gängigen Bildformate</a:t>
+            </a:r>
+          </a:p>
+          <a:p>
+            <a:endParaRPr lang="de-AT" dirty="0"/>
+          </a:p>
+        </p:txBody>
+      </p:sp>
+      <p:sp>
+        <p:nvSpPr>
+          <p:cNvPr id="4" name="Datumsplatzhalter 3">
+            <a:extLst>
+              <a:ext uri="{FF2B5EF4-FFF2-40B4-BE49-F238E27FC236}">
+                <a16:creationId xmlns:a16="http://schemas.microsoft.com/office/drawing/2014/main" id="{DFA19B06-C08F-4B9D-9A19-1152D0C6426D}"/>
+              </a:ext>
+            </a:extLst>
+          </p:cNvPr>
+          <p:cNvSpPr>
+            <a:spLocks noGrp="1"/>
+          </p:cNvSpPr>
+          <p:nvPr>
+            <p:ph type="dt" sz="half" idx="10"/>
+          </p:nvPr>
+        </p:nvSpPr>
+        <p:spPr/>
+        <p:txBody>
+          <a:bodyPr/>
+          <a:lstStyle/>
+          <a:p>
+            <a:fld id="{D0495679-6854-4CEB-AB4A-7941CB807E4C}" type="datetime1">
+              <a:rPr lang="de-DE" smtClean="0"/>
+              <a:t>03.07.2017</a:t>
+            </a:fld>
+            <a:endParaRPr lang="de-DE"/>
+          </a:p>
+        </p:txBody>
+      </p:sp>
+      <p:sp>
+        <p:nvSpPr>
+          <p:cNvPr id="5" name="Foliennummernplatzhalter 4">
+            <a:extLst>
+              <a:ext uri="{FF2B5EF4-FFF2-40B4-BE49-F238E27FC236}">
+                <a16:creationId xmlns:a16="http://schemas.microsoft.com/office/drawing/2014/main" id="{F74B1510-1B11-4DA2-B378-94A90250D9C6}"/>
+              </a:ext>
+            </a:extLst>
+          </p:cNvPr>
+          <p:cNvSpPr>
+            <a:spLocks noGrp="1"/>
+          </p:cNvSpPr>
+          <p:nvPr>
+            <p:ph type="sldNum" sz="quarter" idx="12"/>
+          </p:nvPr>
+        </p:nvSpPr>
+        <p:spPr/>
+        <p:txBody>
+          <a:bodyPr/>
+          <a:lstStyle/>
+          <a:p>
+            <a:fld id="{6C6AE60A-B69C-4790-82F7-3882EDF23186}" type="slidenum">
+              <a:rPr lang="de-DE" smtClean="0"/>
+              <a:t>11</a:t>
+            </a:fld>
+            <a:endParaRPr lang="de-DE"/>
+          </a:p>
+        </p:txBody>
+      </p:sp>
+      <p:pic>
+        <p:nvPicPr>
+          <p:cNvPr id="2054" name="Picture 6" descr="Bildergebnis für TexturePacker">
+            <a:extLst>
+              <a:ext uri="{FF2B5EF4-FFF2-40B4-BE49-F238E27FC236}">
+                <a16:creationId xmlns:a16="http://schemas.microsoft.com/office/drawing/2014/main" id="{B56BDB01-BCD7-4906-954E-5CECEA830E72}"/>
+              </a:ext>
+            </a:extLst>
+          </p:cNvPr>
+          <p:cNvPicPr>
+            <a:picLocks noChangeAspect="1" noChangeArrowheads="1"/>
+          </p:cNvPicPr>
+          <p:nvPr/>
+        </p:nvPicPr>
+        <p:blipFill>
+          <a:blip r:embed="rId2" cstate="print">
+            <a:extLst>
+              <a:ext uri="{28A0092B-C50C-407E-A947-70E740481C1C}">
+                <a14:useLocalDpi xmlns:a14="http://schemas.microsoft.com/office/drawing/2010/main" val="0"/>
+              </a:ext>
+            </a:extLst>
+          </a:blip>
+          <a:srcRect/>
+          <a:stretch>
+            <a:fillRect/>
+          </a:stretch>
+        </p:blipFill>
+        <p:spPr bwMode="auto">
+          <a:xfrm>
+            <a:off x="7020272" y="620688"/>
+            <a:ext cx="1430288" cy="1430288"/>
+          </a:xfrm>
+          <a:prstGeom prst="rect">
+            <a:avLst/>
+          </a:prstGeom>
+          <a:noFill/>
+          <a:extLst>
+            <a:ext uri="{909E8E84-426E-40DD-AFC4-6F175D3DCCD1}">
+              <a14:hiddenFill xmlns:a14="http://schemas.microsoft.com/office/drawing/2010/main">
+                <a:solidFill>
+                  <a:srgbClr val="FFFFFF"/>
+                </a:solidFill>
+              </a14:hiddenFill>
+            </a:ext>
+          </a:extLst>
+        </p:spPr>
+      </p:pic>
+    </p:spTree>
+    <p:extLst>
+      <p:ext uri="{BB962C8B-B14F-4D97-AF65-F5344CB8AC3E}">
+        <p14:creationId xmlns:p14="http://schemas.microsoft.com/office/powerpoint/2010/main" val="3851704047"/>
+      </p:ext>
+    </p:extLst>
+  </p:cSld>
+  <p:clrMapOvr>
+    <a:masterClrMapping/>
+  </p:clrMapOvr>
+</p:sld>
+</file>
+
+<file path=ppt/slides/slide12.xml><?xml version="1.0" encoding="utf-8"?>
+<p:sld xmlns:a="http://schemas.openxmlformats.org/drawingml/2006/main" xmlns:r="http://schemas.openxmlformats.org/officeDocument/2006/relationships" xmlns:p="http://schemas.openxmlformats.org/presentationml/2006/main">
+  <p:cSld>
+    <p:spTree>
+      <p:nvGrpSpPr>
+        <p:cNvPr id="1" name=""/>
+        <p:cNvGrpSpPr/>
+        <p:nvPr/>
+      </p:nvGrpSpPr>
+      <p:grpSpPr>
+        <a:xfrm>
+          <a:off x="0" y="0"/>
+          <a:ext cx="0" cy="0"/>
+          <a:chOff x="0" y="0"/>
+          <a:chExt cx="0" cy="0"/>
+        </a:xfrm>
+      </p:grpSpPr>
+      <p:sp>
+        <p:nvSpPr>
+          <p:cNvPr id="2" name="Titel 1">
+            <a:extLst>
+              <a:ext uri="{FF2B5EF4-FFF2-40B4-BE49-F238E27FC236}">
+                <a16:creationId xmlns:a16="http://schemas.microsoft.com/office/drawing/2014/main" id="{35F84820-6B3F-4863-89D3-E157F3AA9A20}"/>
+              </a:ext>
+            </a:extLst>
+          </p:cNvPr>
+          <p:cNvSpPr>
+            <a:spLocks noGrp="1"/>
+          </p:cNvSpPr>
+          <p:nvPr>
+            <p:ph type="title"/>
+          </p:nvPr>
+        </p:nvSpPr>
+        <p:spPr/>
+        <p:txBody>
+          <a:bodyPr/>
+          <a:lstStyle/>
+          <a:p>
+            <a:r>
+              <a:rPr lang="de-AT" dirty="0" err="1"/>
+              <a:t>LibGDX</a:t>
+            </a:r>
+            <a:r>
+              <a:rPr lang="de-AT" dirty="0"/>
+              <a:t>				</a:t>
+            </a:r>
+          </a:p>
+        </p:txBody>
+      </p:sp>
+      <p:sp>
+        <p:nvSpPr>
+          <p:cNvPr id="3" name="Inhaltsplatzhalter 2">
+            <a:extLst>
+              <a:ext uri="{FF2B5EF4-FFF2-40B4-BE49-F238E27FC236}">
+                <a16:creationId xmlns:a16="http://schemas.microsoft.com/office/drawing/2014/main" id="{4895B13C-5C50-4F41-9987-8E00CE2F6AAE}"/>
+              </a:ext>
+            </a:extLst>
+          </p:cNvPr>
+          <p:cNvSpPr>
+            <a:spLocks noGrp="1"/>
+          </p:cNvSpPr>
+          <p:nvPr>
+            <p:ph idx="1"/>
+          </p:nvPr>
+        </p:nvSpPr>
+        <p:spPr/>
+        <p:txBody>
+          <a:bodyPr>
+            <a:normAutofit/>
+          </a:bodyPr>
+          <a:lstStyle/>
+          <a:p>
+            <a:r>
+              <a:rPr lang="de-AT" dirty="0"/>
+              <a:t>Cross-</a:t>
+            </a:r>
+            <a:r>
+              <a:rPr lang="de-AT" dirty="0" err="1"/>
+              <a:t>Platform</a:t>
+            </a:r>
+            <a:r>
+              <a:rPr lang="de-AT" dirty="0"/>
+              <a:t>-Framework</a:t>
+            </a:r>
+          </a:p>
+          <a:p>
+            <a:pPr lvl="1"/>
+            <a:r>
+              <a:rPr lang="de-AT" dirty="0"/>
+              <a:t>Programmieren in Java</a:t>
+            </a:r>
+          </a:p>
+          <a:p>
+            <a:pPr lvl="1"/>
+            <a:r>
+              <a:rPr lang="de-AT" dirty="0"/>
+              <a:t>Ermöglicht Portabilität für</a:t>
+            </a:r>
+          </a:p>
+          <a:p>
+            <a:pPr lvl="2"/>
+            <a:r>
+              <a:rPr lang="de-AT" dirty="0"/>
+              <a:t>Desktop</a:t>
+            </a:r>
+          </a:p>
+          <a:p>
+            <a:pPr lvl="2"/>
+            <a:r>
+              <a:rPr lang="de-AT" dirty="0"/>
+              <a:t>Android</a:t>
+            </a:r>
+          </a:p>
+          <a:p>
+            <a:pPr lvl="2"/>
+            <a:r>
+              <a:rPr lang="de-AT" dirty="0"/>
+              <a:t>BlackBerry</a:t>
+            </a:r>
+          </a:p>
+          <a:p>
+            <a:pPr lvl="2"/>
+            <a:r>
+              <a:rPr lang="de-AT" dirty="0"/>
+              <a:t>iOS</a:t>
+            </a:r>
+          </a:p>
+          <a:p>
+            <a:pPr lvl="2"/>
+            <a:r>
+              <a:rPr lang="de-AT" dirty="0"/>
+              <a:t>HTML5</a:t>
+            </a:r>
+          </a:p>
+          <a:p>
+            <a:r>
+              <a:rPr lang="de-AT" sz="2600" dirty="0"/>
+              <a:t>Mehr Info unter https://libgdx.badlogicgames.com/</a:t>
+            </a:r>
+          </a:p>
+          <a:p>
+            <a:pPr lvl="1"/>
+            <a:endParaRPr lang="de-AT" dirty="0"/>
+          </a:p>
+        </p:txBody>
+      </p:sp>
+      <p:sp>
+        <p:nvSpPr>
+          <p:cNvPr id="4" name="Datumsplatzhalter 3">
+            <a:extLst>
+              <a:ext uri="{FF2B5EF4-FFF2-40B4-BE49-F238E27FC236}">
+                <a16:creationId xmlns:a16="http://schemas.microsoft.com/office/drawing/2014/main" id="{E10D0D97-B391-40CB-A53D-C59E31B28FA7}"/>
+              </a:ext>
+            </a:extLst>
+          </p:cNvPr>
+          <p:cNvSpPr>
+            <a:spLocks noGrp="1"/>
+          </p:cNvSpPr>
+          <p:nvPr>
+            <p:ph type="dt" sz="half" idx="10"/>
+          </p:nvPr>
+        </p:nvSpPr>
+        <p:spPr/>
+        <p:txBody>
+          <a:bodyPr/>
+          <a:lstStyle/>
+          <a:p>
+            <a:fld id="{C5527C25-6B2E-4D57-B688-6E82BA7CFFE8}" type="datetime1">
+              <a:rPr lang="de-DE" smtClean="0"/>
+              <a:t>03.07.2017</a:t>
+            </a:fld>
+            <a:endParaRPr lang="de-DE"/>
+          </a:p>
+        </p:txBody>
+      </p:sp>
+      <p:sp>
+        <p:nvSpPr>
+          <p:cNvPr id="6" name="Foliennummernplatzhalter 5">
+            <a:extLst>
+              <a:ext uri="{FF2B5EF4-FFF2-40B4-BE49-F238E27FC236}">
+                <a16:creationId xmlns:a16="http://schemas.microsoft.com/office/drawing/2014/main" id="{E5B46D77-FF69-42D2-909C-7BA91223A99F}"/>
+              </a:ext>
+            </a:extLst>
+          </p:cNvPr>
+          <p:cNvSpPr>
+            <a:spLocks noGrp="1"/>
+          </p:cNvSpPr>
+          <p:nvPr>
+            <p:ph type="sldNum" sz="quarter" idx="12"/>
+          </p:nvPr>
+        </p:nvSpPr>
+        <p:spPr/>
+        <p:txBody>
+          <a:bodyPr/>
+          <a:lstStyle/>
+          <a:p>
+            <a:fld id="{6C6AE60A-B69C-4790-82F7-3882EDF23186}" type="slidenum">
+              <a:rPr lang="de-DE" smtClean="0"/>
+              <a:t>12</a:t>
+            </a:fld>
+            <a:endParaRPr lang="de-DE"/>
+          </a:p>
+        </p:txBody>
+      </p:sp>
+      <p:pic>
+        <p:nvPicPr>
+          <p:cNvPr id="3074" name="Picture 2" descr="Bildergebnis für LibGDX">
+            <a:extLst>
+              <a:ext uri="{FF2B5EF4-FFF2-40B4-BE49-F238E27FC236}">
+                <a16:creationId xmlns:a16="http://schemas.microsoft.com/office/drawing/2014/main" id="{984A8433-8BE4-4425-AFCB-061E17E5A801}"/>
+              </a:ext>
+            </a:extLst>
+          </p:cNvPr>
+          <p:cNvPicPr>
+            <a:picLocks noChangeAspect="1" noChangeArrowheads="1"/>
+          </p:cNvPicPr>
+          <p:nvPr/>
+        </p:nvPicPr>
+        <p:blipFill>
+          <a:blip r:embed="rId2">
+            <a:extLst>
+              <a:ext uri="{28A0092B-C50C-407E-A947-70E740481C1C}">
+                <a14:useLocalDpi xmlns:a14="http://schemas.microsoft.com/office/drawing/2010/main" val="0"/>
+              </a:ext>
+            </a:extLst>
+          </a:blip>
+          <a:srcRect/>
+          <a:stretch>
+            <a:fillRect/>
+          </a:stretch>
+        </p:blipFill>
+        <p:spPr bwMode="auto">
+          <a:xfrm>
+            <a:off x="5580112" y="854736"/>
+            <a:ext cx="2857500" cy="476250"/>
+          </a:xfrm>
+          <a:prstGeom prst="rect">
+            <a:avLst/>
+          </a:prstGeom>
+          <a:noFill/>
+          <a:extLst>
+            <a:ext uri="{909E8E84-426E-40DD-AFC4-6F175D3DCCD1}">
+              <a14:hiddenFill xmlns:a14="http://schemas.microsoft.com/office/drawing/2010/main">
+                <a:solidFill>
+                  <a:srgbClr val="FFFFFF"/>
+                </a:solidFill>
+              </a14:hiddenFill>
+            </a:ext>
+          </a:extLst>
+        </p:spPr>
+      </p:pic>
+    </p:spTree>
+    <p:extLst>
+      <p:ext uri="{BB962C8B-B14F-4D97-AF65-F5344CB8AC3E}">
+        <p14:creationId xmlns:p14="http://schemas.microsoft.com/office/powerpoint/2010/main" val="3118299583"/>
+      </p:ext>
+    </p:extLst>
+  </p:cSld>
+  <p:clrMapOvr>
+    <a:masterClrMapping/>
+  </p:clrMapOvr>
+</p:sld>
+</file>
+
+<file path=ppt/slides/slide13.xml><?xml version="1.0" encoding="utf-8"?>
+<p:sld xmlns:a="http://schemas.openxmlformats.org/drawingml/2006/main" xmlns:r="http://schemas.openxmlformats.org/officeDocument/2006/relationships" xmlns:p="http://schemas.openxmlformats.org/presentationml/2006/main">
+  <p:cSld>
+    <p:spTree>
+      <p:nvGrpSpPr>
+        <p:cNvPr id="1" name=""/>
+        <p:cNvGrpSpPr/>
+        <p:nvPr/>
+      </p:nvGrpSpPr>
+      <p:grpSpPr>
+        <a:xfrm>
+          <a:off x="0" y="0"/>
+          <a:ext cx="0" cy="0"/>
+          <a:chOff x="0" y="0"/>
+          <a:chExt cx="0" cy="0"/>
+        </a:xfrm>
+      </p:grpSpPr>
+      <p:sp>
+        <p:nvSpPr>
+          <p:cNvPr id="2" name="Titel 1">
+            <a:extLst>
+              <a:ext uri="{FF2B5EF4-FFF2-40B4-BE49-F238E27FC236}">
+                <a16:creationId xmlns:a16="http://schemas.microsoft.com/office/drawing/2014/main" id="{3B6BC7AA-67B8-4973-85D2-5C6E002E9B58}"/>
+              </a:ext>
+            </a:extLst>
+          </p:cNvPr>
+          <p:cNvSpPr>
+            <a:spLocks noGrp="1"/>
+          </p:cNvSpPr>
+          <p:nvPr>
+            <p:ph type="title"/>
+          </p:nvPr>
+        </p:nvSpPr>
+        <p:spPr/>
+        <p:txBody>
+          <a:bodyPr/>
+          <a:lstStyle/>
+          <a:p>
+            <a:r>
+              <a:rPr lang="de-AT" dirty="0"/>
+              <a:t>Demo</a:t>
+            </a:r>
+          </a:p>
+        </p:txBody>
+      </p:sp>
+      <p:sp>
+        <p:nvSpPr>
+          <p:cNvPr id="3" name="Inhaltsplatzhalter 2">
+            <a:extLst>
+              <a:ext uri="{FF2B5EF4-FFF2-40B4-BE49-F238E27FC236}">
+                <a16:creationId xmlns:a16="http://schemas.microsoft.com/office/drawing/2014/main" id="{7875CACD-CF31-4C15-B665-239523EF88F3}"/>
+              </a:ext>
+            </a:extLst>
+          </p:cNvPr>
+          <p:cNvSpPr>
+            <a:spLocks noGrp="1"/>
+          </p:cNvSpPr>
+          <p:nvPr>
+            <p:ph idx="1"/>
+          </p:nvPr>
+        </p:nvSpPr>
+        <p:spPr/>
+        <p:txBody>
+          <a:bodyPr/>
+          <a:lstStyle/>
+          <a:p>
+            <a:r>
+              <a:rPr lang="de-AT" dirty="0"/>
+              <a:t>Video</a:t>
+            </a:r>
+          </a:p>
+        </p:txBody>
+      </p:sp>
+      <p:sp>
+        <p:nvSpPr>
+          <p:cNvPr id="4" name="Datumsplatzhalter 3">
+            <a:extLst>
+              <a:ext uri="{FF2B5EF4-FFF2-40B4-BE49-F238E27FC236}">
+                <a16:creationId xmlns:a16="http://schemas.microsoft.com/office/drawing/2014/main" id="{A5BC6079-6BB4-43D6-A397-9A1D47A067EF}"/>
+              </a:ext>
+            </a:extLst>
+          </p:cNvPr>
+          <p:cNvSpPr>
+            <a:spLocks noGrp="1"/>
+          </p:cNvSpPr>
+          <p:nvPr>
+            <p:ph type="dt" sz="half" idx="10"/>
+          </p:nvPr>
+        </p:nvSpPr>
+        <p:spPr/>
+        <p:txBody>
+          <a:bodyPr/>
+          <a:lstStyle/>
+          <a:p>
+            <a:fld id="{33426F46-14CA-4DF1-BDB6-9C38CC53B0B1}" type="datetime1">
+              <a:rPr lang="de-DE" smtClean="0"/>
+              <a:t>03.07.2017</a:t>
+            </a:fld>
+            <a:endParaRPr lang="de-DE"/>
+          </a:p>
+        </p:txBody>
+      </p:sp>
+      <p:sp>
+        <p:nvSpPr>
+          <p:cNvPr id="6" name="Foliennummernplatzhalter 5">
+            <a:extLst>
+              <a:ext uri="{FF2B5EF4-FFF2-40B4-BE49-F238E27FC236}">
+                <a16:creationId xmlns:a16="http://schemas.microsoft.com/office/drawing/2014/main" id="{366CF890-D1E4-44C0-A452-9991067C7D6D}"/>
+              </a:ext>
+            </a:extLst>
+          </p:cNvPr>
+          <p:cNvSpPr>
+            <a:spLocks noGrp="1"/>
+          </p:cNvSpPr>
+          <p:nvPr>
+            <p:ph type="sldNum" sz="quarter" idx="12"/>
+          </p:nvPr>
+        </p:nvSpPr>
+        <p:spPr/>
+        <p:txBody>
+          <a:bodyPr/>
+          <a:lstStyle/>
+          <a:p>
+            <a:fld id="{6C6AE60A-B69C-4790-82F7-3882EDF23186}" type="slidenum">
+              <a:rPr lang="de-DE" smtClean="0"/>
+              <a:t>13</a:t>
+            </a:fld>
+            <a:endParaRPr lang="de-DE"/>
+          </a:p>
+        </p:txBody>
+      </p:sp>
+    </p:spTree>
+    <p:extLst>
+      <p:ext uri="{BB962C8B-B14F-4D97-AF65-F5344CB8AC3E}">
+        <p14:creationId xmlns:p14="http://schemas.microsoft.com/office/powerpoint/2010/main" val="1442948324"/>
+      </p:ext>
+    </p:extLst>
+  </p:cSld>
+  <p:clrMapOvr>
+    <a:masterClrMapping/>
+  </p:clrMapOvr>
+</p:sld>
+</file>
+
+<file path=ppt/slides/slide14.xml><?xml version="1.0" encoding="utf-8"?>
+<p:sld xmlns:a="http://schemas.openxmlformats.org/drawingml/2006/main" xmlns:r="http://schemas.openxmlformats.org/officeDocument/2006/relationships" xmlns:p="http://schemas.openxmlformats.org/presentationml/2006/main">
+  <p:cSld>
+    <p:spTree>
+      <p:nvGrpSpPr>
+        <p:cNvPr id="1" name=""/>
+        <p:cNvGrpSpPr/>
+        <p:nvPr/>
+      </p:nvGrpSpPr>
+      <p:grpSpPr>
+        <a:xfrm>
+          <a:off x="0" y="0"/>
+          <a:ext cx="0" cy="0"/>
+          <a:chOff x="0" y="0"/>
+          <a:chExt cx="0" cy="0"/>
+        </a:xfrm>
+      </p:grpSpPr>
+      <p:sp>
+        <p:nvSpPr>
+          <p:cNvPr id="2" name="Titel 1">
+            <a:extLst>
+              <a:ext uri="{FF2B5EF4-FFF2-40B4-BE49-F238E27FC236}">
+                <a16:creationId xmlns:a16="http://schemas.microsoft.com/office/drawing/2014/main" id="{73F24B0F-D7BE-46A2-B5F7-7EDAC5BD9B28}"/>
+              </a:ext>
+            </a:extLst>
+          </p:cNvPr>
+          <p:cNvSpPr>
+            <a:spLocks noGrp="1"/>
+          </p:cNvSpPr>
+          <p:nvPr>
+            <p:ph type="title"/>
+          </p:nvPr>
+        </p:nvSpPr>
+        <p:spPr/>
+        <p:txBody>
+          <a:bodyPr/>
+          <a:lstStyle/>
+          <a:p>
+            <a:r>
+              <a:rPr lang="de-AT" dirty="0"/>
+              <a:t>Ausblick</a:t>
+            </a:r>
+          </a:p>
+        </p:txBody>
+      </p:sp>
+      <p:sp>
+        <p:nvSpPr>
+          <p:cNvPr id="3" name="Inhaltsplatzhalter 2">
+            <a:extLst>
+              <a:ext uri="{FF2B5EF4-FFF2-40B4-BE49-F238E27FC236}">
+                <a16:creationId xmlns:a16="http://schemas.microsoft.com/office/drawing/2014/main" id="{E6E5B32A-8D8D-4328-B061-2A08070CF9A6}"/>
+              </a:ext>
+            </a:extLst>
+          </p:cNvPr>
+          <p:cNvSpPr>
+            <a:spLocks noGrp="1"/>
+          </p:cNvSpPr>
+          <p:nvPr>
+            <p:ph idx="1"/>
+          </p:nvPr>
+        </p:nvSpPr>
+        <p:spPr/>
+        <p:txBody>
+          <a:bodyPr/>
+          <a:lstStyle/>
+          <a:p>
+            <a:r>
+              <a:rPr lang="de-AT" dirty="0"/>
+              <a:t>Verschiedene Arten von Gegnern</a:t>
+            </a:r>
+          </a:p>
+          <a:p>
+            <a:r>
+              <a:rPr lang="de-AT" dirty="0"/>
+              <a:t>Verschiedene Maps auswählbar</a:t>
+            </a:r>
+          </a:p>
+          <a:p>
+            <a:r>
+              <a:rPr lang="de-AT" dirty="0"/>
+              <a:t>Tower fusionieren</a:t>
+            </a:r>
+          </a:p>
+          <a:p>
+            <a:endParaRPr lang="de-AT" dirty="0"/>
+          </a:p>
+          <a:p>
+            <a:r>
+              <a:rPr lang="de-AT" dirty="0"/>
+              <a:t>Portierung auf iOS</a:t>
+            </a:r>
+          </a:p>
+          <a:p>
+            <a:endParaRPr lang="de-AT" dirty="0"/>
+          </a:p>
+        </p:txBody>
+      </p:sp>
+      <p:sp>
+        <p:nvSpPr>
+          <p:cNvPr id="4" name="Datumsplatzhalter 3">
+            <a:extLst>
+              <a:ext uri="{FF2B5EF4-FFF2-40B4-BE49-F238E27FC236}">
+                <a16:creationId xmlns:a16="http://schemas.microsoft.com/office/drawing/2014/main" id="{D01F9BCF-6E42-40A9-9583-41B541DCC396}"/>
+              </a:ext>
+            </a:extLst>
+          </p:cNvPr>
+          <p:cNvSpPr>
+            <a:spLocks noGrp="1"/>
+          </p:cNvSpPr>
+          <p:nvPr>
+            <p:ph type="dt" sz="half" idx="10"/>
+          </p:nvPr>
+        </p:nvSpPr>
+        <p:spPr/>
+        <p:txBody>
+          <a:bodyPr/>
+          <a:lstStyle/>
+          <a:p>
+            <a:fld id="{D0495679-6854-4CEB-AB4A-7941CB807E4C}" type="datetime1">
+              <a:rPr lang="de-DE" smtClean="0"/>
+              <a:t>03.07.2017</a:t>
+            </a:fld>
+            <a:endParaRPr lang="de-DE"/>
+          </a:p>
+        </p:txBody>
+      </p:sp>
+      <p:sp>
+        <p:nvSpPr>
+          <p:cNvPr id="5" name="Foliennummernplatzhalter 4">
+            <a:extLst>
+              <a:ext uri="{FF2B5EF4-FFF2-40B4-BE49-F238E27FC236}">
+                <a16:creationId xmlns:a16="http://schemas.microsoft.com/office/drawing/2014/main" id="{2D48826D-56CF-40D0-9FE5-B7EBEAFD2217}"/>
+              </a:ext>
+            </a:extLst>
+          </p:cNvPr>
+          <p:cNvSpPr>
+            <a:spLocks noGrp="1"/>
+          </p:cNvSpPr>
+          <p:nvPr>
+            <p:ph type="sldNum" sz="quarter" idx="12"/>
+          </p:nvPr>
+        </p:nvSpPr>
+        <p:spPr/>
+        <p:txBody>
+          <a:bodyPr/>
+          <a:lstStyle/>
+          <a:p>
+            <a:fld id="{6C6AE60A-B69C-4790-82F7-3882EDF23186}" type="slidenum">
+              <a:rPr lang="de-DE" smtClean="0"/>
+              <a:t>14</a:t>
+            </a:fld>
+            <a:endParaRPr lang="de-DE"/>
+          </a:p>
+        </p:txBody>
+      </p:sp>
+    </p:spTree>
+    <p:extLst>
+      <p:ext uri="{BB962C8B-B14F-4D97-AF65-F5344CB8AC3E}">
+        <p14:creationId xmlns:p14="http://schemas.microsoft.com/office/powerpoint/2010/main" val="1170629818"/>
+      </p:ext>
+    </p:extLst>
+  </p:cSld>
+  <p:clrMapOvr>
+    <a:masterClrMapping/>
+  </p:clrMapOvr>
+</p:sld>
+</file>
+
+<file path=ppt/slides/slide15.xml><?xml version="1.0" encoding="utf-8"?>
+<p:sld xmlns:a="http://schemas.openxmlformats.org/drawingml/2006/main" xmlns:r="http://schemas.openxmlformats.org/officeDocument/2006/relationships" xmlns:p="http://schemas.openxmlformats.org/presentationml/2006/main">
+  <p:cSld>
+    <p:spTree>
+      <p:nvGrpSpPr>
+        <p:cNvPr id="1" name=""/>
+        <p:cNvGrpSpPr/>
+        <p:nvPr/>
+      </p:nvGrpSpPr>
+      <p:grpSpPr>
+        <a:xfrm>
+          <a:off x="0" y="0"/>
+          <a:ext cx="0" cy="0"/>
+          <a:chOff x="0" y="0"/>
+          <a:chExt cx="0" cy="0"/>
+        </a:xfrm>
+      </p:grpSpPr>
+      <p:sp>
+        <p:nvSpPr>
+          <p:cNvPr id="2" name="Titel 1">
+            <a:extLst>
+              <a:ext uri="{FF2B5EF4-FFF2-40B4-BE49-F238E27FC236}">
                 <a16:creationId xmlns:a16="http://schemas.microsoft.com/office/drawing/2014/main" id="{7EC50FCB-96AD-406D-9D8E-A242B36050E5}"/>
               </a:ext>
             </a:extLst>
@@ -3967,7 +5039,7 @@
           <a:p>
             <a:fld id="{02ADD0D4-00E3-4723-A997-B7ECBE092E9F}" type="datetime1">
               <a:rPr lang="de-DE" smtClean="0"/>
-              <a:t>02.07.2017</a:t>
+              <a:t>03.07.2017</a:t>
             </a:fld>
             <a:endParaRPr lang="de-DE"/>
           </a:p>
@@ -4145,7 +5217,7 @@
           <a:p>
             <a:fld id="{18E7F602-EAB1-4D9C-A126-7CEAF968CD02}" type="datetime1">
               <a:rPr lang="de-DE" smtClean="0"/>
-              <a:t>02.07.2017</a:t>
+              <a:t>03.07.2017</a:t>
             </a:fld>
             <a:endParaRPr lang="de-DE"/>
           </a:p>
@@ -4261,7 +5333,7 @@
           <a:p>
             <a:r>
               <a:rPr lang="de-AT" dirty="0"/>
-              <a:t>Basierend auf Mini-Spiel in Warcraft</a:t>
+              <a:t>Basierend auf Mini-Spiel in Warcraft III</a:t>
             </a:r>
           </a:p>
           <a:p>
@@ -4281,8 +5353,11 @@
           <a:p>
             <a:r>
               <a:rPr lang="de-AT" dirty="0"/>
-              <a:t>Framework </a:t>
-            </a:r>
+              <a:t>Idee der Portabilität</a:t>
+            </a:r>
+          </a:p>
+          <a:p>
+            <a:pPr lvl="1"/>
             <a:r>
               <a:rPr lang="de-AT" dirty="0" err="1"/>
               <a:t>LibGDX</a:t>
@@ -4290,20 +5365,6 @@
             <a:endParaRPr lang="de-AT" dirty="0"/>
           </a:p>
           <a:p>
-            <a:pPr lvl="1"/>
-            <a:r>
-              <a:rPr lang="de-AT" dirty="0"/>
-              <a:t>Portabilität auf verschiedenen Betriebssystemen möglich</a:t>
-            </a:r>
-          </a:p>
-          <a:p>
-            <a:pPr lvl="1"/>
-            <a:r>
-              <a:rPr lang="de-AT" dirty="0"/>
-              <a:t>Umsetzung in Android</a:t>
-            </a:r>
-          </a:p>
-          <a:p>
             <a:endParaRPr lang="de-AT" dirty="0"/>
           </a:p>
         </p:txBody>
@@ -4331,7 +5392,7 @@
           <a:p>
             <a:fld id="{F83B068E-C841-4FCE-9865-15D345EDA850}" type="datetime1">
               <a:rPr lang="de-DE" smtClean="0"/>
-              <a:t>02.07.2017</a:t>
+              <a:t>03.07.2017</a:t>
             </a:fld>
             <a:endParaRPr lang="de-DE"/>
           </a:p>
@@ -4484,13 +5545,6 @@
               <a:t>verschiedene Elemente und Türme</a:t>
             </a:r>
           </a:p>
-          <a:p>
-            <a:pPr lvl="1"/>
-            <a:r>
-              <a:rPr lang="de-AT" dirty="0"/>
-              <a:t>Kombination: neue Elemente</a:t>
-            </a:r>
-          </a:p>
         </p:txBody>
       </p:sp>
       <p:sp>
@@ -4516,7 +5570,7 @@
           <a:p>
             <a:fld id="{C9BA90A9-2353-4EC3-B836-FAEAEFE0FE65}" type="datetime1">
               <a:rPr lang="de-DE" smtClean="0"/>
-              <a:t>02.07.2017</a:t>
+              <a:t>03.07.2017</a:t>
             </a:fld>
             <a:endParaRPr lang="de-DE"/>
           </a:p>
@@ -4628,7 +5682,7 @@
         <p:spPr/>
         <p:txBody>
           <a:bodyPr>
-            <a:normAutofit fontScale="92500" lnSpcReduction="20000"/>
+            <a:normAutofit/>
           </a:bodyPr>
           <a:lstStyle/>
           <a:p>
@@ -4681,27 +5735,7 @@
               <a:rPr lang="de-AT" dirty="0">
                 <a:sym typeface="Wingdings" panose="05000000000000000000" pitchFamily="2" charset="2"/>
               </a:rPr>
-              <a:t> Gold</a:t>
-            </a:r>
-          </a:p>
-          <a:p>
-            <a:pPr lvl="1"/>
-            <a:r>
-              <a:rPr lang="de-AT" dirty="0">
-                <a:sym typeface="Wingdings" panose="05000000000000000000" pitchFamily="2" charset="2"/>
-              </a:rPr>
-              <a:t>Gold	 	neue Türme</a:t>
-            </a:r>
-            <a:br>
-              <a:rPr lang="de-AT" dirty="0">
-                <a:sym typeface="Wingdings" panose="05000000000000000000" pitchFamily="2" charset="2"/>
-              </a:rPr>
-            </a:br>
-            <a:r>
-              <a:rPr lang="de-AT" dirty="0">
-                <a:sym typeface="Wingdings" panose="05000000000000000000" pitchFamily="2" charset="2"/>
-              </a:rPr>
-              <a:t>			bestehende Türme fusionieren</a:t>
+              <a:t>bringt Gold</a:t>
             </a:r>
           </a:p>
           <a:p>
@@ -4742,7 +5776,7 @@
           <a:p>
             <a:fld id="{D018EF64-FBD4-4BF5-B01A-1958132ED163}" type="datetime1">
               <a:rPr lang="de-DE" smtClean="0"/>
-              <a:t>02.07.2017</a:t>
+              <a:t>03.07.2017</a:t>
             </a:fld>
             <a:endParaRPr lang="de-DE"/>
           </a:p>
@@ -4812,7 +5846,7 @@
           <p:cNvPr id="2" name="Titel 1">
             <a:extLst>
               <a:ext uri="{FF2B5EF4-FFF2-40B4-BE49-F238E27FC236}">
-                <a16:creationId xmlns:a16="http://schemas.microsoft.com/office/drawing/2014/main" id="{D90A2D35-A4AA-4143-967F-F6F2C6C932C9}"/>
+                <a16:creationId xmlns:a16="http://schemas.microsoft.com/office/drawing/2014/main" id="{85C1560D-FBB4-451D-B247-6CBDB77287A8}"/>
               </a:ext>
             </a:extLst>
           </p:cNvPr>
@@ -4830,7 +5864,7 @@
           <a:p>
             <a:r>
               <a:rPr lang="de-AT" dirty="0"/>
-              <a:t>Die Umsetzung</a:t>
+              <a:t>Designkonzept</a:t>
             </a:r>
           </a:p>
         </p:txBody>
@@ -4840,7 +5874,7 @@
           <p:cNvPr id="3" name="Inhaltsplatzhalter 2">
             <a:extLst>
               <a:ext uri="{FF2B5EF4-FFF2-40B4-BE49-F238E27FC236}">
-                <a16:creationId xmlns:a16="http://schemas.microsoft.com/office/drawing/2014/main" id="{19125229-D9CE-446F-B3BA-A3C71A56D9BA}"/>
+                <a16:creationId xmlns:a16="http://schemas.microsoft.com/office/drawing/2014/main" id="{2327BCD7-333C-415F-B743-0988EA2C9823}"/>
               </a:ext>
             </a:extLst>
           </p:cNvPr>
@@ -4858,71 +5892,8 @@
           <a:p>
             <a:r>
               <a:rPr lang="de-AT" dirty="0"/>
-              <a:t>Cross-</a:t>
-            </a:r>
-            <a:r>
-              <a:rPr lang="de-AT" dirty="0" err="1"/>
-              <a:t>Platform</a:t>
-            </a:r>
-            <a:r>
-              <a:rPr lang="de-AT" dirty="0"/>
-              <a:t> möglich</a:t>
-            </a:r>
-          </a:p>
-          <a:p>
-            <a:pPr lvl="1"/>
-            <a:r>
-              <a:rPr lang="de-AT" dirty="0"/>
-              <a:t>durch das Framework </a:t>
-            </a:r>
-            <a:r>
-              <a:rPr lang="de-AT" dirty="0" err="1"/>
-              <a:t>LibGDX</a:t>
-            </a:r>
-            <a:endParaRPr lang="de-AT" dirty="0"/>
-          </a:p>
-          <a:p>
-            <a:r>
-              <a:rPr lang="de-AT" dirty="0"/>
-              <a:t>Android-Umsetzung:</a:t>
-            </a:r>
-          </a:p>
-          <a:p>
-            <a:pPr lvl="1"/>
-            <a:r>
-              <a:rPr lang="de-AT" dirty="0"/>
-              <a:t>Android Studio</a:t>
-            </a:r>
-          </a:p>
-          <a:p>
-            <a:pPr lvl="1"/>
-            <a:r>
-              <a:rPr lang="de-AT" dirty="0"/>
-              <a:t>Grafiken: </a:t>
-            </a:r>
-            <a:r>
-              <a:rPr lang="de-AT" dirty="0" err="1"/>
-              <a:t>Tiled</a:t>
-            </a:r>
-            <a:r>
-              <a:rPr lang="de-AT" dirty="0"/>
-              <a:t>, </a:t>
-            </a:r>
-            <a:r>
-              <a:rPr lang="de-AT" dirty="0" err="1"/>
-              <a:t>TextureMaker</a:t>
-            </a:r>
-            <a:endParaRPr lang="de-AT" dirty="0"/>
-          </a:p>
-          <a:p>
-            <a:pPr marL="0" indent="0">
-              <a:buNone/>
-            </a:pPr>
-            <a:endParaRPr lang="de-AT" dirty="0"/>
-          </a:p>
-          <a:p>
-            <a:pPr lvl="1"/>
-            <a:endParaRPr lang="de-AT" dirty="0"/>
+              <a:t>Vom ersten Entwurf…</a:t>
+            </a:r>
           </a:p>
         </p:txBody>
       </p:sp>
@@ -4931,7 +5902,7 @@
           <p:cNvPr id="4" name="Datumsplatzhalter 3">
             <a:extLst>
               <a:ext uri="{FF2B5EF4-FFF2-40B4-BE49-F238E27FC236}">
-                <a16:creationId xmlns:a16="http://schemas.microsoft.com/office/drawing/2014/main" id="{99F8E540-3191-40C6-BF9B-6E58F2FCBED4}"/>
+                <a16:creationId xmlns:a16="http://schemas.microsoft.com/office/drawing/2014/main" id="{17EC1D24-34A1-40FE-BAF7-66D24663ADCE}"/>
               </a:ext>
             </a:extLst>
           </p:cNvPr>
@@ -4947,9 +5918,9 @@
           <a:bodyPr/>
           <a:lstStyle/>
           <a:p>
-            <a:fld id="{0F958EBF-1DD2-48CD-AC05-99BB382075B8}" type="datetime1">
+            <a:fld id="{D0495679-6854-4CEB-AB4A-7941CB807E4C}" type="datetime1">
               <a:rPr lang="de-DE" smtClean="0"/>
-              <a:t>02.07.2017</a:t>
+              <a:t>03.07.2017</a:t>
             </a:fld>
             <a:endParaRPr lang="de-DE"/>
           </a:p>
@@ -4957,10 +5928,10 @@
       </p:sp>
       <p:sp>
         <p:nvSpPr>
-          <p:cNvPr id="6" name="Foliennummernplatzhalter 5">
+          <p:cNvPr id="5" name="Foliennummernplatzhalter 4">
             <a:extLst>
               <a:ext uri="{FF2B5EF4-FFF2-40B4-BE49-F238E27FC236}">
-                <a16:creationId xmlns:a16="http://schemas.microsoft.com/office/drawing/2014/main" id="{3CEAB98A-0B6A-4D93-B9D6-67800B89F0C1}"/>
+                <a16:creationId xmlns:a16="http://schemas.microsoft.com/office/drawing/2014/main" id="{FF92848D-2A24-4008-9679-2043F68D7354}"/>
               </a:ext>
             </a:extLst>
           </p:cNvPr>
@@ -4984,10 +5955,44 @@
           </a:p>
         </p:txBody>
       </p:sp>
+      <p:pic>
+        <p:nvPicPr>
+          <p:cNvPr id="6" name="Grafik 5">
+            <a:extLst>
+              <a:ext uri="{FF2B5EF4-FFF2-40B4-BE49-F238E27FC236}">
+                <a16:creationId xmlns:a16="http://schemas.microsoft.com/office/drawing/2014/main" id="{203426FC-716D-4E76-AF36-B22344C1E247}"/>
+              </a:ext>
+            </a:extLst>
+          </p:cNvPr>
+          <p:cNvPicPr/>
+          <p:nvPr/>
+        </p:nvPicPr>
+        <p:blipFill>
+          <a:blip r:embed="rId2">
+            <a:extLst>
+              <a:ext uri="{28A0092B-C50C-407E-A947-70E740481C1C}">
+                <a14:useLocalDpi xmlns:a14="http://schemas.microsoft.com/office/drawing/2010/main" val="0"/>
+              </a:ext>
+            </a:extLst>
+          </a:blip>
+          <a:stretch>
+            <a:fillRect/>
+          </a:stretch>
+        </p:blipFill>
+        <p:spPr>
+          <a:xfrm>
+            <a:off x="457200" y="2455143"/>
+            <a:ext cx="8229600" cy="3551465"/>
+          </a:xfrm>
+          <a:prstGeom prst="rect">
+            <a:avLst/>
+          </a:prstGeom>
+        </p:spPr>
+      </p:pic>
     </p:spTree>
     <p:extLst>
       <p:ext uri="{BB962C8B-B14F-4D97-AF65-F5344CB8AC3E}">
-        <p14:creationId xmlns:p14="http://schemas.microsoft.com/office/powerpoint/2010/main" val="2147746240"/>
+        <p14:creationId xmlns:p14="http://schemas.microsoft.com/office/powerpoint/2010/main" val="218482960"/>
       </p:ext>
     </p:extLst>
   </p:cSld>
@@ -5019,7 +6024,7 @@
           <p:cNvPr id="2" name="Titel 1">
             <a:extLst>
               <a:ext uri="{FF2B5EF4-FFF2-40B4-BE49-F238E27FC236}">
-                <a16:creationId xmlns:a16="http://schemas.microsoft.com/office/drawing/2014/main" id="{35F84820-6B3F-4863-89D3-E157F3AA9A20}"/>
+                <a16:creationId xmlns:a16="http://schemas.microsoft.com/office/drawing/2014/main" id="{96328C03-38A0-490E-9C03-F6EC505FBD1A}"/>
               </a:ext>
             </a:extLst>
           </p:cNvPr>
@@ -5036,10 +6041,9 @@
           <a:lstStyle/>
           <a:p>
             <a:r>
-              <a:rPr lang="de-AT" dirty="0" err="1"/>
-              <a:t>LibGDX</a:t>
-            </a:r>
-            <a:endParaRPr lang="de-AT" dirty="0"/>
+              <a:rPr lang="de-AT" dirty="0"/>
+              <a:t>Designkonzept</a:t>
+            </a:r>
           </a:p>
         </p:txBody>
       </p:sp>
@@ -5048,7 +6052,7 @@
           <p:cNvPr id="3" name="Inhaltsplatzhalter 2">
             <a:extLst>
               <a:ext uri="{FF2B5EF4-FFF2-40B4-BE49-F238E27FC236}">
-                <a16:creationId xmlns:a16="http://schemas.microsoft.com/office/drawing/2014/main" id="{4895B13C-5C50-4F41-9987-8E00CE2F6AAE}"/>
+                <a16:creationId xmlns:a16="http://schemas.microsoft.com/office/drawing/2014/main" id="{E485D6DA-82D9-4D4A-AD3C-8422A0973F5E}"/>
               </a:ext>
             </a:extLst>
           </p:cNvPr>
@@ -5061,82 +6065,13 @@
         </p:nvSpPr>
         <p:spPr/>
         <p:txBody>
-          <a:bodyPr>
-            <a:normAutofit/>
-          </a:bodyPr>
-          <a:lstStyle/>
-          <a:p>
-            <a:r>
-              <a:rPr lang="de-AT" dirty="0"/>
-              <a:t>Cross-</a:t>
-            </a:r>
-            <a:r>
-              <a:rPr lang="de-AT" dirty="0" err="1"/>
-              <a:t>Platform</a:t>
-            </a:r>
-            <a:r>
-              <a:rPr lang="de-AT" dirty="0"/>
-              <a:t>-Framework</a:t>
-            </a:r>
-          </a:p>
-          <a:p>
-            <a:pPr lvl="1"/>
-            <a:r>
-              <a:rPr lang="de-AT" dirty="0"/>
-              <a:t>In Java</a:t>
-            </a:r>
-          </a:p>
-          <a:p>
-            <a:pPr lvl="1"/>
-            <a:r>
-              <a:rPr lang="de-AT" dirty="0"/>
-              <a:t>Ermöglicht Portabilität für</a:t>
-            </a:r>
-          </a:p>
-          <a:p>
-            <a:pPr lvl="2"/>
-            <a:r>
-              <a:rPr lang="de-AT" dirty="0"/>
-              <a:t>Desktop</a:t>
-            </a:r>
-          </a:p>
-          <a:p>
-            <a:pPr lvl="2"/>
-            <a:r>
-              <a:rPr lang="de-AT" dirty="0"/>
-              <a:t>Android</a:t>
-            </a:r>
-          </a:p>
-          <a:p>
-            <a:pPr lvl="2"/>
-            <a:r>
-              <a:rPr lang="de-AT" dirty="0"/>
-              <a:t>BlackBerry</a:t>
-            </a:r>
-          </a:p>
-          <a:p>
-            <a:pPr lvl="2"/>
-            <a:r>
-              <a:rPr lang="de-AT" dirty="0"/>
-              <a:t>iOS</a:t>
-            </a:r>
-          </a:p>
-          <a:p>
-            <a:pPr lvl="2"/>
-            <a:r>
-              <a:rPr lang="de-AT" dirty="0"/>
-              <a:t>HTML5</a:t>
-            </a:r>
-          </a:p>
-          <a:p>
-            <a:r>
-              <a:rPr lang="de-AT" sz="2600" dirty="0"/>
-              <a:t>Mehr Info unter https://libgdx.badlogicgames.com/</a:t>
-            </a:r>
-          </a:p>
-          <a:p>
-            <a:pPr lvl="1"/>
-            <a:endParaRPr lang="de-AT" dirty="0"/>
+          <a:bodyPr/>
+          <a:lstStyle/>
+          <a:p>
+            <a:r>
+              <a:rPr lang="de-AT" dirty="0"/>
+              <a:t>… bis zur Umsetzung</a:t>
+            </a:r>
           </a:p>
         </p:txBody>
       </p:sp>
@@ -5145,7 +6080,7 @@
           <p:cNvPr id="4" name="Datumsplatzhalter 3">
             <a:extLst>
               <a:ext uri="{FF2B5EF4-FFF2-40B4-BE49-F238E27FC236}">
-                <a16:creationId xmlns:a16="http://schemas.microsoft.com/office/drawing/2014/main" id="{E10D0D97-B391-40CB-A53D-C59E31B28FA7}"/>
+                <a16:creationId xmlns:a16="http://schemas.microsoft.com/office/drawing/2014/main" id="{3621DC5F-8BBB-4B83-845D-A40866A59012}"/>
               </a:ext>
             </a:extLst>
           </p:cNvPr>
@@ -5161,9 +6096,9 @@
           <a:bodyPr/>
           <a:lstStyle/>
           <a:p>
-            <a:fld id="{C5527C25-6B2E-4D57-B688-6E82BA7CFFE8}" type="datetime1">
+            <a:fld id="{D0495679-6854-4CEB-AB4A-7941CB807E4C}" type="datetime1">
               <a:rPr lang="de-DE" smtClean="0"/>
-              <a:t>02.07.2017</a:t>
+              <a:t>03.07.2017</a:t>
             </a:fld>
             <a:endParaRPr lang="de-DE"/>
           </a:p>
@@ -5171,10 +6106,10 @@
       </p:sp>
       <p:sp>
         <p:nvSpPr>
-          <p:cNvPr id="6" name="Foliennummernplatzhalter 5">
+          <p:cNvPr id="5" name="Foliennummernplatzhalter 4">
             <a:extLst>
               <a:ext uri="{FF2B5EF4-FFF2-40B4-BE49-F238E27FC236}">
-                <a16:creationId xmlns:a16="http://schemas.microsoft.com/office/drawing/2014/main" id="{E5B46D77-FF69-42D2-909C-7BA91223A99F}"/>
+                <a16:creationId xmlns:a16="http://schemas.microsoft.com/office/drawing/2014/main" id="{A86CC025-2ED4-4803-B00E-DD370513484B}"/>
               </a:ext>
             </a:extLst>
           </p:cNvPr>
@@ -5198,10 +6133,46 @@
           </a:p>
         </p:txBody>
       </p:sp>
+      <p:pic>
+        <p:nvPicPr>
+          <p:cNvPr id="7" name="Grafik 6" descr="Ein Bild, das Objekt enthält.&#10;&#10;Mit sehr hoher Zuverlässigkeit generierte Beschreibung">
+            <a:extLst>
+              <a:ext uri="{FF2B5EF4-FFF2-40B4-BE49-F238E27FC236}">
+                <a16:creationId xmlns:a16="http://schemas.microsoft.com/office/drawing/2014/main" id="{01CF66DA-BBD6-42AC-88F5-E170BCB7A793}"/>
+              </a:ext>
+            </a:extLst>
+          </p:cNvPr>
+          <p:cNvPicPr>
+            <a:picLocks noChangeAspect="1"/>
+          </p:cNvPicPr>
+          <p:nvPr/>
+        </p:nvPicPr>
+        <p:blipFill>
+          <a:blip r:embed="rId2" cstate="print">
+            <a:extLst>
+              <a:ext uri="{28A0092B-C50C-407E-A947-70E740481C1C}">
+                <a14:useLocalDpi xmlns:a14="http://schemas.microsoft.com/office/drawing/2010/main" val="0"/>
+              </a:ext>
+            </a:extLst>
+          </a:blip>
+          <a:stretch>
+            <a:fillRect/>
+          </a:stretch>
+        </p:blipFill>
+        <p:spPr>
+          <a:xfrm>
+            <a:off x="1331640" y="2424070"/>
+            <a:ext cx="6480720" cy="3645405"/>
+          </a:xfrm>
+          <a:prstGeom prst="rect">
+            <a:avLst/>
+          </a:prstGeom>
+        </p:spPr>
+      </p:pic>
     </p:spTree>
     <p:extLst>
       <p:ext uri="{BB962C8B-B14F-4D97-AF65-F5344CB8AC3E}">
-        <p14:creationId xmlns:p14="http://schemas.microsoft.com/office/powerpoint/2010/main" val="3118299583"/>
+        <p14:creationId xmlns:p14="http://schemas.microsoft.com/office/powerpoint/2010/main" val="3948292543"/>
       </p:ext>
     </p:extLst>
   </p:cSld>
@@ -5233,7 +6204,7 @@
           <p:cNvPr id="2" name="Titel 1">
             <a:extLst>
               <a:ext uri="{FF2B5EF4-FFF2-40B4-BE49-F238E27FC236}">
-                <a16:creationId xmlns:a16="http://schemas.microsoft.com/office/drawing/2014/main" id="{3B6BC7AA-67B8-4973-85D2-5C6E002E9B58}"/>
+                <a16:creationId xmlns:a16="http://schemas.microsoft.com/office/drawing/2014/main" id="{D90A2D35-A4AA-4143-967F-F6F2C6C932C9}"/>
               </a:ext>
             </a:extLst>
           </p:cNvPr>
@@ -5251,7 +6222,7 @@
           <a:p>
             <a:r>
               <a:rPr lang="de-AT" dirty="0"/>
-              <a:t>Demo</a:t>
+              <a:t>Die Umsetzung</a:t>
             </a:r>
           </a:p>
         </p:txBody>
@@ -5261,7 +6232,7 @@
           <p:cNvPr id="3" name="Inhaltsplatzhalter 2">
             <a:extLst>
               <a:ext uri="{FF2B5EF4-FFF2-40B4-BE49-F238E27FC236}">
-                <a16:creationId xmlns:a16="http://schemas.microsoft.com/office/drawing/2014/main" id="{7875CACD-CF31-4C15-B665-239523EF88F3}"/>
+                <a16:creationId xmlns:a16="http://schemas.microsoft.com/office/drawing/2014/main" id="{19125229-D9CE-446F-B3BA-A3C71A56D9BA}"/>
               </a:ext>
             </a:extLst>
           </p:cNvPr>
@@ -5279,8 +6250,69 @@
           <a:p>
             <a:r>
               <a:rPr lang="de-AT" dirty="0"/>
-              <a:t>Screenshots / Video</a:t>
-            </a:r>
+              <a:t>Android Studio</a:t>
+            </a:r>
+          </a:p>
+          <a:p>
+            <a:pPr lvl="1"/>
+            <a:r>
+              <a:rPr lang="de-AT" dirty="0"/>
+              <a:t>Programm zur Entwicklung von Android</a:t>
+            </a:r>
+          </a:p>
+          <a:p>
+            <a:pPr lvl="1"/>
+            <a:r>
+              <a:rPr lang="de-AT" dirty="0"/>
+              <a:t>Nutzung für</a:t>
+            </a:r>
+          </a:p>
+          <a:p>
+            <a:pPr lvl="2"/>
+            <a:r>
+              <a:rPr lang="de-AT" dirty="0"/>
+              <a:t>Coding</a:t>
+            </a:r>
+          </a:p>
+          <a:p>
+            <a:pPr lvl="2"/>
+            <a:r>
+              <a:rPr lang="de-AT" dirty="0"/>
+              <a:t>Verwaltung des Projekts in GIT</a:t>
+            </a:r>
+          </a:p>
+          <a:p>
+            <a:r>
+              <a:rPr lang="de-AT" dirty="0"/>
+              <a:t>Zusätzliche Programme:</a:t>
+            </a:r>
+          </a:p>
+          <a:p>
+            <a:pPr lvl="1"/>
+            <a:r>
+              <a:rPr lang="de-AT" dirty="0" err="1"/>
+              <a:t>Tiled</a:t>
+            </a:r>
+            <a:r>
+              <a:rPr lang="de-AT" dirty="0"/>
+              <a:t>, </a:t>
+            </a:r>
+            <a:r>
+              <a:rPr lang="de-AT" dirty="0" err="1"/>
+              <a:t>TexturePacker</a:t>
+            </a:r>
+            <a:endParaRPr lang="de-AT" dirty="0"/>
+          </a:p>
+          <a:p>
+            <a:r>
+              <a:rPr lang="de-AT" dirty="0"/>
+              <a:t>Framework </a:t>
+            </a:r>
+            <a:r>
+              <a:rPr lang="de-AT" dirty="0" err="1"/>
+              <a:t>LibGDX</a:t>
+            </a:r>
+            <a:endParaRPr lang="de-AT" dirty="0"/>
           </a:p>
         </p:txBody>
       </p:sp>
@@ -5289,7 +6321,7 @@
           <p:cNvPr id="4" name="Datumsplatzhalter 3">
             <a:extLst>
               <a:ext uri="{FF2B5EF4-FFF2-40B4-BE49-F238E27FC236}">
-                <a16:creationId xmlns:a16="http://schemas.microsoft.com/office/drawing/2014/main" id="{A5BC6079-6BB4-43D6-A397-9A1D47A067EF}"/>
+                <a16:creationId xmlns:a16="http://schemas.microsoft.com/office/drawing/2014/main" id="{99F8E540-3191-40C6-BF9B-6E58F2FCBED4}"/>
               </a:ext>
             </a:extLst>
           </p:cNvPr>
@@ -5305,9 +6337,9 @@
           <a:bodyPr/>
           <a:lstStyle/>
           <a:p>
-            <a:fld id="{33426F46-14CA-4DF1-BDB6-9C38CC53B0B1}" type="datetime1">
+            <a:fld id="{0F958EBF-1DD2-48CD-AC05-99BB382075B8}" type="datetime1">
               <a:rPr lang="de-DE" smtClean="0"/>
-              <a:t>02.07.2017</a:t>
+              <a:t>03.07.2017</a:t>
             </a:fld>
             <a:endParaRPr lang="de-DE"/>
           </a:p>
@@ -5318,7 +6350,7 @@
           <p:cNvPr id="6" name="Foliennummernplatzhalter 5">
             <a:extLst>
               <a:ext uri="{FF2B5EF4-FFF2-40B4-BE49-F238E27FC236}">
-                <a16:creationId xmlns:a16="http://schemas.microsoft.com/office/drawing/2014/main" id="{366CF890-D1E4-44C0-A452-9991067C7D6D}"/>
+                <a16:creationId xmlns:a16="http://schemas.microsoft.com/office/drawing/2014/main" id="{3CEAB98A-0B6A-4D93-B9D6-67800B89F0C1}"/>
               </a:ext>
             </a:extLst>
           </p:cNvPr>
@@ -5345,7 +6377,7 @@
     </p:spTree>
     <p:extLst>
       <p:ext uri="{BB962C8B-B14F-4D97-AF65-F5344CB8AC3E}">
-        <p14:creationId xmlns:p14="http://schemas.microsoft.com/office/powerpoint/2010/main" val="1442948324"/>
+        <p14:creationId xmlns:p14="http://schemas.microsoft.com/office/powerpoint/2010/main" val="2147746240"/>
       </p:ext>
     </p:extLst>
   </p:cSld>

</xml_diff>

<commit_message>
changed Presentation, no Highscreen anymore
</commit_message>
<xml_diff>
--- a/svn/JG16S17P06/trunk/Documentation/ProjectDocumentation/Presentation.pptx
+++ b/svn/JG16S17P06/trunk/Documentation/ProjectDocumentation/Presentation.pptx
@@ -5,7 +5,7 @@
     <p:sldMasterId id="2147483648" r:id="rId1"/>
   </p:sldMasterIdLst>
   <p:notesMasterIdLst>
-    <p:notesMasterId r:id="rId17"/>
+    <p:notesMasterId r:id="rId21"/>
   </p:notesMasterIdLst>
   <p:sldIdLst>
     <p:sldId id="256" r:id="rId2"/>
@@ -19,10 +19,14 @@
     <p:sldId id="261" r:id="rId10"/>
     <p:sldId id="267" r:id="rId11"/>
     <p:sldId id="268" r:id="rId12"/>
-    <p:sldId id="263" r:id="rId13"/>
-    <p:sldId id="262" r:id="rId14"/>
-    <p:sldId id="266" r:id="rId15"/>
-    <p:sldId id="258" r:id="rId16"/>
+    <p:sldId id="271" r:id="rId13"/>
+    <p:sldId id="263" r:id="rId14"/>
+    <p:sldId id="273" r:id="rId15"/>
+    <p:sldId id="262" r:id="rId16"/>
+    <p:sldId id="272" r:id="rId17"/>
+    <p:sldId id="266" r:id="rId18"/>
+    <p:sldId id="274" r:id="rId19"/>
+    <p:sldId id="258" r:id="rId20"/>
   </p:sldIdLst>
   <p:sldSz cx="9144000" cy="6858000" type="screen4x3"/>
   <p:notesSz cx="6858000" cy="9144000"/>
@@ -226,7 +230,7 @@
           <a:p>
             <a:fld id="{46C2B02B-D0B1-402B-AD15-9AD2711B2FBB}" type="datetimeFigureOut">
               <a:rPr lang="de-AT" smtClean="0"/>
-              <a:t>03.07.2017</a:t>
+              <a:t>04.07.2017</a:t>
             </a:fld>
             <a:endParaRPr lang="de-AT"/>
           </a:p>
@@ -779,7 +783,7 @@
           <a:p>
             <a:fld id="{154BAE7E-5592-4324-98B0-A02BD84EF6BB}" type="datetime1">
               <a:rPr lang="de-DE" smtClean="0"/>
-              <a:t>03.07.2017</a:t>
+              <a:t>04.07.2017</a:t>
             </a:fld>
             <a:endParaRPr lang="de-DE"/>
           </a:p>
@@ -957,7 +961,7 @@
           <a:p>
             <a:fld id="{149E5939-272F-4759-A2BF-C86F5993F02B}" type="datetime1">
               <a:rPr lang="de-DE" smtClean="0"/>
-              <a:t>03.07.2017</a:t>
+              <a:t>04.07.2017</a:t>
             </a:fld>
             <a:endParaRPr lang="de-DE"/>
           </a:p>
@@ -1133,7 +1137,7 @@
           <a:p>
             <a:fld id="{954D2159-BB7A-45BA-96F9-E016371DC7CC}" type="datetime1">
               <a:rPr lang="de-DE" smtClean="0"/>
-              <a:t>03.07.2017</a:t>
+              <a:t>04.07.2017</a:t>
             </a:fld>
             <a:endParaRPr lang="de-DE"/>
           </a:p>
@@ -1299,7 +1303,7 @@
           <a:p>
             <a:fld id="{D0495679-6854-4CEB-AB4A-7941CB807E4C}" type="datetime1">
               <a:rPr lang="de-DE" smtClean="0"/>
-              <a:t>03.07.2017</a:t>
+              <a:t>04.07.2017</a:t>
             </a:fld>
             <a:endParaRPr lang="de-DE"/>
           </a:p>
@@ -1542,7 +1546,7 @@
           <a:p>
             <a:fld id="{C9FD33F6-9596-4B42-B111-E507BE577142}" type="datetime1">
               <a:rPr lang="de-DE" smtClean="0"/>
-              <a:t>03.07.2017</a:t>
+              <a:t>04.07.2017</a:t>
             </a:fld>
             <a:endParaRPr lang="de-DE"/>
           </a:p>
@@ -1825,7 +1829,7 @@
           <a:p>
             <a:fld id="{DC0F5FB0-7DC9-4C66-B7EF-2A84AA2093B1}" type="datetime1">
               <a:rPr lang="de-DE" smtClean="0"/>
-              <a:t>03.07.2017</a:t>
+              <a:t>04.07.2017</a:t>
             </a:fld>
             <a:endParaRPr lang="de-DE"/>
           </a:p>
@@ -2242,7 +2246,7 @@
           <a:p>
             <a:fld id="{C44DDAA9-F232-4B8A-A772-1EDD6590F997}" type="datetime1">
               <a:rPr lang="de-DE" smtClean="0"/>
-              <a:t>03.07.2017</a:t>
+              <a:t>04.07.2017</a:t>
             </a:fld>
             <a:endParaRPr lang="de-DE"/>
           </a:p>
@@ -2357,7 +2361,7 @@
           <a:p>
             <a:fld id="{2B49DEEB-6EEE-4CB5-9938-F627F0B10E62}" type="datetime1">
               <a:rPr lang="de-DE" smtClean="0"/>
-              <a:t>03.07.2017</a:t>
+              <a:t>04.07.2017</a:t>
             </a:fld>
             <a:endParaRPr lang="de-DE"/>
           </a:p>
@@ -2450,7 +2454,7 @@
           <a:p>
             <a:fld id="{5263656D-AFA4-4376-BB4A-5585C07D4822}" type="datetime1">
               <a:rPr lang="de-DE" smtClean="0"/>
-              <a:t>03.07.2017</a:t>
+              <a:t>04.07.2017</a:t>
             </a:fld>
             <a:endParaRPr lang="de-DE"/>
           </a:p>
@@ -2723,7 +2727,7 @@
           <a:p>
             <a:fld id="{AB09C56F-9782-4DBB-BF0F-F68A743FAA25}" type="datetime1">
               <a:rPr lang="de-DE" smtClean="0"/>
-              <a:t>03.07.2017</a:t>
+              <a:t>04.07.2017</a:t>
             </a:fld>
             <a:endParaRPr lang="de-DE"/>
           </a:p>
@@ -2973,7 +2977,7 @@
           <a:p>
             <a:fld id="{8BBFEB6A-7563-4909-825C-997C7F15FC15}" type="datetime1">
               <a:rPr lang="de-DE" smtClean="0"/>
-              <a:t>03.07.2017</a:t>
+              <a:t>04.07.2017</a:t>
             </a:fld>
             <a:endParaRPr lang="de-DE"/>
           </a:p>
@@ -3258,7 +3262,7 @@
           <a:p>
             <a:fld id="{837B529E-E57A-4FB3-9945-F3D934678812}" type="datetime1">
               <a:rPr lang="de-DE" smtClean="0"/>
-              <a:t>03.07.2017</a:t>
+              <a:t>04.07.2017</a:t>
             </a:fld>
             <a:endParaRPr lang="de-DE"/>
           </a:p>
@@ -3903,7 +3907,7 @@
           <a:p>
             <a:fld id="{D0495679-6854-4CEB-AB4A-7941CB807E4C}" type="datetime1">
               <a:rPr lang="de-DE" smtClean="0"/>
-              <a:t>03.07.2017</a:t>
+              <a:t>04.07.2017</a:t>
             </a:fld>
             <a:endParaRPr lang="de-DE"/>
           </a:p>
@@ -4180,7 +4184,7 @@
           <a:p>
             <a:fld id="{D0495679-6854-4CEB-AB4A-7941CB807E4C}" type="datetime1">
               <a:rPr lang="de-DE" smtClean="0"/>
-              <a:t>03.07.2017</a:t>
+              <a:t>04.07.2017</a:t>
             </a:fld>
             <a:endParaRPr lang="de-DE"/>
           </a:p>
@@ -4297,6 +4301,188 @@
           <p:cNvPr id="2" name="Titel 1">
             <a:extLst>
               <a:ext uri="{FF2B5EF4-FFF2-40B4-BE49-F238E27FC236}">
+                <a16:creationId xmlns:a16="http://schemas.microsoft.com/office/drawing/2014/main" id="{577232A7-93AC-4F79-9489-7EA934A96A34}"/>
+              </a:ext>
+            </a:extLst>
+          </p:cNvPr>
+          <p:cNvSpPr>
+            <a:spLocks noGrp="1"/>
+          </p:cNvSpPr>
+          <p:nvPr>
+            <p:ph type="title"/>
+          </p:nvPr>
+        </p:nvSpPr>
+        <p:spPr/>
+        <p:txBody>
+          <a:bodyPr/>
+          <a:lstStyle/>
+          <a:p>
+            <a:r>
+              <a:rPr lang="de-AT" dirty="0" err="1"/>
+              <a:t>ParticleEditor</a:t>
+            </a:r>
+            <a:endParaRPr lang="de-AT" dirty="0"/>
+          </a:p>
+        </p:txBody>
+      </p:sp>
+      <p:sp>
+        <p:nvSpPr>
+          <p:cNvPr id="3" name="Inhaltsplatzhalter 2">
+            <a:extLst>
+              <a:ext uri="{FF2B5EF4-FFF2-40B4-BE49-F238E27FC236}">
+                <a16:creationId xmlns:a16="http://schemas.microsoft.com/office/drawing/2014/main" id="{5B671FBC-C183-46AC-9F20-E14ABBED5DA7}"/>
+              </a:ext>
+            </a:extLst>
+          </p:cNvPr>
+          <p:cNvSpPr>
+            <a:spLocks noGrp="1"/>
+          </p:cNvSpPr>
+          <p:nvPr>
+            <p:ph idx="1"/>
+          </p:nvPr>
+        </p:nvSpPr>
+        <p:spPr/>
+        <p:txBody>
+          <a:bodyPr/>
+          <a:lstStyle/>
+          <a:p>
+            <a:r>
+              <a:rPr lang="de-AT" dirty="0"/>
+              <a:t>Erstellen von Partikel-Effekten</a:t>
+            </a:r>
+          </a:p>
+          <a:p>
+            <a:pPr lvl="1"/>
+            <a:r>
+              <a:rPr lang="de-AT" dirty="0"/>
+              <a:t>Als Schuss-Animation für die Tower verwendet</a:t>
+            </a:r>
+          </a:p>
+        </p:txBody>
+      </p:sp>
+      <p:sp>
+        <p:nvSpPr>
+          <p:cNvPr id="4" name="Datumsplatzhalter 3">
+            <a:extLst>
+              <a:ext uri="{FF2B5EF4-FFF2-40B4-BE49-F238E27FC236}">
+                <a16:creationId xmlns:a16="http://schemas.microsoft.com/office/drawing/2014/main" id="{A8984783-1BA5-4454-8B03-F84C716308D0}"/>
+              </a:ext>
+            </a:extLst>
+          </p:cNvPr>
+          <p:cNvSpPr>
+            <a:spLocks noGrp="1"/>
+          </p:cNvSpPr>
+          <p:nvPr>
+            <p:ph type="dt" sz="half" idx="10"/>
+          </p:nvPr>
+        </p:nvSpPr>
+        <p:spPr/>
+        <p:txBody>
+          <a:bodyPr/>
+          <a:lstStyle/>
+          <a:p>
+            <a:fld id="{D0495679-6854-4CEB-AB4A-7941CB807E4C}" type="datetime1">
+              <a:rPr lang="de-DE" smtClean="0"/>
+              <a:t>04.07.2017</a:t>
+            </a:fld>
+            <a:endParaRPr lang="de-DE"/>
+          </a:p>
+        </p:txBody>
+      </p:sp>
+      <p:sp>
+        <p:nvSpPr>
+          <p:cNvPr id="5" name="Foliennummernplatzhalter 4">
+            <a:extLst>
+              <a:ext uri="{FF2B5EF4-FFF2-40B4-BE49-F238E27FC236}">
+                <a16:creationId xmlns:a16="http://schemas.microsoft.com/office/drawing/2014/main" id="{D68719FF-814E-433A-A7FB-68F971F24727}"/>
+              </a:ext>
+            </a:extLst>
+          </p:cNvPr>
+          <p:cNvSpPr>
+            <a:spLocks noGrp="1"/>
+          </p:cNvSpPr>
+          <p:nvPr>
+            <p:ph type="sldNum" sz="quarter" idx="12"/>
+          </p:nvPr>
+        </p:nvSpPr>
+        <p:spPr/>
+        <p:txBody>
+          <a:bodyPr/>
+          <a:lstStyle/>
+          <a:p>
+            <a:fld id="{6C6AE60A-B69C-4790-82F7-3882EDF23186}" type="slidenum">
+              <a:rPr lang="de-DE" smtClean="0"/>
+              <a:t>12</a:t>
+            </a:fld>
+            <a:endParaRPr lang="de-DE"/>
+          </a:p>
+        </p:txBody>
+      </p:sp>
+      <p:pic>
+        <p:nvPicPr>
+          <p:cNvPr id="6" name="Grafik 5">
+            <a:extLst>
+              <a:ext uri="{FF2B5EF4-FFF2-40B4-BE49-F238E27FC236}">
+                <a16:creationId xmlns:a16="http://schemas.microsoft.com/office/drawing/2014/main" id="{AD63DED9-414F-42B4-B803-0DA64E58A999}"/>
+              </a:ext>
+            </a:extLst>
+          </p:cNvPr>
+          <p:cNvPicPr>
+            <a:picLocks noChangeAspect="1"/>
+          </p:cNvPicPr>
+          <p:nvPr/>
+        </p:nvPicPr>
+        <p:blipFill>
+          <a:blip r:embed="rId2"/>
+          <a:stretch>
+            <a:fillRect/>
+          </a:stretch>
+        </p:blipFill>
+        <p:spPr>
+          <a:xfrm>
+            <a:off x="1679848" y="3308707"/>
+            <a:ext cx="5784304" cy="3406707"/>
+          </a:xfrm>
+          <a:prstGeom prst="rect">
+            <a:avLst/>
+          </a:prstGeom>
+        </p:spPr>
+      </p:pic>
+    </p:spTree>
+    <p:extLst>
+      <p:ext uri="{BB962C8B-B14F-4D97-AF65-F5344CB8AC3E}">
+        <p14:creationId xmlns:p14="http://schemas.microsoft.com/office/powerpoint/2010/main" val="3748420000"/>
+      </p:ext>
+    </p:extLst>
+  </p:cSld>
+  <p:clrMapOvr>
+    <a:masterClrMapping/>
+  </p:clrMapOvr>
+</p:sld>
+</file>
+
+<file path=ppt/slides/slide13.xml><?xml version="1.0" encoding="utf-8"?>
+<p:sld xmlns:a="http://schemas.openxmlformats.org/drawingml/2006/main" xmlns:r="http://schemas.openxmlformats.org/officeDocument/2006/relationships" xmlns:p="http://schemas.openxmlformats.org/presentationml/2006/main">
+  <p:cSld>
+    <p:spTree>
+      <p:nvGrpSpPr>
+        <p:cNvPr id="1" name=""/>
+        <p:cNvGrpSpPr/>
+        <p:nvPr/>
+      </p:nvGrpSpPr>
+      <p:grpSpPr>
+        <a:xfrm>
+          <a:off x="0" y="0"/>
+          <a:ext cx="0" cy="0"/>
+          <a:chOff x="0" y="0"/>
+          <a:chExt cx="0" cy="0"/>
+        </a:xfrm>
+      </p:grpSpPr>
+      <p:sp>
+        <p:nvSpPr>
+          <p:cNvPr id="2" name="Titel 1">
+            <a:extLst>
+              <a:ext uri="{FF2B5EF4-FFF2-40B4-BE49-F238E27FC236}">
                 <a16:creationId xmlns:a16="http://schemas.microsoft.com/office/drawing/2014/main" id="{35F84820-6B3F-4863-89D3-E157F3AA9A20}"/>
               </a:ext>
             </a:extLst>
@@ -4412,7 +4598,7 @@
           <a:p>
             <a:r>
               <a:rPr lang="de-AT" sz="2600" dirty="0"/>
-              <a:t>Mehr Info unter https://libgdx.badlogicgames.com/</a:t>
+              <a:t>API designt für Spiele</a:t>
             </a:r>
           </a:p>
           <a:p>
@@ -4444,7 +4630,7 @@
           <a:p>
             <a:fld id="{C5527C25-6B2E-4D57-B688-6E82BA7CFFE8}" type="datetime1">
               <a:rPr lang="de-DE" smtClean="0"/>
-              <a:t>03.07.2017</a:t>
+              <a:t>04.07.2017</a:t>
             </a:fld>
             <a:endParaRPr lang="de-DE"/>
           </a:p>
@@ -4473,7 +4659,7 @@
           <a:p>
             <a:fld id="{6C6AE60A-B69C-4790-82F7-3882EDF23186}" type="slidenum">
               <a:rPr lang="de-DE" smtClean="0"/>
-              <a:t>12</a:t>
+              <a:t>13</a:t>
             </a:fld>
             <a:endParaRPr lang="de-DE"/>
           </a:p>
@@ -4539,150 +4725,6 @@
 </p:sld>
 </file>
 
-<file path=ppt/slides/slide13.xml><?xml version="1.0" encoding="utf-8"?>
-<p:sld xmlns:a="http://schemas.openxmlformats.org/drawingml/2006/main" xmlns:r="http://schemas.openxmlformats.org/officeDocument/2006/relationships" xmlns:p="http://schemas.openxmlformats.org/presentationml/2006/main">
-  <p:cSld>
-    <p:spTree>
-      <p:nvGrpSpPr>
-        <p:cNvPr id="1" name=""/>
-        <p:cNvGrpSpPr/>
-        <p:nvPr/>
-      </p:nvGrpSpPr>
-      <p:grpSpPr>
-        <a:xfrm>
-          <a:off x="0" y="0"/>
-          <a:ext cx="0" cy="0"/>
-          <a:chOff x="0" y="0"/>
-          <a:chExt cx="0" cy="0"/>
-        </a:xfrm>
-      </p:grpSpPr>
-      <p:sp>
-        <p:nvSpPr>
-          <p:cNvPr id="2" name="Titel 1">
-            <a:extLst>
-              <a:ext uri="{FF2B5EF4-FFF2-40B4-BE49-F238E27FC236}">
-                <a16:creationId xmlns:a16="http://schemas.microsoft.com/office/drawing/2014/main" id="{3B6BC7AA-67B8-4973-85D2-5C6E002E9B58}"/>
-              </a:ext>
-            </a:extLst>
-          </p:cNvPr>
-          <p:cNvSpPr>
-            <a:spLocks noGrp="1"/>
-          </p:cNvSpPr>
-          <p:nvPr>
-            <p:ph type="title"/>
-          </p:nvPr>
-        </p:nvSpPr>
-        <p:spPr/>
-        <p:txBody>
-          <a:bodyPr/>
-          <a:lstStyle/>
-          <a:p>
-            <a:r>
-              <a:rPr lang="de-AT" dirty="0"/>
-              <a:t>Demo</a:t>
-            </a:r>
-          </a:p>
-        </p:txBody>
-      </p:sp>
-      <p:sp>
-        <p:nvSpPr>
-          <p:cNvPr id="3" name="Inhaltsplatzhalter 2">
-            <a:extLst>
-              <a:ext uri="{FF2B5EF4-FFF2-40B4-BE49-F238E27FC236}">
-                <a16:creationId xmlns:a16="http://schemas.microsoft.com/office/drawing/2014/main" id="{7875CACD-CF31-4C15-B665-239523EF88F3}"/>
-              </a:ext>
-            </a:extLst>
-          </p:cNvPr>
-          <p:cNvSpPr>
-            <a:spLocks noGrp="1"/>
-          </p:cNvSpPr>
-          <p:nvPr>
-            <p:ph idx="1"/>
-          </p:nvPr>
-        </p:nvSpPr>
-        <p:spPr/>
-        <p:txBody>
-          <a:bodyPr/>
-          <a:lstStyle/>
-          <a:p>
-            <a:r>
-              <a:rPr lang="de-AT" dirty="0"/>
-              <a:t>Video</a:t>
-            </a:r>
-          </a:p>
-        </p:txBody>
-      </p:sp>
-      <p:sp>
-        <p:nvSpPr>
-          <p:cNvPr id="4" name="Datumsplatzhalter 3">
-            <a:extLst>
-              <a:ext uri="{FF2B5EF4-FFF2-40B4-BE49-F238E27FC236}">
-                <a16:creationId xmlns:a16="http://schemas.microsoft.com/office/drawing/2014/main" id="{A5BC6079-6BB4-43D6-A397-9A1D47A067EF}"/>
-              </a:ext>
-            </a:extLst>
-          </p:cNvPr>
-          <p:cNvSpPr>
-            <a:spLocks noGrp="1"/>
-          </p:cNvSpPr>
-          <p:nvPr>
-            <p:ph type="dt" sz="half" idx="10"/>
-          </p:nvPr>
-        </p:nvSpPr>
-        <p:spPr/>
-        <p:txBody>
-          <a:bodyPr/>
-          <a:lstStyle/>
-          <a:p>
-            <a:fld id="{33426F46-14CA-4DF1-BDB6-9C38CC53B0B1}" type="datetime1">
-              <a:rPr lang="de-DE" smtClean="0"/>
-              <a:t>03.07.2017</a:t>
-            </a:fld>
-            <a:endParaRPr lang="de-DE"/>
-          </a:p>
-        </p:txBody>
-      </p:sp>
-      <p:sp>
-        <p:nvSpPr>
-          <p:cNvPr id="6" name="Foliennummernplatzhalter 5">
-            <a:extLst>
-              <a:ext uri="{FF2B5EF4-FFF2-40B4-BE49-F238E27FC236}">
-                <a16:creationId xmlns:a16="http://schemas.microsoft.com/office/drawing/2014/main" id="{366CF890-D1E4-44C0-A452-9991067C7D6D}"/>
-              </a:ext>
-            </a:extLst>
-          </p:cNvPr>
-          <p:cNvSpPr>
-            <a:spLocks noGrp="1"/>
-          </p:cNvSpPr>
-          <p:nvPr>
-            <p:ph type="sldNum" sz="quarter" idx="12"/>
-          </p:nvPr>
-        </p:nvSpPr>
-        <p:spPr/>
-        <p:txBody>
-          <a:bodyPr/>
-          <a:lstStyle/>
-          <a:p>
-            <a:fld id="{6C6AE60A-B69C-4790-82F7-3882EDF23186}" type="slidenum">
-              <a:rPr lang="de-DE" smtClean="0"/>
-              <a:t>13</a:t>
-            </a:fld>
-            <a:endParaRPr lang="de-DE"/>
-          </a:p>
-        </p:txBody>
-      </p:sp>
-    </p:spTree>
-    <p:extLst>
-      <p:ext uri="{BB962C8B-B14F-4D97-AF65-F5344CB8AC3E}">
-        <p14:creationId xmlns:p14="http://schemas.microsoft.com/office/powerpoint/2010/main" val="1442948324"/>
-      </p:ext>
-    </p:extLst>
-  </p:cSld>
-  <p:clrMapOvr>
-    <a:masterClrMapping/>
-  </p:clrMapOvr>
-</p:sld>
-</file>
-
 <file path=ppt/slides/slide14.xml><?xml version="1.0" encoding="utf-8"?>
 <p:sld xmlns:a="http://schemas.openxmlformats.org/drawingml/2006/main" xmlns:r="http://schemas.openxmlformats.org/officeDocument/2006/relationships" xmlns:p="http://schemas.openxmlformats.org/presentationml/2006/main">
   <p:cSld>
@@ -4705,7 +4747,7 @@
           <p:cNvPr id="2" name="Titel 1">
             <a:extLst>
               <a:ext uri="{FF2B5EF4-FFF2-40B4-BE49-F238E27FC236}">
-                <a16:creationId xmlns:a16="http://schemas.microsoft.com/office/drawing/2014/main" id="{73F24B0F-D7BE-46A2-B5F7-7EDAC5BD9B28}"/>
+                <a16:creationId xmlns:a16="http://schemas.microsoft.com/office/drawing/2014/main" id="{CE5E5504-7B46-440E-8E74-EF320DE2B284}"/>
               </a:ext>
             </a:extLst>
           </p:cNvPr>
@@ -4723,7 +4765,7 @@
           <a:p>
             <a:r>
               <a:rPr lang="de-AT" dirty="0"/>
-              <a:t>Ausblick</a:t>
+              <a:t>Animationen</a:t>
             </a:r>
           </a:p>
         </p:txBody>
@@ -4733,7 +4775,7 @@
           <p:cNvPr id="3" name="Inhaltsplatzhalter 2">
             <a:extLst>
               <a:ext uri="{FF2B5EF4-FFF2-40B4-BE49-F238E27FC236}">
-                <a16:creationId xmlns:a16="http://schemas.microsoft.com/office/drawing/2014/main" id="{E6E5B32A-8D8D-4328-B061-2A08070CF9A6}"/>
+                <a16:creationId xmlns:a16="http://schemas.microsoft.com/office/drawing/2014/main" id="{A863CD31-C0FC-42B2-8E0E-1C15B641AB3D}"/>
               </a:ext>
             </a:extLst>
           </p:cNvPr>
@@ -4751,33 +4793,35 @@
           <a:p>
             <a:r>
               <a:rPr lang="de-AT" dirty="0"/>
-              <a:t>Verschiedene Arten von Gegnern</a:t>
-            </a:r>
-          </a:p>
-          <a:p>
-            <a:r>
-              <a:rPr lang="de-AT" dirty="0"/>
-              <a:t>Verschiedene Maps auswählbar</a:t>
-            </a:r>
-          </a:p>
-          <a:p>
-            <a:r>
-              <a:rPr lang="de-AT" dirty="0"/>
-              <a:t>Tower fusionieren</a:t>
+              <a:t>Bild mit vorgefertigten Bewegungsabläufen</a:t>
+            </a:r>
+          </a:p>
+          <a:p>
+            <a:pPr lvl="1"/>
+            <a:r>
+              <a:rPr lang="de-AT" dirty="0" err="1"/>
+              <a:t>TexturePacker</a:t>
+            </a:r>
+            <a:r>
+              <a:rPr lang="de-AT" dirty="0"/>
+              <a:t> zur Erstellung</a:t>
+            </a:r>
+          </a:p>
+          <a:p>
+            <a:r>
+              <a:rPr lang="de-AT" dirty="0"/>
+              <a:t>Basiert auf Zeilen und Spalten</a:t>
+            </a:r>
+          </a:p>
+          <a:p>
+            <a:r>
+              <a:rPr lang="de-AT" dirty="0"/>
+              <a:t>Verwendung wie ein Array + Schleife</a:t>
             </a:r>
           </a:p>
           <a:p>
             <a:endParaRPr lang="de-AT" dirty="0"/>
           </a:p>
-          <a:p>
-            <a:r>
-              <a:rPr lang="de-AT" dirty="0"/>
-              <a:t>Portierung auf iOS</a:t>
-            </a:r>
-          </a:p>
-          <a:p>
-            <a:endParaRPr lang="de-AT" dirty="0"/>
-          </a:p>
         </p:txBody>
       </p:sp>
       <p:sp>
@@ -4785,7 +4829,7 @@
           <p:cNvPr id="4" name="Datumsplatzhalter 3">
             <a:extLst>
               <a:ext uri="{FF2B5EF4-FFF2-40B4-BE49-F238E27FC236}">
-                <a16:creationId xmlns:a16="http://schemas.microsoft.com/office/drawing/2014/main" id="{D01F9BCF-6E42-40A9-9583-41B541DCC396}"/>
+                <a16:creationId xmlns:a16="http://schemas.microsoft.com/office/drawing/2014/main" id="{7D42AEDD-A64B-48EF-B2B0-F27F9D426CA4}"/>
               </a:ext>
             </a:extLst>
           </p:cNvPr>
@@ -4803,7 +4847,7 @@
           <a:p>
             <a:fld id="{D0495679-6854-4CEB-AB4A-7941CB807E4C}" type="datetime1">
               <a:rPr lang="de-DE" smtClean="0"/>
-              <a:t>03.07.2017</a:t>
+              <a:t>04.07.2017</a:t>
             </a:fld>
             <a:endParaRPr lang="de-DE"/>
           </a:p>
@@ -4814,7 +4858,7 @@
           <p:cNvPr id="5" name="Foliennummernplatzhalter 4">
             <a:extLst>
               <a:ext uri="{FF2B5EF4-FFF2-40B4-BE49-F238E27FC236}">
-                <a16:creationId xmlns:a16="http://schemas.microsoft.com/office/drawing/2014/main" id="{2D48826D-56CF-40D0-9FE5-B7EBEAFD2217}"/>
+                <a16:creationId xmlns:a16="http://schemas.microsoft.com/office/drawing/2014/main" id="{E3047872-6EA5-4AFE-BF7D-D96042D0E2FC}"/>
               </a:ext>
             </a:extLst>
           </p:cNvPr>
@@ -4833,6 +4877,541 @@
             <a:fld id="{6C6AE60A-B69C-4790-82F7-3882EDF23186}" type="slidenum">
               <a:rPr lang="de-DE" smtClean="0"/>
               <a:t>14</a:t>
+            </a:fld>
+            <a:endParaRPr lang="de-DE"/>
+          </a:p>
+        </p:txBody>
+      </p:sp>
+      <p:pic>
+        <p:nvPicPr>
+          <p:cNvPr id="11" name="Grafik 10">
+            <a:extLst>
+              <a:ext uri="{FF2B5EF4-FFF2-40B4-BE49-F238E27FC236}">
+                <a16:creationId xmlns:a16="http://schemas.microsoft.com/office/drawing/2014/main" id="{9C840433-3EA4-4F73-95F1-A6382767B5B5}"/>
+              </a:ext>
+            </a:extLst>
+          </p:cNvPr>
+          <p:cNvPicPr>
+            <a:picLocks noChangeAspect="1"/>
+          </p:cNvPicPr>
+          <p:nvPr/>
+        </p:nvPicPr>
+        <p:blipFill>
+          <a:blip r:embed="rId2" cstate="print">
+            <a:extLst>
+              <a:ext uri="{28A0092B-C50C-407E-A947-70E740481C1C}">
+                <a14:useLocalDpi xmlns:a14="http://schemas.microsoft.com/office/drawing/2010/main" val="0"/>
+              </a:ext>
+            </a:extLst>
+          </a:blip>
+          <a:stretch>
+            <a:fillRect/>
+          </a:stretch>
+        </p:blipFill>
+        <p:spPr>
+          <a:xfrm>
+            <a:off x="6876256" y="1892835"/>
+            <a:ext cx="1646312" cy="1646312"/>
+          </a:xfrm>
+          <a:prstGeom prst="rect">
+            <a:avLst/>
+          </a:prstGeom>
+        </p:spPr>
+      </p:pic>
+    </p:spTree>
+    <p:extLst>
+      <p:ext uri="{BB962C8B-B14F-4D97-AF65-F5344CB8AC3E}">
+        <p14:creationId xmlns:p14="http://schemas.microsoft.com/office/powerpoint/2010/main" val="2531422509"/>
+      </p:ext>
+    </p:extLst>
+  </p:cSld>
+  <p:clrMapOvr>
+    <a:masterClrMapping/>
+  </p:clrMapOvr>
+</p:sld>
+</file>
+
+<file path=ppt/slides/slide15.xml><?xml version="1.0" encoding="utf-8"?>
+<p:sld xmlns:a="http://schemas.openxmlformats.org/drawingml/2006/main" xmlns:r="http://schemas.openxmlformats.org/officeDocument/2006/relationships" xmlns:p="http://schemas.openxmlformats.org/presentationml/2006/main">
+  <p:cSld>
+    <p:spTree>
+      <p:nvGrpSpPr>
+        <p:cNvPr id="1" name=""/>
+        <p:cNvGrpSpPr/>
+        <p:nvPr/>
+      </p:nvGrpSpPr>
+      <p:grpSpPr>
+        <a:xfrm>
+          <a:off x="0" y="0"/>
+          <a:ext cx="0" cy="0"/>
+          <a:chOff x="0" y="0"/>
+          <a:chExt cx="0" cy="0"/>
+        </a:xfrm>
+      </p:grpSpPr>
+      <p:sp>
+        <p:nvSpPr>
+          <p:cNvPr id="2" name="Titel 1">
+            <a:extLst>
+              <a:ext uri="{FF2B5EF4-FFF2-40B4-BE49-F238E27FC236}">
+                <a16:creationId xmlns:a16="http://schemas.microsoft.com/office/drawing/2014/main" id="{3B6BC7AA-67B8-4973-85D2-5C6E002E9B58}"/>
+              </a:ext>
+            </a:extLst>
+          </p:cNvPr>
+          <p:cNvSpPr>
+            <a:spLocks noGrp="1"/>
+          </p:cNvSpPr>
+          <p:nvPr>
+            <p:ph type="title"/>
+          </p:nvPr>
+        </p:nvSpPr>
+        <p:spPr/>
+        <p:txBody>
+          <a:bodyPr/>
+          <a:lstStyle/>
+          <a:p>
+            <a:r>
+              <a:rPr lang="de-AT" dirty="0"/>
+              <a:t>Demo</a:t>
+            </a:r>
+          </a:p>
+        </p:txBody>
+      </p:sp>
+      <p:sp>
+        <p:nvSpPr>
+          <p:cNvPr id="3" name="Inhaltsplatzhalter 2">
+            <a:extLst>
+              <a:ext uri="{FF2B5EF4-FFF2-40B4-BE49-F238E27FC236}">
+                <a16:creationId xmlns:a16="http://schemas.microsoft.com/office/drawing/2014/main" id="{7875CACD-CF31-4C15-B665-239523EF88F3}"/>
+              </a:ext>
+            </a:extLst>
+          </p:cNvPr>
+          <p:cNvSpPr>
+            <a:spLocks noGrp="1"/>
+          </p:cNvSpPr>
+          <p:nvPr>
+            <p:ph idx="1"/>
+          </p:nvPr>
+        </p:nvSpPr>
+        <p:spPr/>
+        <p:txBody>
+          <a:bodyPr/>
+          <a:lstStyle/>
+          <a:p>
+            <a:r>
+              <a:rPr lang="de-AT" dirty="0">
+                <a:hlinkClick r:id="rId2" action="ppaction://hlinkfile"/>
+              </a:rPr>
+              <a:t>Video</a:t>
+            </a:r>
+            <a:endParaRPr lang="de-AT" dirty="0"/>
+          </a:p>
+        </p:txBody>
+      </p:sp>
+      <p:sp>
+        <p:nvSpPr>
+          <p:cNvPr id="4" name="Datumsplatzhalter 3">
+            <a:extLst>
+              <a:ext uri="{FF2B5EF4-FFF2-40B4-BE49-F238E27FC236}">
+                <a16:creationId xmlns:a16="http://schemas.microsoft.com/office/drawing/2014/main" id="{A5BC6079-6BB4-43D6-A397-9A1D47A067EF}"/>
+              </a:ext>
+            </a:extLst>
+          </p:cNvPr>
+          <p:cNvSpPr>
+            <a:spLocks noGrp="1"/>
+          </p:cNvSpPr>
+          <p:nvPr>
+            <p:ph type="dt" sz="half" idx="10"/>
+          </p:nvPr>
+        </p:nvSpPr>
+        <p:spPr/>
+        <p:txBody>
+          <a:bodyPr/>
+          <a:lstStyle/>
+          <a:p>
+            <a:fld id="{33426F46-14CA-4DF1-BDB6-9C38CC53B0B1}" type="datetime1">
+              <a:rPr lang="de-DE" smtClean="0"/>
+              <a:t>04.07.2017</a:t>
+            </a:fld>
+            <a:endParaRPr lang="de-DE"/>
+          </a:p>
+        </p:txBody>
+      </p:sp>
+      <p:sp>
+        <p:nvSpPr>
+          <p:cNvPr id="6" name="Foliennummernplatzhalter 5">
+            <a:extLst>
+              <a:ext uri="{FF2B5EF4-FFF2-40B4-BE49-F238E27FC236}">
+                <a16:creationId xmlns:a16="http://schemas.microsoft.com/office/drawing/2014/main" id="{366CF890-D1E4-44C0-A452-9991067C7D6D}"/>
+              </a:ext>
+            </a:extLst>
+          </p:cNvPr>
+          <p:cNvSpPr>
+            <a:spLocks noGrp="1"/>
+          </p:cNvSpPr>
+          <p:nvPr>
+            <p:ph type="sldNum" sz="quarter" idx="12"/>
+          </p:nvPr>
+        </p:nvSpPr>
+        <p:spPr/>
+        <p:txBody>
+          <a:bodyPr/>
+          <a:lstStyle/>
+          <a:p>
+            <a:fld id="{6C6AE60A-B69C-4790-82F7-3882EDF23186}" type="slidenum">
+              <a:rPr lang="de-DE" smtClean="0"/>
+              <a:t>15</a:t>
+            </a:fld>
+            <a:endParaRPr lang="de-DE"/>
+          </a:p>
+        </p:txBody>
+      </p:sp>
+    </p:spTree>
+    <p:extLst>
+      <p:ext uri="{BB962C8B-B14F-4D97-AF65-F5344CB8AC3E}">
+        <p14:creationId xmlns:p14="http://schemas.microsoft.com/office/powerpoint/2010/main" val="1442948324"/>
+      </p:ext>
+    </p:extLst>
+  </p:cSld>
+  <p:clrMapOvr>
+    <a:masterClrMapping/>
+  </p:clrMapOvr>
+</p:sld>
+</file>
+
+<file path=ppt/slides/slide16.xml><?xml version="1.0" encoding="utf-8"?>
+<p:sld xmlns:a="http://schemas.openxmlformats.org/drawingml/2006/main" xmlns:r="http://schemas.openxmlformats.org/officeDocument/2006/relationships" xmlns:p="http://schemas.openxmlformats.org/presentationml/2006/main">
+  <p:cSld>
+    <p:spTree>
+      <p:nvGrpSpPr>
+        <p:cNvPr id="1" name=""/>
+        <p:cNvGrpSpPr/>
+        <p:nvPr/>
+      </p:nvGrpSpPr>
+      <p:grpSpPr>
+        <a:xfrm>
+          <a:off x="0" y="0"/>
+          <a:ext cx="0" cy="0"/>
+          <a:chOff x="0" y="0"/>
+          <a:chExt cx="0" cy="0"/>
+        </a:xfrm>
+      </p:grpSpPr>
+      <p:sp>
+        <p:nvSpPr>
+          <p:cNvPr id="2" name="Titel 1">
+            <a:extLst>
+              <a:ext uri="{FF2B5EF4-FFF2-40B4-BE49-F238E27FC236}">
+                <a16:creationId xmlns:a16="http://schemas.microsoft.com/office/drawing/2014/main" id="{AB59B06D-291A-4812-962D-5ABFDC3C3FB7}"/>
+              </a:ext>
+            </a:extLst>
+          </p:cNvPr>
+          <p:cNvSpPr>
+            <a:spLocks noGrp="1"/>
+          </p:cNvSpPr>
+          <p:nvPr>
+            <p:ph type="title"/>
+          </p:nvPr>
+        </p:nvSpPr>
+        <p:spPr/>
+        <p:txBody>
+          <a:bodyPr>
+            <a:normAutofit fontScale="90000"/>
+          </a:bodyPr>
+          <a:lstStyle/>
+          <a:p>
+            <a:r>
+              <a:rPr lang="de-AT" dirty="0"/>
+              <a:t>Probleme &amp; Herausforderungen</a:t>
+            </a:r>
+          </a:p>
+        </p:txBody>
+      </p:sp>
+      <p:sp>
+        <p:nvSpPr>
+          <p:cNvPr id="3" name="Inhaltsplatzhalter 2">
+            <a:extLst>
+              <a:ext uri="{FF2B5EF4-FFF2-40B4-BE49-F238E27FC236}">
+                <a16:creationId xmlns:a16="http://schemas.microsoft.com/office/drawing/2014/main" id="{F10BBDF9-8A31-4FC8-BAF8-0B3384EEA674}"/>
+              </a:ext>
+            </a:extLst>
+          </p:cNvPr>
+          <p:cNvSpPr>
+            <a:spLocks noGrp="1"/>
+          </p:cNvSpPr>
+          <p:nvPr>
+            <p:ph idx="1"/>
+          </p:nvPr>
+        </p:nvSpPr>
+        <p:spPr/>
+        <p:txBody>
+          <a:bodyPr/>
+          <a:lstStyle/>
+          <a:p>
+            <a:r>
+              <a:rPr lang="de-AT" dirty="0" err="1"/>
+              <a:t>LibGDX</a:t>
+            </a:r>
+            <a:endParaRPr lang="de-AT" dirty="0"/>
+          </a:p>
+          <a:p>
+            <a:pPr lvl="1"/>
+            <a:r>
+              <a:rPr lang="de-AT" dirty="0"/>
+              <a:t>Schnell ein Grundgerüst erstellt</a:t>
+            </a:r>
+          </a:p>
+          <a:p>
+            <a:pPr lvl="1"/>
+            <a:r>
+              <a:rPr lang="de-AT" dirty="0"/>
+              <a:t>Nicht geeignet für komplexe Funktionalität</a:t>
+            </a:r>
+          </a:p>
+          <a:p>
+            <a:pPr lvl="2"/>
+            <a:r>
+              <a:rPr lang="de-AT" dirty="0"/>
+              <a:t>Keine Threads unterstützt</a:t>
+            </a:r>
+          </a:p>
+          <a:p>
+            <a:r>
+              <a:rPr lang="de-AT" dirty="0"/>
+              <a:t>lizenzfreie passende Bilder</a:t>
+            </a:r>
+          </a:p>
+          <a:p>
+            <a:pPr lvl="2"/>
+            <a:endParaRPr lang="de-AT" dirty="0"/>
+          </a:p>
+        </p:txBody>
+      </p:sp>
+      <p:sp>
+        <p:nvSpPr>
+          <p:cNvPr id="4" name="Datumsplatzhalter 3">
+            <a:extLst>
+              <a:ext uri="{FF2B5EF4-FFF2-40B4-BE49-F238E27FC236}">
+                <a16:creationId xmlns:a16="http://schemas.microsoft.com/office/drawing/2014/main" id="{9469D9D1-614D-429A-A62D-437D557AED98}"/>
+              </a:ext>
+            </a:extLst>
+          </p:cNvPr>
+          <p:cNvSpPr>
+            <a:spLocks noGrp="1"/>
+          </p:cNvSpPr>
+          <p:nvPr>
+            <p:ph type="dt" sz="half" idx="10"/>
+          </p:nvPr>
+        </p:nvSpPr>
+        <p:spPr/>
+        <p:txBody>
+          <a:bodyPr/>
+          <a:lstStyle/>
+          <a:p>
+            <a:fld id="{D0495679-6854-4CEB-AB4A-7941CB807E4C}" type="datetime1">
+              <a:rPr lang="de-DE" smtClean="0"/>
+              <a:t>04.07.2017</a:t>
+            </a:fld>
+            <a:endParaRPr lang="de-DE"/>
+          </a:p>
+        </p:txBody>
+      </p:sp>
+      <p:sp>
+        <p:nvSpPr>
+          <p:cNvPr id="5" name="Foliennummernplatzhalter 4">
+            <a:extLst>
+              <a:ext uri="{FF2B5EF4-FFF2-40B4-BE49-F238E27FC236}">
+                <a16:creationId xmlns:a16="http://schemas.microsoft.com/office/drawing/2014/main" id="{C9D6D6BC-A828-409D-A8A7-AB835C0A7536}"/>
+              </a:ext>
+            </a:extLst>
+          </p:cNvPr>
+          <p:cNvSpPr>
+            <a:spLocks noGrp="1"/>
+          </p:cNvSpPr>
+          <p:nvPr>
+            <p:ph type="sldNum" sz="quarter" idx="12"/>
+          </p:nvPr>
+        </p:nvSpPr>
+        <p:spPr/>
+        <p:txBody>
+          <a:bodyPr/>
+          <a:lstStyle/>
+          <a:p>
+            <a:fld id="{6C6AE60A-B69C-4790-82F7-3882EDF23186}" type="slidenum">
+              <a:rPr lang="de-DE" smtClean="0"/>
+              <a:t>16</a:t>
+            </a:fld>
+            <a:endParaRPr lang="de-DE"/>
+          </a:p>
+        </p:txBody>
+      </p:sp>
+    </p:spTree>
+    <p:extLst>
+      <p:ext uri="{BB962C8B-B14F-4D97-AF65-F5344CB8AC3E}">
+        <p14:creationId xmlns:p14="http://schemas.microsoft.com/office/powerpoint/2010/main" val="3644435037"/>
+      </p:ext>
+    </p:extLst>
+  </p:cSld>
+  <p:clrMapOvr>
+    <a:masterClrMapping/>
+  </p:clrMapOvr>
+</p:sld>
+</file>
+
+<file path=ppt/slides/slide17.xml><?xml version="1.0" encoding="utf-8"?>
+<p:sld xmlns:a="http://schemas.openxmlformats.org/drawingml/2006/main" xmlns:r="http://schemas.openxmlformats.org/officeDocument/2006/relationships" xmlns:p="http://schemas.openxmlformats.org/presentationml/2006/main">
+  <p:cSld>
+    <p:spTree>
+      <p:nvGrpSpPr>
+        <p:cNvPr id="1" name=""/>
+        <p:cNvGrpSpPr/>
+        <p:nvPr/>
+      </p:nvGrpSpPr>
+      <p:grpSpPr>
+        <a:xfrm>
+          <a:off x="0" y="0"/>
+          <a:ext cx="0" cy="0"/>
+          <a:chOff x="0" y="0"/>
+          <a:chExt cx="0" cy="0"/>
+        </a:xfrm>
+      </p:grpSpPr>
+      <p:sp>
+        <p:nvSpPr>
+          <p:cNvPr id="2" name="Titel 1">
+            <a:extLst>
+              <a:ext uri="{FF2B5EF4-FFF2-40B4-BE49-F238E27FC236}">
+                <a16:creationId xmlns:a16="http://schemas.microsoft.com/office/drawing/2014/main" id="{73F24B0F-D7BE-46A2-B5F7-7EDAC5BD9B28}"/>
+              </a:ext>
+            </a:extLst>
+          </p:cNvPr>
+          <p:cNvSpPr>
+            <a:spLocks noGrp="1"/>
+          </p:cNvSpPr>
+          <p:nvPr>
+            <p:ph type="title"/>
+          </p:nvPr>
+        </p:nvSpPr>
+        <p:spPr/>
+        <p:txBody>
+          <a:bodyPr/>
+          <a:lstStyle/>
+          <a:p>
+            <a:r>
+              <a:rPr lang="de-AT" dirty="0"/>
+              <a:t>Ausblick</a:t>
+            </a:r>
+          </a:p>
+        </p:txBody>
+      </p:sp>
+      <p:sp>
+        <p:nvSpPr>
+          <p:cNvPr id="3" name="Inhaltsplatzhalter 2">
+            <a:extLst>
+              <a:ext uri="{FF2B5EF4-FFF2-40B4-BE49-F238E27FC236}">
+                <a16:creationId xmlns:a16="http://schemas.microsoft.com/office/drawing/2014/main" id="{E6E5B32A-8D8D-4328-B061-2A08070CF9A6}"/>
+              </a:ext>
+            </a:extLst>
+          </p:cNvPr>
+          <p:cNvSpPr>
+            <a:spLocks noGrp="1"/>
+          </p:cNvSpPr>
+          <p:nvPr>
+            <p:ph idx="1"/>
+          </p:nvPr>
+        </p:nvSpPr>
+        <p:spPr/>
+        <p:txBody>
+          <a:bodyPr/>
+          <a:lstStyle/>
+          <a:p>
+            <a:r>
+              <a:rPr lang="de-AT" dirty="0"/>
+              <a:t>Verschiedene Arten von Gegnern</a:t>
+            </a:r>
+          </a:p>
+          <a:p>
+            <a:r>
+              <a:rPr lang="de-AT" dirty="0"/>
+              <a:t>Verschiedene Maps auswählbar</a:t>
+            </a:r>
+          </a:p>
+          <a:p>
+            <a:r>
+              <a:rPr lang="de-AT" dirty="0"/>
+              <a:t>Tower fusionieren</a:t>
+            </a:r>
+          </a:p>
+          <a:p>
+            <a:r>
+              <a:rPr lang="de-AT" dirty="0"/>
+              <a:t>Highscore-System</a:t>
+            </a:r>
+          </a:p>
+          <a:p>
+            <a:endParaRPr lang="de-AT" dirty="0"/>
+          </a:p>
+          <a:p>
+            <a:r>
+              <a:rPr lang="de-AT" dirty="0"/>
+              <a:t>Portierung auf iOS</a:t>
+            </a:r>
+          </a:p>
+          <a:p>
+            <a:endParaRPr lang="de-AT" dirty="0"/>
+          </a:p>
+        </p:txBody>
+      </p:sp>
+      <p:sp>
+        <p:nvSpPr>
+          <p:cNvPr id="4" name="Datumsplatzhalter 3">
+            <a:extLst>
+              <a:ext uri="{FF2B5EF4-FFF2-40B4-BE49-F238E27FC236}">
+                <a16:creationId xmlns:a16="http://schemas.microsoft.com/office/drawing/2014/main" id="{D01F9BCF-6E42-40A9-9583-41B541DCC396}"/>
+              </a:ext>
+            </a:extLst>
+          </p:cNvPr>
+          <p:cNvSpPr>
+            <a:spLocks noGrp="1"/>
+          </p:cNvSpPr>
+          <p:nvPr>
+            <p:ph type="dt" sz="half" idx="10"/>
+          </p:nvPr>
+        </p:nvSpPr>
+        <p:spPr/>
+        <p:txBody>
+          <a:bodyPr/>
+          <a:lstStyle/>
+          <a:p>
+            <a:fld id="{D0495679-6854-4CEB-AB4A-7941CB807E4C}" type="datetime1">
+              <a:rPr lang="de-DE" smtClean="0"/>
+              <a:t>04.07.2017</a:t>
+            </a:fld>
+            <a:endParaRPr lang="de-DE"/>
+          </a:p>
+        </p:txBody>
+      </p:sp>
+      <p:sp>
+        <p:nvSpPr>
+          <p:cNvPr id="5" name="Foliennummernplatzhalter 4">
+            <a:extLst>
+              <a:ext uri="{FF2B5EF4-FFF2-40B4-BE49-F238E27FC236}">
+                <a16:creationId xmlns:a16="http://schemas.microsoft.com/office/drawing/2014/main" id="{2D48826D-56CF-40D0-9FE5-B7EBEAFD2217}"/>
+              </a:ext>
+            </a:extLst>
+          </p:cNvPr>
+          <p:cNvSpPr>
+            <a:spLocks noGrp="1"/>
+          </p:cNvSpPr>
+          <p:nvPr>
+            <p:ph type="sldNum" sz="quarter" idx="12"/>
+          </p:nvPr>
+        </p:nvSpPr>
+        <p:spPr/>
+        <p:txBody>
+          <a:bodyPr/>
+          <a:lstStyle/>
+          <a:p>
+            <a:fld id="{6C6AE60A-B69C-4790-82F7-3882EDF23186}" type="slidenum">
+              <a:rPr lang="de-DE" smtClean="0"/>
+              <a:t>17</a:t>
             </a:fld>
             <a:endParaRPr lang="de-DE"/>
           </a:p>
@@ -4851,7 +5430,150 @@
 </p:sld>
 </file>
 
-<file path=ppt/slides/slide15.xml><?xml version="1.0" encoding="utf-8"?>
+<file path=ppt/slides/slide18.xml><?xml version="1.0" encoding="utf-8"?>
+<p:sld xmlns:a="http://schemas.openxmlformats.org/drawingml/2006/main" xmlns:r="http://schemas.openxmlformats.org/officeDocument/2006/relationships" xmlns:p="http://schemas.openxmlformats.org/presentationml/2006/main">
+  <p:cSld>
+    <p:spTree>
+      <p:nvGrpSpPr>
+        <p:cNvPr id="1" name=""/>
+        <p:cNvGrpSpPr/>
+        <p:nvPr/>
+      </p:nvGrpSpPr>
+      <p:grpSpPr>
+        <a:xfrm>
+          <a:off x="0" y="0"/>
+          <a:ext cx="0" cy="0"/>
+          <a:chOff x="0" y="0"/>
+          <a:chExt cx="0" cy="0"/>
+        </a:xfrm>
+      </p:grpSpPr>
+      <p:sp>
+        <p:nvSpPr>
+          <p:cNvPr id="6" name="Titel 5">
+            <a:extLst>
+              <a:ext uri="{FF2B5EF4-FFF2-40B4-BE49-F238E27FC236}">
+                <a16:creationId xmlns:a16="http://schemas.microsoft.com/office/drawing/2014/main" id="{B0124825-D849-46BE-8536-2EBCA5736EA6}"/>
+              </a:ext>
+            </a:extLst>
+          </p:cNvPr>
+          <p:cNvSpPr>
+            <a:spLocks noGrp="1"/>
+          </p:cNvSpPr>
+          <p:nvPr>
+            <p:ph type="ctrTitle"/>
+          </p:nvPr>
+        </p:nvSpPr>
+        <p:spPr/>
+        <p:txBody>
+          <a:bodyPr>
+            <a:normAutofit/>
+          </a:bodyPr>
+          <a:lstStyle/>
+          <a:p>
+            <a:r>
+              <a:rPr lang="de-AT" sz="6600" dirty="0"/>
+              <a:t>FRAGEN?</a:t>
+            </a:r>
+          </a:p>
+        </p:txBody>
+      </p:sp>
+      <p:sp>
+        <p:nvSpPr>
+          <p:cNvPr id="7" name="Untertitel 6">
+            <a:extLst>
+              <a:ext uri="{FF2B5EF4-FFF2-40B4-BE49-F238E27FC236}">
+                <a16:creationId xmlns:a16="http://schemas.microsoft.com/office/drawing/2014/main" id="{D86A339F-F463-4310-BC77-D36A6E0BE1BE}"/>
+              </a:ext>
+            </a:extLst>
+          </p:cNvPr>
+          <p:cNvSpPr>
+            <a:spLocks noGrp="1"/>
+          </p:cNvSpPr>
+          <p:nvPr>
+            <p:ph type="subTitle" idx="1"/>
+          </p:nvPr>
+        </p:nvSpPr>
+        <p:spPr/>
+        <p:txBody>
+          <a:bodyPr/>
+          <a:lstStyle/>
+          <a:p>
+            <a:endParaRPr lang="de-AT"/>
+          </a:p>
+        </p:txBody>
+      </p:sp>
+      <p:sp>
+        <p:nvSpPr>
+          <p:cNvPr id="4" name="Datumsplatzhalter 3">
+            <a:extLst>
+              <a:ext uri="{FF2B5EF4-FFF2-40B4-BE49-F238E27FC236}">
+                <a16:creationId xmlns:a16="http://schemas.microsoft.com/office/drawing/2014/main" id="{0DFCFEF2-EF5E-40ED-A96B-6802C22E8DE3}"/>
+              </a:ext>
+            </a:extLst>
+          </p:cNvPr>
+          <p:cNvSpPr>
+            <a:spLocks noGrp="1"/>
+          </p:cNvSpPr>
+          <p:nvPr>
+            <p:ph type="dt" sz="half" idx="10"/>
+          </p:nvPr>
+        </p:nvSpPr>
+        <p:spPr/>
+        <p:txBody>
+          <a:bodyPr/>
+          <a:lstStyle/>
+          <a:p>
+            <a:fld id="{C9FD33F6-9596-4B42-B111-E507BE577142}" type="datetime1">
+              <a:rPr lang="de-DE" smtClean="0"/>
+              <a:t>04.07.2017</a:t>
+            </a:fld>
+            <a:endParaRPr lang="de-DE"/>
+          </a:p>
+        </p:txBody>
+      </p:sp>
+      <p:sp>
+        <p:nvSpPr>
+          <p:cNvPr id="5" name="Foliennummernplatzhalter 4">
+            <a:extLst>
+              <a:ext uri="{FF2B5EF4-FFF2-40B4-BE49-F238E27FC236}">
+                <a16:creationId xmlns:a16="http://schemas.microsoft.com/office/drawing/2014/main" id="{8A93D220-8B32-4E96-A4E3-62827BA1F0C3}"/>
+              </a:ext>
+            </a:extLst>
+          </p:cNvPr>
+          <p:cNvSpPr>
+            <a:spLocks noGrp="1"/>
+          </p:cNvSpPr>
+          <p:nvPr>
+            <p:ph type="sldNum" sz="quarter" idx="12"/>
+          </p:nvPr>
+        </p:nvSpPr>
+        <p:spPr/>
+        <p:txBody>
+          <a:bodyPr/>
+          <a:lstStyle/>
+          <a:p>
+            <a:fld id="{6C6AE60A-B69C-4790-82F7-3882EDF23186}" type="slidenum">
+              <a:rPr lang="de-DE" smtClean="0"/>
+              <a:t>18</a:t>
+            </a:fld>
+            <a:endParaRPr lang="de-DE"/>
+          </a:p>
+        </p:txBody>
+      </p:sp>
+    </p:spTree>
+    <p:extLst>
+      <p:ext uri="{BB962C8B-B14F-4D97-AF65-F5344CB8AC3E}">
+        <p14:creationId xmlns:p14="http://schemas.microsoft.com/office/powerpoint/2010/main" val="484923426"/>
+      </p:ext>
+    </p:extLst>
+  </p:cSld>
+  <p:clrMapOvr>
+    <a:masterClrMapping/>
+  </p:clrMapOvr>
+</p:sld>
+</file>
+
+<file path=ppt/slides/slide19.xml><?xml version="1.0" encoding="utf-8"?>
 <p:sld xmlns:a="http://schemas.openxmlformats.org/drawingml/2006/main" xmlns:r="http://schemas.openxmlformats.org/officeDocument/2006/relationships" xmlns:p="http://schemas.openxmlformats.org/presentationml/2006/main">
   <p:cSld>
     <p:spTree>
@@ -4972,7 +5694,9 @@
         </p:nvSpPr>
         <p:spPr/>
         <p:txBody>
-          <a:bodyPr/>
+          <a:bodyPr>
+            <a:normAutofit fontScale="92500" lnSpcReduction="10000"/>
+          </a:bodyPr>
           <a:lstStyle/>
           <a:p>
             <a:r>
@@ -4995,15 +5719,14 @@
           <a:p>
             <a:r>
               <a:rPr lang="de-AT" dirty="0"/>
-              <a:t>Umsetzung</a:t>
-            </a:r>
-          </a:p>
-          <a:p>
-            <a:r>
-              <a:rPr lang="de-AT" dirty="0" err="1"/>
-              <a:t>LibGDX</a:t>
-            </a:r>
-            <a:endParaRPr lang="de-AT" dirty="0"/>
+              <a:t>Designkonzept</a:t>
+            </a:r>
+          </a:p>
+          <a:p>
+            <a:r>
+              <a:rPr lang="de-AT" dirty="0"/>
+              <a:t>Die Umsetzung</a:t>
+            </a:r>
           </a:p>
           <a:p>
             <a:r>
@@ -5012,7 +5735,16 @@
             </a:r>
           </a:p>
           <a:p>
-            <a:endParaRPr lang="de-AT" dirty="0"/>
+            <a:r>
+              <a:rPr lang="de-AT" dirty="0"/>
+              <a:t>Probleme &amp; Herausforderungen</a:t>
+            </a:r>
+          </a:p>
+          <a:p>
+            <a:r>
+              <a:rPr lang="de-AT" dirty="0"/>
+              <a:t>Ausblick</a:t>
+            </a:r>
           </a:p>
         </p:txBody>
       </p:sp>
@@ -5039,7 +5771,7 @@
           <a:p>
             <a:fld id="{02ADD0D4-00E3-4723-A997-B7ECBE092E9F}" type="datetime1">
               <a:rPr lang="de-DE" smtClean="0"/>
-              <a:t>03.07.2017</a:t>
+              <a:t>04.07.2017</a:t>
             </a:fld>
             <a:endParaRPr lang="de-DE"/>
           </a:p>
@@ -5217,7 +5949,7 @@
           <a:p>
             <a:fld id="{18E7F602-EAB1-4D9C-A126-7CEAF968CD02}" type="datetime1">
               <a:rPr lang="de-DE" smtClean="0"/>
-              <a:t>03.07.2017</a:t>
+              <a:t>04.07.2017</a:t>
             </a:fld>
             <a:endParaRPr lang="de-DE"/>
           </a:p>
@@ -5340,7 +6072,7 @@
             <a:pPr lvl="1"/>
             <a:r>
               <a:rPr lang="de-AT" dirty="0"/>
-              <a:t>Entwicklung irgendwann eingestellt</a:t>
+              <a:t>Entwicklung eingestellt</a:t>
             </a:r>
           </a:p>
           <a:p>
@@ -5355,17 +6087,6 @@
               <a:rPr lang="de-AT" dirty="0"/>
               <a:t>Idee der Portabilität</a:t>
             </a:r>
-          </a:p>
-          <a:p>
-            <a:pPr lvl="1"/>
-            <a:r>
-              <a:rPr lang="de-AT" dirty="0" err="1"/>
-              <a:t>LibGDX</a:t>
-            </a:r>
-            <a:endParaRPr lang="de-AT" dirty="0"/>
-          </a:p>
-          <a:p>
-            <a:endParaRPr lang="de-AT" dirty="0"/>
           </a:p>
         </p:txBody>
       </p:sp>
@@ -5392,7 +6113,7 @@
           <a:p>
             <a:fld id="{F83B068E-C841-4FCE-9865-15D345EDA850}" type="datetime1">
               <a:rPr lang="de-DE" smtClean="0"/>
-              <a:t>03.07.2017</a:t>
+              <a:t>04.07.2017</a:t>
             </a:fld>
             <a:endParaRPr lang="de-DE"/>
           </a:p>
@@ -5427,6 +6148,51 @@
           </a:p>
         </p:txBody>
       </p:sp>
+      <p:pic>
+        <p:nvPicPr>
+          <p:cNvPr id="1026" name="Picture 2" descr="https://i.ytimg.com/vi/e3YXZoUorv0/maxresdefault.jpg">
+            <a:extLst>
+              <a:ext uri="{FF2B5EF4-FFF2-40B4-BE49-F238E27FC236}">
+                <a16:creationId xmlns:a16="http://schemas.microsoft.com/office/drawing/2014/main" id="{0BAC0547-5264-4AAA-9F36-5236DC71BEB3}"/>
+              </a:ext>
+            </a:extLst>
+          </p:cNvPr>
+          <p:cNvPicPr>
+            <a:picLocks noChangeAspect="1" noChangeArrowheads="1"/>
+          </p:cNvPicPr>
+          <p:nvPr/>
+        </p:nvPicPr>
+        <p:blipFill rotWithShape="1">
+          <a:blip r:embed="rId2">
+            <a:extLst>
+              <a:ext uri="{28A0092B-C50C-407E-A947-70E740481C1C}">
+                <a14:useLocalDpi xmlns:a14="http://schemas.microsoft.com/office/drawing/2010/main" val="0"/>
+              </a:ext>
+            </a:extLst>
+          </a:blip>
+          <a:srcRect l="15000" r="15000"/>
+          <a:stretch/>
+        </p:blipFill>
+        <p:spPr bwMode="auto">
+          <a:xfrm>
+            <a:off x="5076056" y="3356992"/>
+            <a:ext cx="4064797" cy="3266402"/>
+          </a:xfrm>
+          <a:prstGeom prst="rect">
+            <a:avLst/>
+          </a:prstGeom>
+          <a:noFill/>
+          <a:extLst>
+            <a:ext uri="{909E8E84-426E-40DD-AFC4-6F175D3DCCD1}">
+              <a14:hiddenFill xmlns:a14="http://schemas.microsoft.com/office/drawing/2010/main">
+                <a:solidFill>
+                  <a:srgbClr val="FFFFFF"/>
+                </a:solidFill>
+              </a14:hiddenFill>
+            </a:ext>
+          </a:extLst>
+        </p:spPr>
+      </p:pic>
     </p:spTree>
     <p:extLst>
       <p:ext uri="{BB962C8B-B14F-4D97-AF65-F5344CB8AC3E}">
@@ -5570,7 +6336,7 @@
           <a:p>
             <a:fld id="{C9BA90A9-2353-4EC3-B836-FAEAEFE0FE65}" type="datetime1">
               <a:rPr lang="de-DE" smtClean="0"/>
-              <a:t>03.07.2017</a:t>
+              <a:t>04.07.2017</a:t>
             </a:fld>
             <a:endParaRPr lang="de-DE"/>
           </a:p>
@@ -5605,6 +6371,42 @@
           </a:p>
         </p:txBody>
       </p:sp>
+      <p:pic>
+        <p:nvPicPr>
+          <p:cNvPr id="7" name="Grafik 6" descr="Ein Bild, das Musik enthält.&#10;&#10;Mit sehr hoher Zuverlässigkeit generierte Beschreibung">
+            <a:extLst>
+              <a:ext uri="{FF2B5EF4-FFF2-40B4-BE49-F238E27FC236}">
+                <a16:creationId xmlns:a16="http://schemas.microsoft.com/office/drawing/2014/main" id="{AAF82151-1E4D-4773-81D3-A63ACA25FBBA}"/>
+              </a:ext>
+            </a:extLst>
+          </p:cNvPr>
+          <p:cNvPicPr>
+            <a:picLocks noChangeAspect="1"/>
+          </p:cNvPicPr>
+          <p:nvPr/>
+        </p:nvPicPr>
+        <p:blipFill>
+          <a:blip r:embed="rId2">
+            <a:extLst>
+              <a:ext uri="{28A0092B-C50C-407E-A947-70E740481C1C}">
+                <a14:useLocalDpi xmlns:a14="http://schemas.microsoft.com/office/drawing/2010/main" val="0"/>
+              </a:ext>
+            </a:extLst>
+          </a:blip>
+          <a:stretch>
+            <a:fillRect/>
+          </a:stretch>
+        </p:blipFill>
+        <p:spPr>
+          <a:xfrm>
+            <a:off x="8100392" y="1834362"/>
+            <a:ext cx="533013" cy="4258934"/>
+          </a:xfrm>
+          <a:prstGeom prst="rect">
+            <a:avLst/>
+          </a:prstGeom>
+        </p:spPr>
+      </p:pic>
     </p:spTree>
     <p:extLst>
       <p:ext uri="{BB962C8B-B14F-4D97-AF65-F5344CB8AC3E}">
@@ -5658,7 +6460,7 @@
           <a:p>
             <a:r>
               <a:rPr lang="de-AT" dirty="0"/>
-              <a:t>Beschreibung des Spiels</a:t>
+              <a:t>Spielablauf</a:t>
             </a:r>
           </a:p>
         </p:txBody>
@@ -5688,45 +6490,29 @@
           <a:p>
             <a:r>
               <a:rPr lang="de-AT" dirty="0"/>
-              <a:t>Bauphase</a:t>
+              <a:t>Startkapital: 100 Gold</a:t>
+            </a:r>
+          </a:p>
+          <a:p>
+            <a:r>
+              <a:rPr lang="de-AT" dirty="0"/>
+              <a:t>Platzierung der Türme</a:t>
             </a:r>
           </a:p>
           <a:p>
             <a:pPr lvl="1"/>
             <a:r>
               <a:rPr lang="de-AT" dirty="0"/>
-              <a:t>20 Sekunden Zeit</a:t>
-            </a:r>
-          </a:p>
-          <a:p>
-            <a:pPr lvl="1"/>
-            <a:r>
-              <a:rPr lang="de-AT" dirty="0"/>
-              <a:t>Startkapital: 100 Gold</a:t>
-            </a:r>
-          </a:p>
-          <a:p>
-            <a:pPr lvl="1"/>
-            <a:r>
-              <a:rPr lang="de-AT" dirty="0"/>
-              <a:t>Platzierung der Türme</a:t>
-            </a:r>
-          </a:p>
-          <a:p>
-            <a:r>
-              <a:rPr lang="de-AT" dirty="0"/>
-              <a:t>Kampfphase</a:t>
-            </a:r>
-          </a:p>
-          <a:p>
-            <a:pPr lvl="1"/>
-            <a:r>
-              <a:rPr lang="de-AT" dirty="0"/>
-              <a:t>Gruppen von Gegnern erscheinen</a:t>
-            </a:r>
-          </a:p>
-          <a:p>
-            <a:pPr lvl="1"/>
+              <a:t>Nur auf freie Flächen</a:t>
+            </a:r>
+          </a:p>
+          <a:p>
+            <a:r>
+              <a:rPr lang="de-AT" dirty="0"/>
+              <a:t>Gegner erscheinen zeitversetzt</a:t>
+            </a:r>
+          </a:p>
+          <a:p>
             <a:r>
               <a:rPr lang="de-AT" dirty="0"/>
               <a:t>Eliminierung eines Gegners </a:t>
@@ -5776,7 +6562,7 @@
           <a:p>
             <a:fld id="{D018EF64-FBD4-4BF5-B01A-1958132ED163}" type="datetime1">
               <a:rPr lang="de-DE" smtClean="0"/>
-              <a:t>03.07.2017</a:t>
+              <a:t>04.07.2017</a:t>
             </a:fld>
             <a:endParaRPr lang="de-DE"/>
           </a:p>
@@ -5920,7 +6706,7 @@
           <a:p>
             <a:fld id="{D0495679-6854-4CEB-AB4A-7941CB807E4C}" type="datetime1">
               <a:rPr lang="de-DE" smtClean="0"/>
-              <a:t>03.07.2017</a:t>
+              <a:t>04.07.2017</a:t>
             </a:fld>
             <a:endParaRPr lang="de-DE"/>
           </a:p>
@@ -6098,7 +6884,7 @@
           <a:p>
             <a:fld id="{D0495679-6854-4CEB-AB4A-7941CB807E4C}" type="datetime1">
               <a:rPr lang="de-DE" smtClean="0"/>
-              <a:t>03.07.2017</a:t>
+              <a:t>04.07.2017</a:t>
             </a:fld>
             <a:endParaRPr lang="de-DE"/>
           </a:p>
@@ -6301,6 +7087,14 @@
               <a:rPr lang="de-AT" dirty="0" err="1"/>
               <a:t>TexturePacker</a:t>
             </a:r>
+            <a:r>
+              <a:rPr lang="de-AT" dirty="0"/>
+              <a:t>, </a:t>
+            </a:r>
+            <a:r>
+              <a:rPr lang="de-AT" dirty="0" err="1"/>
+              <a:t>ParticleEditor</a:t>
+            </a:r>
             <a:endParaRPr lang="de-AT" dirty="0"/>
           </a:p>
           <a:p>
@@ -6339,7 +7133,7 @@
           <a:p>
             <a:fld id="{0F958EBF-1DD2-48CD-AC05-99BB382075B8}" type="datetime1">
               <a:rPr lang="de-DE" smtClean="0"/>
-              <a:t>03.07.2017</a:t>
+              <a:t>04.07.2017</a:t>
             </a:fld>
             <a:endParaRPr lang="de-DE"/>
           </a:p>

</xml_diff>